<commit_message>
updated, prideta testavimo scenarijai
</commit_message>
<xml_diff>
--- a/3 laboratorinis darbas Fiinasta.pptx
+++ b/3 laboratorinis darbas Fiinasta.pptx
@@ -16,10 +16,11 @@
     <p:sldId id="273" r:id="rId10"/>
     <p:sldId id="274" r:id="rId11"/>
     <p:sldId id="275" r:id="rId12"/>
-    <p:sldId id="263" r:id="rId13"/>
-    <p:sldId id="264" r:id="rId14"/>
-    <p:sldId id="270" r:id="rId15"/>
-    <p:sldId id="271" r:id="rId16"/>
+    <p:sldId id="276" r:id="rId13"/>
+    <p:sldId id="263" r:id="rId14"/>
+    <p:sldId id="264" r:id="rId15"/>
+    <p:sldId id="270" r:id="rId16"/>
+    <p:sldId id="271" r:id="rId17"/>
   </p:sldIdLst>
   <p:sldSz cx="12192000" cy="6858000"/>
   <p:notesSz cx="6858000" cy="9144000"/>
@@ -6955,6 +6956,1222 @@
           <a:bodyPr/>
           <a:lstStyle/>
           <a:p>
+            <a:pPr lvl="0"/>
+            <a:r>
+              <a:rPr lang="lt-LT" dirty="0"/>
+              <a:t>Testavimo</a:t>
+            </a:r>
+            <a:r>
+              <a:rPr lang="lt-LT" i="1" dirty="0"/>
+              <a:t> </a:t>
+            </a:r>
+            <a:r>
+              <a:rPr lang="lt-LT" dirty="0"/>
+              <a:t>planas ir scenarijai</a:t>
+            </a:r>
+            <a:br>
+              <a:rPr lang="en-GB" b="1" dirty="0"/>
+            </a:br>
+            <a:endParaRPr lang="en-GB" dirty="0"/>
+          </a:p>
+        </p:txBody>
+      </p:sp>
+      <p:graphicFrame>
+        <p:nvGraphicFramePr>
+          <p:cNvPr id="6" name="Content Placeholder 5"/>
+          <p:cNvGraphicFramePr>
+            <a:graphicFrameLocks noGrp="1"/>
+          </p:cNvGraphicFramePr>
+          <p:nvPr>
+            <p:ph idx="1"/>
+            <p:extLst>
+              <p:ext uri="{D42A27DB-BD31-4B8C-83A1-F6EECF244321}">
+                <p14:modId xmlns:p14="http://schemas.microsoft.com/office/powerpoint/2010/main" val="636301265"/>
+              </p:ext>
+            </p:extLst>
+          </p:nvPr>
+        </p:nvGraphicFramePr>
+        <p:xfrm>
+          <a:off x="2779845" y="1450735"/>
+          <a:ext cx="5943335" cy="5184562"/>
+        </p:xfrm>
+        <a:graphic>
+          <a:graphicData uri="http://schemas.openxmlformats.org/drawingml/2006/table">
+            <a:tbl>
+              <a:tblPr bandRow="1">
+                <a:tableStyleId>{5C22544A-7EE6-4342-B048-85BDC9FD1C3A}</a:tableStyleId>
+              </a:tblPr>
+              <a:tblGrid>
+                <a:gridCol w="4906230">
+                  <a:extLst>
+                    <a:ext uri="{9D8B030D-6E8A-4147-A177-3AD203B41FA5}">
+                      <a16:colId xmlns:a16="http://schemas.microsoft.com/office/drawing/2014/main" val="1549986850"/>
+                    </a:ext>
+                  </a:extLst>
+                </a:gridCol>
+                <a:gridCol w="1037105">
+                  <a:extLst>
+                    <a:ext uri="{9D8B030D-6E8A-4147-A177-3AD203B41FA5}">
+                      <a16:colId xmlns:a16="http://schemas.microsoft.com/office/drawing/2014/main" val="284425399"/>
+                    </a:ext>
+                  </a:extLst>
+                </a:gridCol>
+              </a:tblGrid>
+              <a:tr h="172035">
+                <a:tc gridSpan="2">
+                  <a:txBody>
+                    <a:bodyPr/>
+                    <a:lstStyle/>
+                    <a:p>
+                      <a:pPr indent="180340" algn="ctr">
+                        <a:spcAft>
+                          <a:spcPts val="0"/>
+                        </a:spcAft>
+                      </a:pPr>
+                      <a:r>
+                        <a:rPr lang="lt-LT" sz="1000">
+                          <a:effectLst/>
+                        </a:rPr>
+                        <a:t>Testavimo planas "Fiinasta" web aplikacijai</a:t>
+                      </a:r>
+                      <a:endParaRPr lang="en-GB" sz="800">
+                        <a:effectLst/>
+                        <a:latin typeface="Times New Roman" panose="02020603050405020304" pitchFamily="18" charset="0"/>
+                        <a:ea typeface="Times New Roman" panose="02020603050405020304" pitchFamily="18" charset="0"/>
+                      </a:endParaRPr>
+                    </a:p>
+                  </a:txBody>
+                  <a:tcPr marL="54563" marR="54563" marT="0" marB="0"/>
+                </a:tc>
+                <a:tc hMerge="1">
+                  <a:txBody>
+                    <a:bodyPr/>
+                    <a:lstStyle/>
+                    <a:p>
+                      <a:endParaRPr lang="en-GB"/>
+                    </a:p>
+                  </a:txBody>
+                  <a:tcPr/>
+                </a:tc>
+                <a:extLst>
+                  <a:ext uri="{0D108BD9-81ED-4DB2-BD59-A6C34878D82A}">
+                    <a16:rowId xmlns:a16="http://schemas.microsoft.com/office/drawing/2014/main" val="151941182"/>
+                  </a:ext>
+                </a:extLst>
+              </a:tr>
+              <a:tr h="344069">
+                <a:tc>
+                  <a:txBody>
+                    <a:bodyPr/>
+                    <a:lstStyle/>
+                    <a:p>
+                      <a:pPr indent="180340" algn="just">
+                        <a:spcAft>
+                          <a:spcPts val="0"/>
+                        </a:spcAft>
+                      </a:pPr>
+                      <a:r>
+                        <a:rPr lang="lt-LT" sz="1000">
+                          <a:effectLst/>
+                        </a:rPr>
+                        <a:t> </a:t>
+                      </a:r>
+                      <a:endParaRPr lang="en-GB" sz="800">
+                        <a:effectLst/>
+                        <a:latin typeface="Times New Roman" panose="02020603050405020304" pitchFamily="18" charset="0"/>
+                        <a:ea typeface="Times New Roman" panose="02020603050405020304" pitchFamily="18" charset="0"/>
+                      </a:endParaRPr>
+                    </a:p>
+                  </a:txBody>
+                  <a:tcPr marL="54563" marR="54563" marT="0" marB="0"/>
+                </a:tc>
+                <a:tc>
+                  <a:txBody>
+                    <a:bodyPr/>
+                    <a:lstStyle/>
+                    <a:p>
+                      <a:pPr indent="180340" algn="ctr">
+                        <a:spcAft>
+                          <a:spcPts val="0"/>
+                        </a:spcAft>
+                      </a:pPr>
+                      <a:r>
+                        <a:rPr lang="lt-LT" sz="1000">
+                          <a:effectLst/>
+                        </a:rPr>
+                        <a:t>Testo įvertinimas</a:t>
+                      </a:r>
+                      <a:endParaRPr lang="en-GB" sz="800">
+                        <a:effectLst/>
+                        <a:latin typeface="Times New Roman" panose="02020603050405020304" pitchFamily="18" charset="0"/>
+                        <a:ea typeface="Times New Roman" panose="02020603050405020304" pitchFamily="18" charset="0"/>
+                      </a:endParaRPr>
+                    </a:p>
+                  </a:txBody>
+                  <a:tcPr marL="54563" marR="54563" marT="0" marB="0"/>
+                </a:tc>
+                <a:extLst>
+                  <a:ext uri="{0D108BD9-81ED-4DB2-BD59-A6C34878D82A}">
+                    <a16:rowId xmlns:a16="http://schemas.microsoft.com/office/drawing/2014/main" val="1567907720"/>
+                  </a:ext>
+                </a:extLst>
+              </a:tr>
+              <a:tr h="172035">
+                <a:tc>
+                  <a:txBody>
+                    <a:bodyPr/>
+                    <a:lstStyle/>
+                    <a:p>
+                      <a:pPr indent="180340" algn="just">
+                        <a:spcAft>
+                          <a:spcPts val="0"/>
+                        </a:spcAft>
+                      </a:pPr>
+                      <a:r>
+                        <a:rPr lang="lt-LT" sz="1000">
+                          <a:effectLst/>
+                        </a:rPr>
+                        <a:t>U_01</a:t>
+                      </a:r>
+                      <a:endParaRPr lang="en-GB" sz="800">
+                        <a:effectLst/>
+                        <a:latin typeface="Times New Roman" panose="02020603050405020304" pitchFamily="18" charset="0"/>
+                        <a:ea typeface="Times New Roman" panose="02020603050405020304" pitchFamily="18" charset="0"/>
+                      </a:endParaRPr>
+                    </a:p>
+                  </a:txBody>
+                  <a:tcPr marL="54563" marR="54563" marT="0" marB="0"/>
+                </a:tc>
+                <a:tc rowSpan="10">
+                  <a:txBody>
+                    <a:bodyPr/>
+                    <a:lstStyle/>
+                    <a:p>
+                      <a:pPr indent="180340" algn="just">
+                        <a:spcAft>
+                          <a:spcPts val="0"/>
+                        </a:spcAft>
+                      </a:pPr>
+                      <a:r>
+                        <a:rPr lang="lt-LT" sz="1000" dirty="0">
+                          <a:effectLst/>
+                        </a:rPr>
+                        <a:t> </a:t>
+                      </a:r>
+                      <a:endParaRPr lang="en-GB" sz="800" dirty="0">
+                        <a:effectLst/>
+                        <a:latin typeface="Times New Roman" panose="02020603050405020304" pitchFamily="18" charset="0"/>
+                        <a:ea typeface="Times New Roman" panose="02020603050405020304" pitchFamily="18" charset="0"/>
+                      </a:endParaRPr>
+                    </a:p>
+                  </a:txBody>
+                  <a:tcPr marL="54563" marR="54563" marT="0" marB="0"/>
+                </a:tc>
+                <a:extLst>
+                  <a:ext uri="{0D108BD9-81ED-4DB2-BD59-A6C34878D82A}">
+                    <a16:rowId xmlns:a16="http://schemas.microsoft.com/office/drawing/2014/main" val="1347229751"/>
+                  </a:ext>
+                </a:extLst>
+              </a:tr>
+              <a:tr h="172035">
+                <a:tc>
+                  <a:txBody>
+                    <a:bodyPr/>
+                    <a:lstStyle/>
+                    <a:p>
+                      <a:pPr indent="180340" algn="just">
+                        <a:spcAft>
+                          <a:spcPts val="0"/>
+                        </a:spcAft>
+                      </a:pPr>
+                      <a:r>
+                        <a:rPr lang="lt-LT" sz="1000">
+                          <a:effectLst/>
+                        </a:rPr>
+                        <a:t>Tikrinama ar parodomos esamos išlaidos</a:t>
+                      </a:r>
+                      <a:endParaRPr lang="en-GB" sz="800">
+                        <a:effectLst/>
+                        <a:latin typeface="Times New Roman" panose="02020603050405020304" pitchFamily="18" charset="0"/>
+                        <a:ea typeface="Times New Roman" panose="02020603050405020304" pitchFamily="18" charset="0"/>
+                      </a:endParaRPr>
+                    </a:p>
+                  </a:txBody>
+                  <a:tcPr marL="54563" marR="54563" marT="0" marB="0"/>
+                </a:tc>
+                <a:tc vMerge="1">
+                  <a:txBody>
+                    <a:bodyPr/>
+                    <a:lstStyle/>
+                    <a:p>
+                      <a:endParaRPr lang="en-GB"/>
+                    </a:p>
+                  </a:txBody>
+                  <a:tcPr/>
+                </a:tc>
+                <a:extLst>
+                  <a:ext uri="{0D108BD9-81ED-4DB2-BD59-A6C34878D82A}">
+                    <a16:rowId xmlns:a16="http://schemas.microsoft.com/office/drawing/2014/main" val="3359123438"/>
+                  </a:ext>
+                </a:extLst>
+              </a:tr>
+              <a:tr h="344069">
+                <a:tc>
+                  <a:txBody>
+                    <a:bodyPr/>
+                    <a:lstStyle/>
+                    <a:p>
+                      <a:pPr indent="180340" algn="just">
+                        <a:spcAft>
+                          <a:spcPts val="0"/>
+                        </a:spcAft>
+                      </a:pPr>
+                      <a:r>
+                        <a:rPr lang="lt-LT" sz="1000">
+                          <a:effectLst/>
+                        </a:rPr>
+                        <a:t>Testuotojas "Meniu" lange paspaudžia ir atidaro "Biudžeto suvestinė" langą</a:t>
+                      </a:r>
+                      <a:endParaRPr lang="en-GB" sz="800">
+                        <a:effectLst/>
+                        <a:latin typeface="Times New Roman" panose="02020603050405020304" pitchFamily="18" charset="0"/>
+                        <a:ea typeface="Times New Roman" panose="02020603050405020304" pitchFamily="18" charset="0"/>
+                      </a:endParaRPr>
+                    </a:p>
+                  </a:txBody>
+                  <a:tcPr marL="54563" marR="54563" marT="0" marB="0"/>
+                </a:tc>
+                <a:tc vMerge="1">
+                  <a:txBody>
+                    <a:bodyPr/>
+                    <a:lstStyle/>
+                    <a:p>
+                      <a:endParaRPr lang="en-GB"/>
+                    </a:p>
+                  </a:txBody>
+                  <a:tcPr/>
+                </a:tc>
+                <a:extLst>
+                  <a:ext uri="{0D108BD9-81ED-4DB2-BD59-A6C34878D82A}">
+                    <a16:rowId xmlns:a16="http://schemas.microsoft.com/office/drawing/2014/main" val="1558079638"/>
+                  </a:ext>
+                </a:extLst>
+              </a:tr>
+              <a:tr h="172035">
+                <a:tc>
+                  <a:txBody>
+                    <a:bodyPr/>
+                    <a:lstStyle/>
+                    <a:p>
+                      <a:pPr indent="180340" algn="just">
+                        <a:spcAft>
+                          <a:spcPts val="0"/>
+                        </a:spcAft>
+                      </a:pPr>
+                      <a:r>
+                        <a:rPr lang="lt-LT" sz="1000">
+                          <a:effectLst/>
+                        </a:rPr>
+                        <a:t>Parodomos visos išlaidos</a:t>
+                      </a:r>
+                      <a:endParaRPr lang="en-GB" sz="800">
+                        <a:effectLst/>
+                        <a:latin typeface="Times New Roman" panose="02020603050405020304" pitchFamily="18" charset="0"/>
+                        <a:ea typeface="Times New Roman" panose="02020603050405020304" pitchFamily="18" charset="0"/>
+                      </a:endParaRPr>
+                    </a:p>
+                  </a:txBody>
+                  <a:tcPr marL="54563" marR="54563" marT="0" marB="0"/>
+                </a:tc>
+                <a:tc vMerge="1">
+                  <a:txBody>
+                    <a:bodyPr/>
+                    <a:lstStyle/>
+                    <a:p>
+                      <a:endParaRPr lang="en-GB"/>
+                    </a:p>
+                  </a:txBody>
+                  <a:tcPr/>
+                </a:tc>
+                <a:extLst>
+                  <a:ext uri="{0D108BD9-81ED-4DB2-BD59-A6C34878D82A}">
+                    <a16:rowId xmlns:a16="http://schemas.microsoft.com/office/drawing/2014/main" val="985895783"/>
+                  </a:ext>
+                </a:extLst>
+              </a:tr>
+              <a:tr h="344069">
+                <a:tc>
+                  <a:txBody>
+                    <a:bodyPr/>
+                    <a:lstStyle/>
+                    <a:p>
+                      <a:pPr indent="180340" algn="just">
+                        <a:spcAft>
+                          <a:spcPts val="0"/>
+                        </a:spcAft>
+                      </a:pPr>
+                      <a:r>
+                        <a:rPr lang="lt-LT" sz="1000">
+                          <a:effectLst/>
+                        </a:rPr>
+                        <a:t>Tikrinama ar nesant išlaidų įrašams, atidaromas "Išlaidos/Pajamos" langas su pasiūlymu pridėti naują išlaidą</a:t>
+                      </a:r>
+                      <a:endParaRPr lang="en-GB" sz="800">
+                        <a:effectLst/>
+                        <a:latin typeface="Times New Roman" panose="02020603050405020304" pitchFamily="18" charset="0"/>
+                        <a:ea typeface="Times New Roman" panose="02020603050405020304" pitchFamily="18" charset="0"/>
+                      </a:endParaRPr>
+                    </a:p>
+                  </a:txBody>
+                  <a:tcPr marL="54563" marR="54563" marT="0" marB="0"/>
+                </a:tc>
+                <a:tc vMerge="1">
+                  <a:txBody>
+                    <a:bodyPr/>
+                    <a:lstStyle/>
+                    <a:p>
+                      <a:endParaRPr lang="en-GB"/>
+                    </a:p>
+                  </a:txBody>
+                  <a:tcPr/>
+                </a:tc>
+                <a:extLst>
+                  <a:ext uri="{0D108BD9-81ED-4DB2-BD59-A6C34878D82A}">
+                    <a16:rowId xmlns:a16="http://schemas.microsoft.com/office/drawing/2014/main" val="22556865"/>
+                  </a:ext>
+                </a:extLst>
+              </a:tr>
+              <a:tr h="344069">
+                <a:tc>
+                  <a:txBody>
+                    <a:bodyPr/>
+                    <a:lstStyle/>
+                    <a:p>
+                      <a:pPr indent="180340" algn="just">
+                        <a:spcAft>
+                          <a:spcPts val="0"/>
+                        </a:spcAft>
+                      </a:pPr>
+                      <a:r>
+                        <a:rPr lang="lt-LT" sz="1000" dirty="0">
+                          <a:effectLst/>
+                        </a:rPr>
+                        <a:t>Testuotojas "Meniu" lange paspaudžia ir atidaro "Biudžeto suvestinė" langą</a:t>
+                      </a:r>
+                      <a:endParaRPr lang="en-GB" sz="800" dirty="0">
+                        <a:effectLst/>
+                        <a:latin typeface="Times New Roman" panose="02020603050405020304" pitchFamily="18" charset="0"/>
+                        <a:ea typeface="Times New Roman" panose="02020603050405020304" pitchFamily="18" charset="0"/>
+                      </a:endParaRPr>
+                    </a:p>
+                  </a:txBody>
+                  <a:tcPr marL="54563" marR="54563" marT="0" marB="0"/>
+                </a:tc>
+                <a:tc vMerge="1">
+                  <a:txBody>
+                    <a:bodyPr/>
+                    <a:lstStyle/>
+                    <a:p>
+                      <a:endParaRPr lang="en-GB"/>
+                    </a:p>
+                  </a:txBody>
+                  <a:tcPr/>
+                </a:tc>
+                <a:extLst>
+                  <a:ext uri="{0D108BD9-81ED-4DB2-BD59-A6C34878D82A}">
+                    <a16:rowId xmlns:a16="http://schemas.microsoft.com/office/drawing/2014/main" val="2250408973"/>
+                  </a:ext>
+                </a:extLst>
+              </a:tr>
+              <a:tr h="172035">
+                <a:tc>
+                  <a:txBody>
+                    <a:bodyPr/>
+                    <a:lstStyle/>
+                    <a:p>
+                      <a:pPr indent="180340" algn="just">
+                        <a:spcAft>
+                          <a:spcPts val="0"/>
+                        </a:spcAft>
+                      </a:pPr>
+                      <a:r>
+                        <a:rPr lang="lt-LT" sz="1000" dirty="0">
+                          <a:effectLst/>
+                        </a:rPr>
+                        <a:t>Atidaromas "Išlaidos/Pajamos" langas su pasiūlymu pridėti naują išlaidą</a:t>
+                      </a:r>
+                      <a:endParaRPr lang="en-GB" sz="800" dirty="0">
+                        <a:effectLst/>
+                        <a:latin typeface="Times New Roman" panose="02020603050405020304" pitchFamily="18" charset="0"/>
+                        <a:ea typeface="Times New Roman" panose="02020603050405020304" pitchFamily="18" charset="0"/>
+                      </a:endParaRPr>
+                    </a:p>
+                  </a:txBody>
+                  <a:tcPr marL="54563" marR="54563" marT="0" marB="0"/>
+                </a:tc>
+                <a:tc vMerge="1">
+                  <a:txBody>
+                    <a:bodyPr/>
+                    <a:lstStyle/>
+                    <a:p>
+                      <a:endParaRPr lang="en-GB"/>
+                    </a:p>
+                  </a:txBody>
+                  <a:tcPr/>
+                </a:tc>
+                <a:extLst>
+                  <a:ext uri="{0D108BD9-81ED-4DB2-BD59-A6C34878D82A}">
+                    <a16:rowId xmlns:a16="http://schemas.microsoft.com/office/drawing/2014/main" val="538920827"/>
+                  </a:ext>
+                </a:extLst>
+              </a:tr>
+              <a:tr h="344069">
+                <a:tc>
+                  <a:txBody>
+                    <a:bodyPr/>
+                    <a:lstStyle/>
+                    <a:p>
+                      <a:pPr indent="180340" algn="just">
+                        <a:spcAft>
+                          <a:spcPts val="0"/>
+                        </a:spcAft>
+                      </a:pPr>
+                      <a:r>
+                        <a:rPr lang="lt-LT" sz="1000">
+                          <a:effectLst/>
+                        </a:rPr>
+                        <a:t>Tikrinama ar nesant išlaidų įrašams, atidaromas "Išlaidos/Pajamos" langas su pasiūlymu pridėti naują išlaidą</a:t>
+                      </a:r>
+                      <a:endParaRPr lang="en-GB" sz="800">
+                        <a:effectLst/>
+                        <a:latin typeface="Times New Roman" panose="02020603050405020304" pitchFamily="18" charset="0"/>
+                        <a:ea typeface="Times New Roman" panose="02020603050405020304" pitchFamily="18" charset="0"/>
+                      </a:endParaRPr>
+                    </a:p>
+                  </a:txBody>
+                  <a:tcPr marL="54563" marR="54563" marT="0" marB="0"/>
+                </a:tc>
+                <a:tc vMerge="1">
+                  <a:txBody>
+                    <a:bodyPr/>
+                    <a:lstStyle/>
+                    <a:p>
+                      <a:endParaRPr lang="en-GB"/>
+                    </a:p>
+                  </a:txBody>
+                  <a:tcPr/>
+                </a:tc>
+                <a:extLst>
+                  <a:ext uri="{0D108BD9-81ED-4DB2-BD59-A6C34878D82A}">
+                    <a16:rowId xmlns:a16="http://schemas.microsoft.com/office/drawing/2014/main" val="3528704592"/>
+                  </a:ext>
+                </a:extLst>
+              </a:tr>
+              <a:tr h="344069">
+                <a:tc>
+                  <a:txBody>
+                    <a:bodyPr/>
+                    <a:lstStyle/>
+                    <a:p>
+                      <a:pPr indent="180340" algn="just">
+                        <a:spcAft>
+                          <a:spcPts val="0"/>
+                        </a:spcAft>
+                      </a:pPr>
+                      <a:r>
+                        <a:rPr lang="lt-LT" sz="1000" dirty="0">
+                          <a:effectLst/>
+                        </a:rPr>
+                        <a:t>Testuotojas "Meniu" lange paspaudžia ir atidaro "Biudžeto suvestinė" langą</a:t>
+                      </a:r>
+                      <a:endParaRPr lang="en-GB" sz="800" dirty="0">
+                        <a:effectLst/>
+                        <a:latin typeface="Times New Roman" panose="02020603050405020304" pitchFamily="18" charset="0"/>
+                        <a:ea typeface="Times New Roman" panose="02020603050405020304" pitchFamily="18" charset="0"/>
+                      </a:endParaRPr>
+                    </a:p>
+                  </a:txBody>
+                  <a:tcPr marL="54563" marR="54563" marT="0" marB="0"/>
+                </a:tc>
+                <a:tc vMerge="1">
+                  <a:txBody>
+                    <a:bodyPr/>
+                    <a:lstStyle/>
+                    <a:p>
+                      <a:endParaRPr lang="en-GB"/>
+                    </a:p>
+                  </a:txBody>
+                  <a:tcPr/>
+                </a:tc>
+                <a:extLst>
+                  <a:ext uri="{0D108BD9-81ED-4DB2-BD59-A6C34878D82A}">
+                    <a16:rowId xmlns:a16="http://schemas.microsoft.com/office/drawing/2014/main" val="3873066591"/>
+                  </a:ext>
+                </a:extLst>
+              </a:tr>
+              <a:tr h="172035">
+                <a:tc>
+                  <a:txBody>
+                    <a:bodyPr/>
+                    <a:lstStyle/>
+                    <a:p>
+                      <a:pPr indent="180340" algn="just">
+                        <a:spcAft>
+                          <a:spcPts val="0"/>
+                        </a:spcAft>
+                      </a:pPr>
+                      <a:r>
+                        <a:rPr lang="lt-LT" sz="1000" dirty="0">
+                          <a:effectLst/>
+                        </a:rPr>
+                        <a:t>Atidaromas "Išlaidos/Pajamos" langas su pasiūlymu pridėti naują išlaidą</a:t>
+                      </a:r>
+                      <a:endParaRPr lang="en-GB" sz="800" dirty="0">
+                        <a:effectLst/>
+                        <a:latin typeface="Times New Roman" panose="02020603050405020304" pitchFamily="18" charset="0"/>
+                        <a:ea typeface="Times New Roman" panose="02020603050405020304" pitchFamily="18" charset="0"/>
+                      </a:endParaRPr>
+                    </a:p>
+                  </a:txBody>
+                  <a:tcPr marL="54563" marR="54563" marT="0" marB="0"/>
+                </a:tc>
+                <a:tc vMerge="1">
+                  <a:txBody>
+                    <a:bodyPr/>
+                    <a:lstStyle/>
+                    <a:p>
+                      <a:endParaRPr lang="en-GB"/>
+                    </a:p>
+                  </a:txBody>
+                  <a:tcPr/>
+                </a:tc>
+                <a:extLst>
+                  <a:ext uri="{0D108BD9-81ED-4DB2-BD59-A6C34878D82A}">
+                    <a16:rowId xmlns:a16="http://schemas.microsoft.com/office/drawing/2014/main" val="578572861"/>
+                  </a:ext>
+                </a:extLst>
+              </a:tr>
+              <a:tr h="172035">
+                <a:tc>
+                  <a:txBody>
+                    <a:bodyPr/>
+                    <a:lstStyle/>
+                    <a:p>
+                      <a:pPr indent="180340" algn="just">
+                        <a:spcAft>
+                          <a:spcPts val="0"/>
+                        </a:spcAft>
+                      </a:pPr>
+                      <a:r>
+                        <a:rPr lang="lt-LT" sz="1000" dirty="0">
+                          <a:effectLst/>
+                        </a:rPr>
+                        <a:t>U_02</a:t>
+                      </a:r>
+                      <a:endParaRPr lang="en-GB" sz="800" dirty="0">
+                        <a:effectLst/>
+                        <a:latin typeface="Times New Roman" panose="02020603050405020304" pitchFamily="18" charset="0"/>
+                        <a:ea typeface="Times New Roman" panose="02020603050405020304" pitchFamily="18" charset="0"/>
+                      </a:endParaRPr>
+                    </a:p>
+                  </a:txBody>
+                  <a:tcPr marL="54563" marR="54563" marT="0" marB="0"/>
+                </a:tc>
+                <a:tc rowSpan="9">
+                  <a:txBody>
+                    <a:bodyPr/>
+                    <a:lstStyle/>
+                    <a:p>
+                      <a:pPr indent="180340" algn="just">
+                        <a:spcAft>
+                          <a:spcPts val="0"/>
+                        </a:spcAft>
+                      </a:pPr>
+                      <a:r>
+                        <a:rPr lang="lt-LT" sz="1000">
+                          <a:effectLst/>
+                        </a:rPr>
+                        <a:t> </a:t>
+                      </a:r>
+                      <a:endParaRPr lang="en-GB" sz="800">
+                        <a:effectLst/>
+                      </a:endParaRPr>
+                    </a:p>
+                    <a:p>
+                      <a:pPr indent="180340" algn="just">
+                        <a:spcAft>
+                          <a:spcPts val="0"/>
+                        </a:spcAft>
+                      </a:pPr>
+                      <a:r>
+                        <a:rPr lang="lt-LT" sz="1000">
+                          <a:effectLst/>
+                        </a:rPr>
+                        <a:t> </a:t>
+                      </a:r>
+                      <a:endParaRPr lang="en-GB" sz="800">
+                        <a:effectLst/>
+                      </a:endParaRPr>
+                    </a:p>
+                    <a:p>
+                      <a:pPr indent="180340" algn="just">
+                        <a:spcAft>
+                          <a:spcPts val="0"/>
+                        </a:spcAft>
+                      </a:pPr>
+                      <a:r>
+                        <a:rPr lang="lt-LT" sz="1000">
+                          <a:effectLst/>
+                        </a:rPr>
+                        <a:t> </a:t>
+                      </a:r>
+                      <a:endParaRPr lang="en-GB" sz="800">
+                        <a:effectLst/>
+                      </a:endParaRPr>
+                    </a:p>
+                    <a:p>
+                      <a:pPr indent="180340" algn="just">
+                        <a:spcAft>
+                          <a:spcPts val="0"/>
+                        </a:spcAft>
+                      </a:pPr>
+                      <a:r>
+                        <a:rPr lang="lt-LT" sz="1000">
+                          <a:effectLst/>
+                        </a:rPr>
+                        <a:t> </a:t>
+                      </a:r>
+                      <a:endParaRPr lang="en-GB" sz="800">
+                        <a:effectLst/>
+                      </a:endParaRPr>
+                    </a:p>
+                    <a:p>
+                      <a:pPr indent="180340" algn="just">
+                        <a:spcAft>
+                          <a:spcPts val="0"/>
+                        </a:spcAft>
+                      </a:pPr>
+                      <a:r>
+                        <a:rPr lang="lt-LT" sz="1000">
+                          <a:effectLst/>
+                        </a:rPr>
+                        <a:t> </a:t>
+                      </a:r>
+                      <a:endParaRPr lang="en-GB" sz="800">
+                        <a:effectLst/>
+                      </a:endParaRPr>
+                    </a:p>
+                    <a:p>
+                      <a:pPr indent="180340" algn="just">
+                        <a:spcAft>
+                          <a:spcPts val="0"/>
+                        </a:spcAft>
+                      </a:pPr>
+                      <a:r>
+                        <a:rPr lang="lt-LT" sz="1000">
+                          <a:effectLst/>
+                        </a:rPr>
+                        <a:t> </a:t>
+                      </a:r>
+                      <a:endParaRPr lang="en-GB" sz="800">
+                        <a:effectLst/>
+                      </a:endParaRPr>
+                    </a:p>
+                    <a:p>
+                      <a:pPr indent="180340" algn="just">
+                        <a:spcAft>
+                          <a:spcPts val="0"/>
+                        </a:spcAft>
+                      </a:pPr>
+                      <a:r>
+                        <a:rPr lang="lt-LT" sz="1000">
+                          <a:effectLst/>
+                        </a:rPr>
+                        <a:t> </a:t>
+                      </a:r>
+                      <a:endParaRPr lang="en-GB" sz="800">
+                        <a:effectLst/>
+                      </a:endParaRPr>
+                    </a:p>
+                    <a:p>
+                      <a:pPr indent="180340" algn="just">
+                        <a:spcAft>
+                          <a:spcPts val="0"/>
+                        </a:spcAft>
+                      </a:pPr>
+                      <a:r>
+                        <a:rPr lang="lt-LT" sz="1000">
+                          <a:effectLst/>
+                        </a:rPr>
+                        <a:t> </a:t>
+                      </a:r>
+                      <a:endParaRPr lang="en-GB" sz="800">
+                        <a:effectLst/>
+                      </a:endParaRPr>
+                    </a:p>
+                    <a:p>
+                      <a:pPr indent="180340" algn="just">
+                        <a:spcAft>
+                          <a:spcPts val="0"/>
+                        </a:spcAft>
+                      </a:pPr>
+                      <a:r>
+                        <a:rPr lang="lt-LT" sz="1000">
+                          <a:effectLst/>
+                        </a:rPr>
+                        <a:t> </a:t>
+                      </a:r>
+                      <a:endParaRPr lang="en-GB" sz="800">
+                        <a:effectLst/>
+                        <a:latin typeface="Times New Roman" panose="02020603050405020304" pitchFamily="18" charset="0"/>
+                        <a:ea typeface="Times New Roman" panose="02020603050405020304" pitchFamily="18" charset="0"/>
+                      </a:endParaRPr>
+                    </a:p>
+                  </a:txBody>
+                  <a:tcPr marL="54563" marR="54563" marT="0" marB="0"/>
+                </a:tc>
+                <a:extLst>
+                  <a:ext uri="{0D108BD9-81ED-4DB2-BD59-A6C34878D82A}">
+                    <a16:rowId xmlns:a16="http://schemas.microsoft.com/office/drawing/2014/main" val="24431300"/>
+                  </a:ext>
+                </a:extLst>
+              </a:tr>
+              <a:tr h="172035">
+                <a:tc>
+                  <a:txBody>
+                    <a:bodyPr/>
+                    <a:lstStyle/>
+                    <a:p>
+                      <a:pPr indent="180340" algn="just">
+                        <a:spcAft>
+                          <a:spcPts val="0"/>
+                        </a:spcAft>
+                      </a:pPr>
+                      <a:r>
+                        <a:rPr lang="lt-LT" sz="1000">
+                          <a:effectLst/>
+                        </a:rPr>
+                        <a:t>Tikrinama ar surandamas išlaidos įrašas</a:t>
+                      </a:r>
+                      <a:endParaRPr lang="en-GB" sz="800">
+                        <a:effectLst/>
+                        <a:latin typeface="Times New Roman" panose="02020603050405020304" pitchFamily="18" charset="0"/>
+                        <a:ea typeface="Times New Roman" panose="02020603050405020304" pitchFamily="18" charset="0"/>
+                      </a:endParaRPr>
+                    </a:p>
+                  </a:txBody>
+                  <a:tcPr marL="54563" marR="54563" marT="0" marB="0"/>
+                </a:tc>
+                <a:tc vMerge="1">
+                  <a:txBody>
+                    <a:bodyPr/>
+                    <a:lstStyle/>
+                    <a:p>
+                      <a:endParaRPr lang="en-GB"/>
+                    </a:p>
+                  </a:txBody>
+                  <a:tcPr/>
+                </a:tc>
+                <a:extLst>
+                  <a:ext uri="{0D108BD9-81ED-4DB2-BD59-A6C34878D82A}">
+                    <a16:rowId xmlns:a16="http://schemas.microsoft.com/office/drawing/2014/main" val="3092094853"/>
+                  </a:ext>
+                </a:extLst>
+              </a:tr>
+              <a:tr h="344069">
+                <a:tc>
+                  <a:txBody>
+                    <a:bodyPr/>
+                    <a:lstStyle/>
+                    <a:p>
+                      <a:pPr indent="180340" algn="just">
+                        <a:spcAft>
+                          <a:spcPts val="0"/>
+                        </a:spcAft>
+                      </a:pPr>
+                      <a:r>
+                        <a:rPr lang="lt-LT" sz="1000" dirty="0">
+                          <a:effectLst/>
+                        </a:rPr>
+                        <a:t>Testuotojas  "Biudžeto suvestinė" lange paspaudžia ant "Išlaidų paieška"</a:t>
+                      </a:r>
+                      <a:endParaRPr lang="en-GB" sz="800" dirty="0">
+                        <a:effectLst/>
+                        <a:latin typeface="Times New Roman" panose="02020603050405020304" pitchFamily="18" charset="0"/>
+                        <a:ea typeface="Times New Roman" panose="02020603050405020304" pitchFamily="18" charset="0"/>
+                      </a:endParaRPr>
+                    </a:p>
+                  </a:txBody>
+                  <a:tcPr marL="54563" marR="54563" marT="0" marB="0"/>
+                </a:tc>
+                <a:tc vMerge="1">
+                  <a:txBody>
+                    <a:bodyPr/>
+                    <a:lstStyle/>
+                    <a:p>
+                      <a:endParaRPr lang="en-GB"/>
+                    </a:p>
+                  </a:txBody>
+                  <a:tcPr/>
+                </a:tc>
+                <a:extLst>
+                  <a:ext uri="{0D108BD9-81ED-4DB2-BD59-A6C34878D82A}">
+                    <a16:rowId xmlns:a16="http://schemas.microsoft.com/office/drawing/2014/main" val="2874237744"/>
+                  </a:ext>
+                </a:extLst>
+              </a:tr>
+              <a:tr h="172035">
+                <a:tc>
+                  <a:txBody>
+                    <a:bodyPr/>
+                    <a:lstStyle/>
+                    <a:p>
+                      <a:pPr indent="180340" algn="just">
+                        <a:spcAft>
+                          <a:spcPts val="0"/>
+                        </a:spcAft>
+                      </a:pPr>
+                      <a:r>
+                        <a:rPr lang="lt-LT" sz="1000">
+                          <a:effectLst/>
+                        </a:rPr>
+                        <a:t>Testuotojas suveda išlaidos, kurios ieško pastabą</a:t>
+                      </a:r>
+                      <a:endParaRPr lang="en-GB" sz="800">
+                        <a:effectLst/>
+                        <a:latin typeface="Times New Roman" panose="02020603050405020304" pitchFamily="18" charset="0"/>
+                        <a:ea typeface="Times New Roman" panose="02020603050405020304" pitchFamily="18" charset="0"/>
+                      </a:endParaRPr>
+                    </a:p>
+                  </a:txBody>
+                  <a:tcPr marL="54563" marR="54563" marT="0" marB="0"/>
+                </a:tc>
+                <a:tc vMerge="1">
+                  <a:txBody>
+                    <a:bodyPr/>
+                    <a:lstStyle/>
+                    <a:p>
+                      <a:endParaRPr lang="en-GB"/>
+                    </a:p>
+                  </a:txBody>
+                  <a:tcPr/>
+                </a:tc>
+                <a:extLst>
+                  <a:ext uri="{0D108BD9-81ED-4DB2-BD59-A6C34878D82A}">
+                    <a16:rowId xmlns:a16="http://schemas.microsoft.com/office/drawing/2014/main" val="92463031"/>
+                  </a:ext>
+                </a:extLst>
+              </a:tr>
+              <a:tr h="172035">
+                <a:tc>
+                  <a:txBody>
+                    <a:bodyPr/>
+                    <a:lstStyle/>
+                    <a:p>
+                      <a:pPr indent="180340" algn="just">
+                        <a:spcAft>
+                          <a:spcPts val="0"/>
+                        </a:spcAft>
+                      </a:pPr>
+                      <a:r>
+                        <a:rPr lang="lt-LT" sz="1000">
+                          <a:effectLst/>
+                        </a:rPr>
+                        <a:t>Parodomas išlaidos įrašas</a:t>
+                      </a:r>
+                      <a:endParaRPr lang="en-GB" sz="800">
+                        <a:effectLst/>
+                        <a:latin typeface="Times New Roman" panose="02020603050405020304" pitchFamily="18" charset="0"/>
+                        <a:ea typeface="Times New Roman" panose="02020603050405020304" pitchFamily="18" charset="0"/>
+                      </a:endParaRPr>
+                    </a:p>
+                  </a:txBody>
+                  <a:tcPr marL="54563" marR="54563" marT="0" marB="0"/>
+                </a:tc>
+                <a:tc vMerge="1">
+                  <a:txBody>
+                    <a:bodyPr/>
+                    <a:lstStyle/>
+                    <a:p>
+                      <a:endParaRPr lang="en-GB"/>
+                    </a:p>
+                  </a:txBody>
+                  <a:tcPr/>
+                </a:tc>
+                <a:extLst>
+                  <a:ext uri="{0D108BD9-81ED-4DB2-BD59-A6C34878D82A}">
+                    <a16:rowId xmlns:a16="http://schemas.microsoft.com/office/drawing/2014/main" val="1120900217"/>
+                  </a:ext>
+                </a:extLst>
+              </a:tr>
+              <a:tr h="172035">
+                <a:tc>
+                  <a:txBody>
+                    <a:bodyPr/>
+                    <a:lstStyle/>
+                    <a:p>
+                      <a:pPr indent="180340" algn="just">
+                        <a:spcAft>
+                          <a:spcPts val="0"/>
+                        </a:spcAft>
+                      </a:pPr>
+                      <a:r>
+                        <a:rPr lang="lt-LT" sz="1000">
+                          <a:effectLst/>
+                        </a:rPr>
+                        <a:t>Tikrinama ar nesant išlaidos įrašui parodoma: "išlaidų nėra"</a:t>
+                      </a:r>
+                      <a:endParaRPr lang="en-GB" sz="800">
+                        <a:effectLst/>
+                        <a:latin typeface="Times New Roman" panose="02020603050405020304" pitchFamily="18" charset="0"/>
+                        <a:ea typeface="Times New Roman" panose="02020603050405020304" pitchFamily="18" charset="0"/>
+                      </a:endParaRPr>
+                    </a:p>
+                  </a:txBody>
+                  <a:tcPr marL="54563" marR="54563" marT="0" marB="0"/>
+                </a:tc>
+                <a:tc vMerge="1">
+                  <a:txBody>
+                    <a:bodyPr/>
+                    <a:lstStyle/>
+                    <a:p>
+                      <a:endParaRPr lang="en-GB"/>
+                    </a:p>
+                  </a:txBody>
+                  <a:tcPr/>
+                </a:tc>
+                <a:extLst>
+                  <a:ext uri="{0D108BD9-81ED-4DB2-BD59-A6C34878D82A}">
+                    <a16:rowId xmlns:a16="http://schemas.microsoft.com/office/drawing/2014/main" val="871787267"/>
+                  </a:ext>
+                </a:extLst>
+              </a:tr>
+              <a:tr h="344069">
+                <a:tc>
+                  <a:txBody>
+                    <a:bodyPr/>
+                    <a:lstStyle/>
+                    <a:p>
+                      <a:pPr indent="180340" algn="just">
+                        <a:spcAft>
+                          <a:spcPts val="0"/>
+                        </a:spcAft>
+                      </a:pPr>
+                      <a:r>
+                        <a:rPr lang="lt-LT" sz="1000">
+                          <a:effectLst/>
+                        </a:rPr>
+                        <a:t>Testuotojas  "Biudžeto suvestinė" lange paspaudžia ant "Išlaidų paieška"</a:t>
+                      </a:r>
+                      <a:endParaRPr lang="en-GB" sz="800">
+                        <a:effectLst/>
+                        <a:latin typeface="Times New Roman" panose="02020603050405020304" pitchFamily="18" charset="0"/>
+                        <a:ea typeface="Times New Roman" panose="02020603050405020304" pitchFamily="18" charset="0"/>
+                      </a:endParaRPr>
+                    </a:p>
+                  </a:txBody>
+                  <a:tcPr marL="54563" marR="54563" marT="0" marB="0"/>
+                </a:tc>
+                <a:tc vMerge="1">
+                  <a:txBody>
+                    <a:bodyPr/>
+                    <a:lstStyle/>
+                    <a:p>
+                      <a:endParaRPr lang="en-GB"/>
+                    </a:p>
+                  </a:txBody>
+                  <a:tcPr/>
+                </a:tc>
+                <a:extLst>
+                  <a:ext uri="{0D108BD9-81ED-4DB2-BD59-A6C34878D82A}">
+                    <a16:rowId xmlns:a16="http://schemas.microsoft.com/office/drawing/2014/main" val="201220783"/>
+                  </a:ext>
+                </a:extLst>
+              </a:tr>
+              <a:tr h="172035">
+                <a:tc>
+                  <a:txBody>
+                    <a:bodyPr/>
+                    <a:lstStyle/>
+                    <a:p>
+                      <a:pPr indent="180340" algn="just">
+                        <a:spcAft>
+                          <a:spcPts val="0"/>
+                        </a:spcAft>
+                      </a:pPr>
+                      <a:r>
+                        <a:rPr lang="lt-LT" sz="1000">
+                          <a:effectLst/>
+                        </a:rPr>
+                        <a:t>Testuotojas suveda išlaidos, kurios nėra pastabą</a:t>
+                      </a:r>
+                      <a:endParaRPr lang="en-GB" sz="800">
+                        <a:effectLst/>
+                        <a:latin typeface="Times New Roman" panose="02020603050405020304" pitchFamily="18" charset="0"/>
+                        <a:ea typeface="Times New Roman" panose="02020603050405020304" pitchFamily="18" charset="0"/>
+                      </a:endParaRPr>
+                    </a:p>
+                  </a:txBody>
+                  <a:tcPr marL="54563" marR="54563" marT="0" marB="0"/>
+                </a:tc>
+                <a:tc vMerge="1">
+                  <a:txBody>
+                    <a:bodyPr/>
+                    <a:lstStyle/>
+                    <a:p>
+                      <a:endParaRPr lang="en-GB"/>
+                    </a:p>
+                  </a:txBody>
+                  <a:tcPr/>
+                </a:tc>
+                <a:extLst>
+                  <a:ext uri="{0D108BD9-81ED-4DB2-BD59-A6C34878D82A}">
+                    <a16:rowId xmlns:a16="http://schemas.microsoft.com/office/drawing/2014/main" val="710770211"/>
+                  </a:ext>
+                </a:extLst>
+              </a:tr>
+              <a:tr h="195555">
+                <a:tc>
+                  <a:txBody>
+                    <a:bodyPr/>
+                    <a:lstStyle/>
+                    <a:p>
+                      <a:pPr indent="180340" algn="just">
+                        <a:spcAft>
+                          <a:spcPts val="0"/>
+                        </a:spcAft>
+                      </a:pPr>
+                      <a:r>
+                        <a:rPr lang="lt-LT" sz="1000" dirty="0">
+                          <a:effectLst/>
+                        </a:rPr>
+                        <a:t>Parodomas tekstas, kad tokia išlaida neegzistuoja</a:t>
+                      </a:r>
+                      <a:endParaRPr lang="en-GB" sz="800" dirty="0">
+                        <a:effectLst/>
+                        <a:latin typeface="Times New Roman" panose="02020603050405020304" pitchFamily="18" charset="0"/>
+                        <a:ea typeface="Times New Roman" panose="02020603050405020304" pitchFamily="18" charset="0"/>
+                      </a:endParaRPr>
+                    </a:p>
+                  </a:txBody>
+                  <a:tcPr marL="54563" marR="54563" marT="0" marB="0"/>
+                </a:tc>
+                <a:tc vMerge="1">
+                  <a:txBody>
+                    <a:bodyPr/>
+                    <a:lstStyle/>
+                    <a:p>
+                      <a:endParaRPr lang="en-GB"/>
+                    </a:p>
+                  </a:txBody>
+                  <a:tcPr/>
+                </a:tc>
+                <a:extLst>
+                  <a:ext uri="{0D108BD9-81ED-4DB2-BD59-A6C34878D82A}">
+                    <a16:rowId xmlns:a16="http://schemas.microsoft.com/office/drawing/2014/main" val="3659549603"/>
+                  </a:ext>
+                </a:extLst>
+              </a:tr>
+              <a:tr h="172035">
+                <a:tc>
+                  <a:txBody>
+                    <a:bodyPr/>
+                    <a:lstStyle/>
+                    <a:p>
+                      <a:pPr indent="180340" algn="just">
+                        <a:spcAft>
+                          <a:spcPts val="0"/>
+                        </a:spcAft>
+                      </a:pPr>
+                      <a:endParaRPr lang="en-GB" sz="800" dirty="0">
+                        <a:effectLst/>
+                        <a:latin typeface="Times New Roman" panose="02020603050405020304" pitchFamily="18" charset="0"/>
+                        <a:ea typeface="Times New Roman" panose="02020603050405020304" pitchFamily="18" charset="0"/>
+                      </a:endParaRPr>
+                    </a:p>
+                  </a:txBody>
+                  <a:tcPr marL="54563" marR="54563" marT="0" marB="0"/>
+                </a:tc>
+                <a:tc>
+                  <a:txBody>
+                    <a:bodyPr/>
+                    <a:lstStyle/>
+                    <a:p>
+                      <a:pPr indent="180340" algn="just">
+                        <a:spcAft>
+                          <a:spcPts val="0"/>
+                        </a:spcAft>
+                      </a:pPr>
+                      <a:r>
+                        <a:rPr lang="lt-LT" sz="1000" dirty="0">
+                          <a:effectLst/>
+                        </a:rPr>
+                        <a:t> </a:t>
+                      </a:r>
+                      <a:endParaRPr lang="en-GB" sz="800" dirty="0">
+                        <a:effectLst/>
+                        <a:latin typeface="Times New Roman" panose="02020603050405020304" pitchFamily="18" charset="0"/>
+                        <a:ea typeface="Times New Roman" panose="02020603050405020304" pitchFamily="18" charset="0"/>
+                      </a:endParaRPr>
+                    </a:p>
+                  </a:txBody>
+                  <a:tcPr marL="54563" marR="54563" marT="0" marB="0"/>
+                </a:tc>
+                <a:extLst>
+                  <a:ext uri="{0D108BD9-81ED-4DB2-BD59-A6C34878D82A}">
+                    <a16:rowId xmlns:a16="http://schemas.microsoft.com/office/drawing/2014/main" val="3848397096"/>
+                  </a:ext>
+                </a:extLst>
+              </a:tr>
+            </a:tbl>
+          </a:graphicData>
+        </a:graphic>
+      </p:graphicFrame>
+    </p:spTree>
+    <p:extLst>
+      <p:ext uri="{BB962C8B-B14F-4D97-AF65-F5344CB8AC3E}">
+        <p14:creationId xmlns:p14="http://schemas.microsoft.com/office/powerpoint/2010/main" val="1913610717"/>
+      </p:ext>
+    </p:extLst>
+  </p:cSld>
+  <p:clrMapOvr>
+    <a:masterClrMapping/>
+  </p:clrMapOvr>
+</p:sld>
+</file>
+
+<file path=ppt/slides/slide13.xml><?xml version="1.0" encoding="utf-8"?>
+<p:sld xmlns:a="http://schemas.openxmlformats.org/drawingml/2006/main" xmlns:r="http://schemas.openxmlformats.org/officeDocument/2006/relationships" xmlns:p="http://schemas.openxmlformats.org/presentationml/2006/main">
+  <p:cSld>
+    <p:spTree>
+      <p:nvGrpSpPr>
+        <p:cNvPr id="1" name=""/>
+        <p:cNvGrpSpPr/>
+        <p:nvPr/>
+      </p:nvGrpSpPr>
+      <p:grpSpPr>
+        <a:xfrm>
+          <a:off x="0" y="0"/>
+          <a:ext cx="0" cy="0"/>
+          <a:chOff x="0" y="0"/>
+          <a:chExt cx="0" cy="0"/>
+        </a:xfrm>
+      </p:grpSpPr>
+      <p:sp>
+        <p:nvSpPr>
+          <p:cNvPr id="2" name="Title 1"/>
+          <p:cNvSpPr>
+            <a:spLocks noGrp="1"/>
+          </p:cNvSpPr>
+          <p:nvPr>
+            <p:ph type="title"/>
+          </p:nvPr>
+        </p:nvSpPr>
+        <p:spPr/>
+        <p:txBody>
+          <a:bodyPr/>
+          <a:lstStyle/>
+          <a:p>
             <a:r>
               <a:rPr lang="lt-LT" dirty="0"/>
               <a:t>Techninė architektūra</a:t>
@@ -7041,7 +8258,7 @@
 </p:sld>
 </file>
 
-<file path=ppt/slides/slide13.xml><?xml version="1.0" encoding="utf-8"?>
+<file path=ppt/slides/slide14.xml><?xml version="1.0" encoding="utf-8"?>
 <p:sld xmlns:a="http://schemas.openxmlformats.org/drawingml/2006/main" xmlns:r="http://schemas.openxmlformats.org/officeDocument/2006/relationships" xmlns:p="http://schemas.openxmlformats.org/presentationml/2006/main">
   <p:cSld>
     <p:spTree>
@@ -7159,7 +8376,7 @@
 </p:sld>
 </file>
 
-<file path=ppt/slides/slide14.xml><?xml version="1.0" encoding="utf-8"?>
+<file path=ppt/slides/slide15.xml><?xml version="1.0" encoding="utf-8"?>
 <p:sld xmlns:a="http://schemas.openxmlformats.org/drawingml/2006/main" xmlns:r="http://schemas.openxmlformats.org/officeDocument/2006/relationships" xmlns:p="http://schemas.openxmlformats.org/presentationml/2006/main">
   <p:cSld>
     <p:spTree>
@@ -7234,7 +8451,7 @@
 </p:sld>
 </file>
 
-<file path=ppt/slides/slide15.xml><?xml version="1.0" encoding="utf-8"?>
+<file path=ppt/slides/slide16.xml><?xml version="1.0" encoding="utf-8"?>
 <p:sld xmlns:a="http://schemas.openxmlformats.org/drawingml/2006/main" xmlns:r="http://schemas.openxmlformats.org/officeDocument/2006/relationships" xmlns:p="http://schemas.openxmlformats.org/presentationml/2006/main">
   <p:cSld>
     <p:spTree>

</xml_diff>

<commit_message>
Pataisyta skaidriu 'prekine' isvaizda.
</commit_message>
<xml_diff>
--- a/3 laboratorinis darbas Fiinasta.pptx
+++ b/3 laboratorinis darbas Fiinasta.pptx
@@ -131,7 +131,7 @@
 </file>
 
 <file path=ppt/charts/chart1.xml><?xml version="1.0" encoding="utf-8"?>
-<c:chartSpace xmlns:c="http://schemas.openxmlformats.org/drawingml/2006/chart" xmlns:a="http://schemas.openxmlformats.org/drawingml/2006/main" xmlns:r="http://schemas.openxmlformats.org/officeDocument/2006/relationships" xmlns:c16r2="http://schemas.microsoft.com/office/drawing/2015/06/chart">
+<c:chartSpace xmlns:c="http://schemas.openxmlformats.org/drawingml/2006/chart" xmlns:a="http://schemas.openxmlformats.org/drawingml/2006/main" xmlns:r="http://schemas.openxmlformats.org/officeDocument/2006/relationships">
   <c:date1904 val="0"/>
   <c:lang val="en-US"/>
   <c:roundedCorners val="0"/>
@@ -145,6 +145,7 @@
   </mc:AlternateContent>
   <c:chart>
     <c:title>
+      <c:layout/>
       <c:overlay val="0"/>
       <c:spPr>
         <a:noFill/>
@@ -248,7 +249,7 @@
               </c:numCache>
             </c:numRef>
           </c:val>
-          <c:extLst>
+          <c:extLst xmlns:c16r2="http://schemas.microsoft.com/office/drawing/2015/06/chart">
             <c:ext xmlns:c16="http://schemas.microsoft.com/office/drawing/2014/chart" uri="{C3380CC4-5D6E-409C-BE32-E72D297353CC}">
               <c16:uniqueId val="{00000000-D539-43CB-B1B2-34D32D6A2239}"/>
             </c:ext>
@@ -264,11 +265,11 @@
         </c:dLbls>
         <c:gapWidth val="219"/>
         <c:overlap val="-27"/>
-        <c:axId val="440575064"/>
-        <c:axId val="440576048"/>
+        <c:axId val="876386160"/>
+        <c:axId val="876384528"/>
       </c:barChart>
       <c:catAx>
-        <c:axId val="440575064"/>
+        <c:axId val="876386160"/>
         <c:scaling>
           <c:orientation val="minMax"/>
         </c:scaling>
@@ -311,7 +312,7 @@
             <a:endParaRPr lang="en-US"/>
           </a:p>
         </c:txPr>
-        <c:crossAx val="440576048"/>
+        <c:crossAx val="876384528"/>
         <c:crosses val="autoZero"/>
         <c:auto val="1"/>
         <c:lblAlgn val="ctr"/>
@@ -319,7 +320,7 @@
         <c:noMultiLvlLbl val="0"/>
       </c:catAx>
       <c:valAx>
-        <c:axId val="440576048"/>
+        <c:axId val="876384528"/>
         <c:scaling>
           <c:orientation val="minMax"/>
         </c:scaling>
@@ -370,7 +371,7 @@
             <a:endParaRPr lang="en-US"/>
           </a:p>
         </c:txPr>
-        <c:crossAx val="440575064"/>
+        <c:crossAx val="876386160"/>
         <c:crosses val="autoZero"/>
         <c:crossBetween val="between"/>
       </c:valAx>
@@ -384,6 +385,7 @@
     </c:plotArea>
     <c:legend>
       <c:legendPos val="b"/>
+      <c:layout/>
       <c:overlay val="0"/>
       <c:spPr>
         <a:noFill/>
@@ -6675,6 +6677,10 @@
               <a:rPr lang="lt-LT" sz="4400" dirty="0"/>
               <a:t>a</a:t>
             </a:r>
+            <a:r>
+              <a:rPr lang="en-GB" sz="4400" dirty="0"/>
+              <a:t/>
+            </a:r>
             <a:br>
               <a:rPr lang="en-GB" sz="4400" dirty="0"/>
             </a:br>
@@ -6937,6 +6943,10 @@
               <a:rPr lang="lt-LT" dirty="0"/>
               <a:t>planas ir scenarijai</a:t>
             </a:r>
+            <a:r>
+              <a:rPr lang="en-GB" b="1" dirty="0"/>
+              <a:t/>
+            </a:r>
             <a:br>
               <a:rPr lang="en-GB" b="1" dirty="0"/>
             </a:br>
@@ -6954,14 +6964,14 @@
             <p:ph idx="1"/>
             <p:extLst>
               <p:ext uri="{D42A27DB-BD31-4B8C-83A1-F6EECF244321}">
-                <p14:modId xmlns:p14="http://schemas.microsoft.com/office/powerpoint/2010/main" val="2485755376"/>
+                <p14:modId xmlns:p14="http://schemas.microsoft.com/office/powerpoint/2010/main" val="4157136273"/>
               </p:ext>
             </p:extLst>
           </p:nvPr>
         </p:nvGraphicFramePr>
         <p:xfrm>
-          <a:off x="685800" y="2141538"/>
-          <a:ext cx="10131426" cy="3708400"/>
+          <a:off x="641838" y="1389190"/>
+          <a:ext cx="10893670" cy="4976440"/>
         </p:xfrm>
         <a:graphic>
           <a:graphicData uri="http://schemas.openxmlformats.org/drawingml/2006/table">
@@ -6970,28 +6980,21 @@
                 <a:tableStyleId>{21E4AEA4-8DFA-4A89-87EB-49C32662AFE0}</a:tableStyleId>
               </a:tblPr>
               <a:tblGrid>
-                <a:gridCol w="8173720">
+                <a:gridCol w="10893670">
                   <a:extLst>
                     <a:ext uri="{9D8B030D-6E8A-4147-A177-3AD203B41FA5}">
-                      <a16:colId xmlns:a16="http://schemas.microsoft.com/office/drawing/2014/main" val="1605102344"/>
-                    </a:ext>
-                  </a:extLst>
-                </a:gridCol>
-                <a:gridCol w="1957706">
-                  <a:extLst>
-                    <a:ext uri="{9D8B030D-6E8A-4147-A177-3AD203B41FA5}">
-                      <a16:colId xmlns:a16="http://schemas.microsoft.com/office/drawing/2014/main" val="808834353"/>
+                      <a16:colId xmlns:a16="http://schemas.microsoft.com/office/drawing/2014/main" xmlns="" val="1605102344"/>
                     </a:ext>
                   </a:extLst>
                 </a:gridCol>
               </a:tblGrid>
-              <a:tr h="370840">
-                <a:tc gridSpan="2">
-                  <a:txBody>
-                    <a:bodyPr/>
-                    <a:lstStyle/>
-                    <a:p>
-                      <a:pPr marL="0" marR="0" indent="0" algn="ctr" defTabSz="457200" rtl="0" eaLnBrk="1" fontAlgn="auto" latinLnBrk="0" hangingPunct="1">
+              <a:tr h="497644">
+                <a:tc>
+                  <a:txBody>
+                    <a:bodyPr/>
+                    <a:lstStyle/>
+                    <a:p>
+                      <a:pPr marL="0" marR="0" indent="0" algn="l" defTabSz="457200" rtl="0" eaLnBrk="1" fontAlgn="auto" latinLnBrk="0" hangingPunct="1">
                         <a:lnSpc>
                           <a:spcPct val="100000"/>
                         </a:lnSpc>
@@ -7021,42 +7024,32 @@
                       </a:endParaRPr>
                     </a:p>
                   </a:txBody>
-                  <a:tcPr/>
-                </a:tc>
-                <a:tc hMerge="1">
-                  <a:txBody>
-                    <a:bodyPr/>
-                    <a:lstStyle/>
-                    <a:p>
-                      <a:endParaRPr lang="en-GB" dirty="0"/>
-                    </a:p>
-                  </a:txBody>
-                  <a:tcPr/>
+                  <a:tcPr anchor="ctr"/>
                 </a:tc>
                 <a:extLst>
                   <a:ext uri="{0D108BD9-81ED-4DB2-BD59-A6C34878D82A}">
-                    <a16:rowId xmlns:a16="http://schemas.microsoft.com/office/drawing/2014/main" val="842602815"/>
+                    <a16:rowId xmlns:a16="http://schemas.microsoft.com/office/drawing/2014/main" xmlns="" val="842602815"/>
                   </a:ext>
                 </a:extLst>
               </a:tr>
-              <a:tr h="370840">
-                <a:tc>
-                  <a:txBody>
-                    <a:bodyPr/>
-                    <a:lstStyle/>
-                    <a:p>
-                      <a:pPr indent="180340" algn="just">
-                        <a:spcAft>
-                          <a:spcPts val="0"/>
-                        </a:spcAft>
-                      </a:pPr>
-                      <a:r>
-                        <a:rPr lang="lt-LT" sz="1800" dirty="0">
+              <a:tr h="497644">
+                <a:tc>
+                  <a:txBody>
+                    <a:bodyPr/>
+                    <a:lstStyle/>
+                    <a:p>
+                      <a:pPr indent="180340" algn="l">
+                        <a:spcAft>
+                          <a:spcPts val="0"/>
+                        </a:spcAft>
+                      </a:pPr>
+                      <a:r>
+                        <a:rPr lang="lt-LT" sz="1800" dirty="0" smtClean="0">
                           <a:effectLst/>
                           <a:latin typeface="+mj-lt"/>
                           <a:ea typeface="Times New Roman" panose="02020603050405020304" pitchFamily="18" charset="0"/>
                         </a:rPr>
-                        <a:t>U_02</a:t>
+                        <a:t>TC_02</a:t>
                       </a:r>
                       <a:endParaRPr lang="en-GB" sz="1200" dirty="0">
                         <a:effectLst/>
@@ -7065,52 +7058,21 @@
                       </a:endParaRPr>
                     </a:p>
                   </a:txBody>
-                  <a:tcPr marL="68580" marR="68580" marT="0" marB="0"/>
-                </a:tc>
-                <a:tc>
-                  <a:txBody>
-                    <a:bodyPr/>
-                    <a:lstStyle/>
-                    <a:p>
-                      <a:pPr marL="0" marR="0" indent="0" algn="l" defTabSz="457200" rtl="0" eaLnBrk="1" fontAlgn="auto" latinLnBrk="0" hangingPunct="1">
-                        <a:lnSpc>
-                          <a:spcPct val="100000"/>
-                        </a:lnSpc>
-                        <a:spcBef>
-                          <a:spcPts val="0"/>
-                        </a:spcBef>
-                        <a:spcAft>
-                          <a:spcPts val="0"/>
-                        </a:spcAft>
-                        <a:buClrTx/>
-                        <a:buSzTx/>
-                        <a:buFontTx/>
-                        <a:buNone/>
-                        <a:tabLst/>
-                        <a:defRPr/>
-                      </a:pPr>
-                      <a:r>
-                        <a:rPr lang="lt-LT" dirty="0"/>
-                        <a:t>Testo įvertinimai</a:t>
-                      </a:r>
-                      <a:endParaRPr lang="en-GB" dirty="0"/>
-                    </a:p>
-                  </a:txBody>
-                  <a:tcPr/>
+                  <a:tcPr marL="68580" marR="68580" marT="0" marB="0" anchor="ctr"/>
                 </a:tc>
                 <a:extLst>
                   <a:ext uri="{0D108BD9-81ED-4DB2-BD59-A6C34878D82A}">
-                    <a16:rowId xmlns:a16="http://schemas.microsoft.com/office/drawing/2014/main" val="2601556762"/>
+                    <a16:rowId xmlns:a16="http://schemas.microsoft.com/office/drawing/2014/main" xmlns="" val="2601556762"/>
                   </a:ext>
                 </a:extLst>
               </a:tr>
-              <a:tr h="370840">
-                <a:tc>
-                  <a:txBody>
-                    <a:bodyPr/>
-                    <a:lstStyle/>
-                    <a:p>
-                      <a:pPr indent="180340" algn="just">
+              <a:tr h="497644">
+                <a:tc>
+                  <a:txBody>
+                    <a:bodyPr/>
+                    <a:lstStyle/>
+                    <a:p>
+                      <a:pPr indent="180340" algn="l">
                         <a:spcAft>
                           <a:spcPts val="0"/>
                         </a:spcAft>
@@ -7130,7 +7092,7 @@
                       </a:endParaRPr>
                     </a:p>
                   </a:txBody>
-                  <a:tcPr marL="68580" marR="68580" marT="0" marB="0">
+                  <a:tcPr marL="68580" marR="68580" marT="0" marB="0" anchor="ctr">
                     <a:solidFill>
                       <a:schemeClr val="tx1">
                         <a:lumMod val="65000"/>
@@ -7138,37 +7100,27 @@
                     </a:solidFill>
                   </a:tcPr>
                 </a:tc>
-                <a:tc>
-                  <a:txBody>
-                    <a:bodyPr/>
-                    <a:lstStyle/>
-                    <a:p>
-                      <a:endParaRPr lang="en-GB"/>
-                    </a:p>
-                  </a:txBody>
-                  <a:tcPr/>
-                </a:tc>
                 <a:extLst>
                   <a:ext uri="{0D108BD9-81ED-4DB2-BD59-A6C34878D82A}">
-                    <a16:rowId xmlns:a16="http://schemas.microsoft.com/office/drawing/2014/main" val="945082974"/>
+                    <a16:rowId xmlns:a16="http://schemas.microsoft.com/office/drawing/2014/main" xmlns="" val="945082974"/>
                   </a:ext>
                 </a:extLst>
               </a:tr>
-              <a:tr h="370840">
-                <a:tc>
-                  <a:txBody>
-                    <a:bodyPr/>
-                    <a:lstStyle/>
-                    <a:p>
-                      <a:pPr indent="180340" algn="just">
-                        <a:spcAft>
-                          <a:spcPts val="0"/>
-                        </a:spcAft>
-                      </a:pPr>
-                      <a:r>
-                        <a:rPr lang="lt-LT" sz="1800">
+              <a:tr h="497644">
+                <a:tc>
+                  <a:txBody>
+                    <a:bodyPr/>
+                    <a:lstStyle/>
+                    <a:p>
+                      <a:pPr indent="180340" algn="l">
+                        <a:spcAft>
+                          <a:spcPts val="0"/>
+                        </a:spcAft>
+                      </a:pPr>
+                      <a:r>
+                        <a:rPr lang="lt-LT" sz="1800" dirty="0">
                           <a:solidFill>
-                            <a:srgbClr val="5B9BD5"/>
+                            <a:schemeClr val="bg1"/>
                           </a:solidFill>
                           <a:effectLst/>
                           <a:latin typeface="+mj-lt"/>
@@ -7176,46 +7128,39 @@
                         </a:rPr>
                         <a:t>Testuotojas  "Biudžeto suvestinė" lange paspaudžia ant "Išlaidų paieška"</a:t>
                       </a:r>
-                      <a:endParaRPr lang="en-GB" sz="1200">
+                      <a:endParaRPr lang="en-GB" sz="1200" dirty="0">
+                        <a:solidFill>
+                          <a:schemeClr val="bg1"/>
+                        </a:solidFill>
                         <a:effectLst/>
                         <a:latin typeface="+mj-lt"/>
                         <a:ea typeface="Times New Roman" panose="02020603050405020304" pitchFamily="18" charset="0"/>
                       </a:endParaRPr>
                     </a:p>
                   </a:txBody>
-                  <a:tcPr marL="68580" marR="68580" marT="0" marB="0"/>
-                </a:tc>
-                <a:tc>
-                  <a:txBody>
-                    <a:bodyPr/>
-                    <a:lstStyle/>
-                    <a:p>
-                      <a:endParaRPr lang="en-GB"/>
-                    </a:p>
-                  </a:txBody>
-                  <a:tcPr/>
+                  <a:tcPr marL="68580" marR="68580" marT="0" marB="0" anchor="ctr"/>
                 </a:tc>
                 <a:extLst>
                   <a:ext uri="{0D108BD9-81ED-4DB2-BD59-A6C34878D82A}">
-                    <a16:rowId xmlns:a16="http://schemas.microsoft.com/office/drawing/2014/main" val="1590502588"/>
+                    <a16:rowId xmlns:a16="http://schemas.microsoft.com/office/drawing/2014/main" xmlns="" val="1590502588"/>
                   </a:ext>
                 </a:extLst>
               </a:tr>
-              <a:tr h="370840">
-                <a:tc>
-                  <a:txBody>
-                    <a:bodyPr/>
-                    <a:lstStyle/>
-                    <a:p>
-                      <a:pPr indent="180340" algn="just">
-                        <a:spcAft>
-                          <a:spcPts val="0"/>
-                        </a:spcAft>
-                      </a:pPr>
-                      <a:r>
-                        <a:rPr lang="lt-LT" sz="1800">
+              <a:tr h="497644">
+                <a:tc>
+                  <a:txBody>
+                    <a:bodyPr/>
+                    <a:lstStyle/>
+                    <a:p>
+                      <a:pPr indent="180340" algn="l">
+                        <a:spcAft>
+                          <a:spcPts val="0"/>
+                        </a:spcAft>
+                      </a:pPr>
+                      <a:r>
+                        <a:rPr lang="lt-LT" sz="1800" dirty="0">
                           <a:solidFill>
-                            <a:srgbClr val="5B9BD5"/>
+                            <a:schemeClr val="bg1"/>
                           </a:solidFill>
                           <a:effectLst/>
                           <a:latin typeface="+mj-lt"/>
@@ -7223,38 +7168,31 @@
                         </a:rPr>
                         <a:t>Testuotojas suveda išlaidos, kurios ieško pastabą</a:t>
                       </a:r>
-                      <a:endParaRPr lang="en-GB" sz="1200">
+                      <a:endParaRPr lang="en-GB" sz="1200" dirty="0">
+                        <a:solidFill>
+                          <a:schemeClr val="bg1"/>
+                        </a:solidFill>
                         <a:effectLst/>
                         <a:latin typeface="+mj-lt"/>
                         <a:ea typeface="Times New Roman" panose="02020603050405020304" pitchFamily="18" charset="0"/>
                       </a:endParaRPr>
                     </a:p>
                   </a:txBody>
-                  <a:tcPr marL="68580" marR="68580" marT="0" marB="0"/>
-                </a:tc>
-                <a:tc>
-                  <a:txBody>
-                    <a:bodyPr/>
-                    <a:lstStyle/>
-                    <a:p>
-                      <a:endParaRPr lang="en-GB"/>
-                    </a:p>
-                  </a:txBody>
-                  <a:tcPr/>
+                  <a:tcPr marL="68580" marR="68580" marT="0" marB="0" anchor="ctr"/>
                 </a:tc>
                 <a:extLst>
                   <a:ext uri="{0D108BD9-81ED-4DB2-BD59-A6C34878D82A}">
-                    <a16:rowId xmlns:a16="http://schemas.microsoft.com/office/drawing/2014/main" val="2172522435"/>
+                    <a16:rowId xmlns:a16="http://schemas.microsoft.com/office/drawing/2014/main" xmlns="" val="2172522435"/>
                   </a:ext>
                 </a:extLst>
               </a:tr>
-              <a:tr h="370840">
-                <a:tc>
-                  <a:txBody>
-                    <a:bodyPr/>
-                    <a:lstStyle/>
-                    <a:p>
-                      <a:pPr indent="180340" algn="just">
+              <a:tr h="497644">
+                <a:tc>
+                  <a:txBody>
+                    <a:bodyPr/>
+                    <a:lstStyle/>
+                    <a:p>
+                      <a:pPr indent="180340" algn="l">
                         <a:spcAft>
                           <a:spcPts val="0"/>
                         </a:spcAft>
@@ -7274,7 +7212,7 @@
                       </a:endParaRPr>
                     </a:p>
                   </a:txBody>
-                  <a:tcPr marL="68580" marR="68580" marT="0" marB="0">
+                  <a:tcPr marL="68580" marR="68580" marT="0" marB="0" anchor="ctr">
                     <a:solidFill>
                       <a:schemeClr val="accent4">
                         <a:lumMod val="60000"/>
@@ -7283,29 +7221,19 @@
                     </a:solidFill>
                   </a:tcPr>
                 </a:tc>
-                <a:tc>
-                  <a:txBody>
-                    <a:bodyPr/>
-                    <a:lstStyle/>
-                    <a:p>
-                      <a:endParaRPr lang="en-GB"/>
-                    </a:p>
-                  </a:txBody>
-                  <a:tcPr/>
-                </a:tc>
                 <a:extLst>
                   <a:ext uri="{0D108BD9-81ED-4DB2-BD59-A6C34878D82A}">
-                    <a16:rowId xmlns:a16="http://schemas.microsoft.com/office/drawing/2014/main" val="649584338"/>
+                    <a16:rowId xmlns:a16="http://schemas.microsoft.com/office/drawing/2014/main" xmlns="" val="649584338"/>
                   </a:ext>
                 </a:extLst>
               </a:tr>
-              <a:tr h="370840">
-                <a:tc>
-                  <a:txBody>
-                    <a:bodyPr/>
-                    <a:lstStyle/>
-                    <a:p>
-                      <a:pPr indent="180340" algn="just">
+              <a:tr h="497644">
+                <a:tc>
+                  <a:txBody>
+                    <a:bodyPr/>
+                    <a:lstStyle/>
+                    <a:p>
+                      <a:pPr indent="180340" algn="l">
                         <a:spcAft>
                           <a:spcPts val="0"/>
                         </a:spcAft>
@@ -7325,7 +7253,7 @@
                       </a:endParaRPr>
                     </a:p>
                   </a:txBody>
-                  <a:tcPr marL="68580" marR="68580" marT="0" marB="0">
+                  <a:tcPr marL="68580" marR="68580" marT="0" marB="0" anchor="ctr">
                     <a:solidFill>
                       <a:schemeClr val="tx1">
                         <a:lumMod val="65000"/>
@@ -7333,37 +7261,27 @@
                     </a:solidFill>
                   </a:tcPr>
                 </a:tc>
-                <a:tc>
-                  <a:txBody>
-                    <a:bodyPr/>
-                    <a:lstStyle/>
-                    <a:p>
-                      <a:endParaRPr lang="en-GB"/>
-                    </a:p>
-                  </a:txBody>
-                  <a:tcPr/>
-                </a:tc>
                 <a:extLst>
                   <a:ext uri="{0D108BD9-81ED-4DB2-BD59-A6C34878D82A}">
-                    <a16:rowId xmlns:a16="http://schemas.microsoft.com/office/drawing/2014/main" val="2803861091"/>
+                    <a16:rowId xmlns:a16="http://schemas.microsoft.com/office/drawing/2014/main" xmlns="" val="2803861091"/>
                   </a:ext>
                 </a:extLst>
               </a:tr>
-              <a:tr h="370840">
-                <a:tc>
-                  <a:txBody>
-                    <a:bodyPr/>
-                    <a:lstStyle/>
-                    <a:p>
-                      <a:pPr indent="180340" algn="just">
-                        <a:spcAft>
-                          <a:spcPts val="0"/>
-                        </a:spcAft>
-                      </a:pPr>
-                      <a:r>
-                        <a:rPr lang="lt-LT" sz="1800">
+              <a:tr h="497644">
+                <a:tc>
+                  <a:txBody>
+                    <a:bodyPr/>
+                    <a:lstStyle/>
+                    <a:p>
+                      <a:pPr indent="180340" algn="l">
+                        <a:spcAft>
+                          <a:spcPts val="0"/>
+                        </a:spcAft>
+                      </a:pPr>
+                      <a:r>
+                        <a:rPr lang="lt-LT" sz="1800" dirty="0">
                           <a:solidFill>
-                            <a:srgbClr val="5B9BD5"/>
+                            <a:schemeClr val="bg1"/>
                           </a:solidFill>
                           <a:effectLst/>
                           <a:latin typeface="+mj-lt"/>
@@ -7371,46 +7289,39 @@
                         </a:rPr>
                         <a:t>Testuotojas  "Biudžeto suvestinė" lange paspaudžia ant "Išlaidų paieška"</a:t>
                       </a:r>
-                      <a:endParaRPr lang="en-GB" sz="1200">
+                      <a:endParaRPr lang="en-GB" sz="1200" dirty="0">
+                        <a:solidFill>
+                          <a:schemeClr val="bg1"/>
+                        </a:solidFill>
                         <a:effectLst/>
                         <a:latin typeface="+mj-lt"/>
                         <a:ea typeface="Times New Roman" panose="02020603050405020304" pitchFamily="18" charset="0"/>
                       </a:endParaRPr>
                     </a:p>
                   </a:txBody>
-                  <a:tcPr marL="68580" marR="68580" marT="0" marB="0"/>
-                </a:tc>
-                <a:tc>
-                  <a:txBody>
-                    <a:bodyPr/>
-                    <a:lstStyle/>
-                    <a:p>
-                      <a:endParaRPr lang="en-GB"/>
-                    </a:p>
-                  </a:txBody>
-                  <a:tcPr/>
+                  <a:tcPr marL="68580" marR="68580" marT="0" marB="0" anchor="ctr"/>
                 </a:tc>
                 <a:extLst>
                   <a:ext uri="{0D108BD9-81ED-4DB2-BD59-A6C34878D82A}">
-                    <a16:rowId xmlns:a16="http://schemas.microsoft.com/office/drawing/2014/main" val="1952897644"/>
+                    <a16:rowId xmlns:a16="http://schemas.microsoft.com/office/drawing/2014/main" xmlns="" val="1952897644"/>
                   </a:ext>
                 </a:extLst>
               </a:tr>
-              <a:tr h="370840">
-                <a:tc>
-                  <a:txBody>
-                    <a:bodyPr/>
-                    <a:lstStyle/>
-                    <a:p>
-                      <a:pPr indent="180340" algn="just">
-                        <a:spcAft>
-                          <a:spcPts val="0"/>
-                        </a:spcAft>
-                      </a:pPr>
-                      <a:r>
-                        <a:rPr lang="lt-LT" sz="1800">
+              <a:tr h="497644">
+                <a:tc>
+                  <a:txBody>
+                    <a:bodyPr/>
+                    <a:lstStyle/>
+                    <a:p>
+                      <a:pPr indent="180340" algn="l">
+                        <a:spcAft>
+                          <a:spcPts val="0"/>
+                        </a:spcAft>
+                      </a:pPr>
+                      <a:r>
+                        <a:rPr lang="lt-LT" sz="1800" dirty="0">
                           <a:solidFill>
-                            <a:srgbClr val="5B9BD5"/>
+                            <a:schemeClr val="bg1"/>
                           </a:solidFill>
                           <a:effectLst/>
                           <a:latin typeface="+mj-lt"/>
@@ -7418,38 +7329,31 @@
                         </a:rPr>
                         <a:t>Testuotojas suveda išlaidos, kurios nėra pastabą</a:t>
                       </a:r>
-                      <a:endParaRPr lang="en-GB" sz="1200">
+                      <a:endParaRPr lang="en-GB" sz="1200" dirty="0">
+                        <a:solidFill>
+                          <a:schemeClr val="bg1"/>
+                        </a:solidFill>
                         <a:effectLst/>
                         <a:latin typeface="+mj-lt"/>
                         <a:ea typeface="Times New Roman" panose="02020603050405020304" pitchFamily="18" charset="0"/>
                       </a:endParaRPr>
                     </a:p>
                   </a:txBody>
-                  <a:tcPr marL="68580" marR="68580" marT="0" marB="0"/>
-                </a:tc>
-                <a:tc>
-                  <a:txBody>
-                    <a:bodyPr/>
-                    <a:lstStyle/>
-                    <a:p>
-                      <a:endParaRPr lang="en-GB"/>
-                    </a:p>
-                  </a:txBody>
-                  <a:tcPr/>
+                  <a:tcPr marL="68580" marR="68580" marT="0" marB="0" anchor="ctr"/>
                 </a:tc>
                 <a:extLst>
                   <a:ext uri="{0D108BD9-81ED-4DB2-BD59-A6C34878D82A}">
-                    <a16:rowId xmlns:a16="http://schemas.microsoft.com/office/drawing/2014/main" val="701881225"/>
+                    <a16:rowId xmlns:a16="http://schemas.microsoft.com/office/drawing/2014/main" xmlns="" val="701881225"/>
                   </a:ext>
                 </a:extLst>
               </a:tr>
-              <a:tr h="370840">
-                <a:tc>
-                  <a:txBody>
-                    <a:bodyPr/>
-                    <a:lstStyle/>
-                    <a:p>
-                      <a:pPr indent="180340" algn="just">
+              <a:tr h="497644">
+                <a:tc>
+                  <a:txBody>
+                    <a:bodyPr/>
+                    <a:lstStyle/>
+                    <a:p>
+                      <a:pPr indent="180340" algn="l">
                         <a:spcAft>
                           <a:spcPts val="0"/>
                         </a:spcAft>
@@ -7469,7 +7373,7 @@
                       </a:endParaRPr>
                     </a:p>
                   </a:txBody>
-                  <a:tcPr marL="68580" marR="68580" marT="0" marB="0">
+                  <a:tcPr marL="68580" marR="68580" marT="0" marB="0" anchor="ctr">
                     <a:solidFill>
                       <a:schemeClr val="accent4">
                         <a:lumMod val="60000"/>
@@ -7478,19 +7382,9 @@
                     </a:solidFill>
                   </a:tcPr>
                 </a:tc>
-                <a:tc>
-                  <a:txBody>
-                    <a:bodyPr/>
-                    <a:lstStyle/>
-                    <a:p>
-                      <a:endParaRPr lang="en-GB" dirty="0"/>
-                    </a:p>
-                  </a:txBody>
-                  <a:tcPr/>
-                </a:tc>
                 <a:extLst>
                   <a:ext uri="{0D108BD9-81ED-4DB2-BD59-A6C34878D82A}">
-                    <a16:rowId xmlns:a16="http://schemas.microsoft.com/office/drawing/2014/main" val="390483671"/>
+                    <a16:rowId xmlns:a16="http://schemas.microsoft.com/office/drawing/2014/main" xmlns="" val="390483671"/>
                   </a:ext>
                 </a:extLst>
               </a:tr>
@@ -7538,7 +7432,12 @@
             <p:ph type="title"/>
           </p:nvPr>
         </p:nvSpPr>
-        <p:spPr/>
+        <p:spPr>
+          <a:xfrm>
+            <a:off x="801321" y="64477"/>
+            <a:ext cx="10131425" cy="1456267"/>
+          </a:xfrm>
+        </p:spPr>
         <p:txBody>
           <a:bodyPr/>
           <a:lstStyle/>
@@ -7576,8 +7475,8 @@
         </p:blipFill>
         <p:spPr bwMode="auto">
           <a:xfrm>
-            <a:off x="1441988" y="1981200"/>
-            <a:ext cx="8850092" cy="4638569"/>
+            <a:off x="1121653" y="1248508"/>
+            <a:ext cx="9490759" cy="5309715"/>
           </a:xfrm>
           <a:prstGeom prst="rect">
             <a:avLst/>
@@ -7630,8 +7529,8 @@
         </p:nvSpPr>
         <p:spPr>
           <a:xfrm>
-            <a:off x="277792" y="609600"/>
-            <a:ext cx="5324353" cy="1612740"/>
+            <a:off x="470681" y="451338"/>
+            <a:ext cx="9763023" cy="718038"/>
           </a:xfrm>
         </p:spPr>
         <p:txBody>
@@ -7653,6 +7552,10 @@
               <a:rPr lang="lt-LT" dirty="0"/>
               <a:t>planas ir scenarijai</a:t>
             </a:r>
+            <a:r>
+              <a:rPr lang="en-GB" b="1" dirty="0"/>
+              <a:t/>
+            </a:r>
             <a:br>
               <a:rPr lang="en-GB" b="1" dirty="0"/>
             </a:br>
@@ -7670,14 +7573,14 @@
             <p:ph idx="1"/>
             <p:extLst>
               <p:ext uri="{D42A27DB-BD31-4B8C-83A1-F6EECF244321}">
-                <p14:modId xmlns:p14="http://schemas.microsoft.com/office/powerpoint/2010/main" val="44304942"/>
+                <p14:modId xmlns:p14="http://schemas.microsoft.com/office/powerpoint/2010/main" val="2100440743"/>
               </p:ext>
             </p:extLst>
           </p:nvPr>
         </p:nvGraphicFramePr>
         <p:xfrm>
-          <a:off x="4541520" y="91440"/>
-          <a:ext cx="7650480" cy="6766560"/>
+          <a:off x="470681" y="953087"/>
+          <a:ext cx="11275842" cy="5795992"/>
         </p:xfrm>
         <a:graphic>
           <a:graphicData uri="http://schemas.openxmlformats.org/drawingml/2006/table">
@@ -7686,28 +7589,21 @@
                 <a:tableStyleId>{21E4AEA4-8DFA-4A89-87EB-49C32662AFE0}</a:tableStyleId>
               </a:tblPr>
               <a:tblGrid>
-                <a:gridCol w="5781040">
+                <a:gridCol w="11275842">
                   <a:extLst>
                     <a:ext uri="{9D8B030D-6E8A-4147-A177-3AD203B41FA5}">
-                      <a16:colId xmlns:a16="http://schemas.microsoft.com/office/drawing/2014/main" val="828623788"/>
-                    </a:ext>
-                  </a:extLst>
-                </a:gridCol>
-                <a:gridCol w="1869440">
-                  <a:extLst>
-                    <a:ext uri="{9D8B030D-6E8A-4147-A177-3AD203B41FA5}">
-                      <a16:colId xmlns:a16="http://schemas.microsoft.com/office/drawing/2014/main" val="1504264963"/>
+                      <a16:colId xmlns:a16="http://schemas.microsoft.com/office/drawing/2014/main" xmlns="" val="828623788"/>
                     </a:ext>
                   </a:extLst>
                 </a:gridCol>
               </a:tblGrid>
-              <a:tr h="190485">
-                <a:tc gridSpan="2">
-                  <a:txBody>
-                    <a:bodyPr/>
-                    <a:lstStyle/>
-                    <a:p>
-                      <a:pPr indent="180340" algn="ctr">
+              <a:tr h="317777">
+                <a:tc>
+                  <a:txBody>
+                    <a:bodyPr/>
+                    <a:lstStyle/>
+                    <a:p>
+                      <a:pPr indent="180340" algn="l">
                         <a:spcAft>
                           <a:spcPts val="0"/>
                         </a:spcAft>
@@ -7725,75 +7621,43 @@
                       </a:endParaRPr>
                     </a:p>
                   </a:txBody>
-                  <a:tcPr marL="68580" marR="68580" marT="0" marB="0"/>
-                </a:tc>
-                <a:tc hMerge="1">
-                  <a:txBody>
-                    <a:bodyPr/>
-                    <a:lstStyle/>
-                    <a:p>
-                      <a:pPr indent="180340" algn="ctr">
-                        <a:spcAft>
-                          <a:spcPts val="0"/>
-                        </a:spcAft>
-                      </a:pPr>
-                      <a:endParaRPr lang="en-GB" sz="1000" dirty="0">
-                        <a:effectLst/>
-                        <a:latin typeface="Times New Roman" panose="02020603050405020304" pitchFamily="18" charset="0"/>
-                        <a:ea typeface="Times New Roman" panose="02020603050405020304" pitchFamily="18" charset="0"/>
-                      </a:endParaRPr>
-                    </a:p>
-                  </a:txBody>
-                  <a:tcPr marL="68580" marR="68580" marT="0" marB="0"/>
+                  <a:tcPr marL="68580" marR="68580" marT="0" marB="0" anchor="ctr"/>
                 </a:tc>
                 <a:extLst>
                   <a:ext uri="{0D108BD9-81ED-4DB2-BD59-A6C34878D82A}">
-                    <a16:rowId xmlns:a16="http://schemas.microsoft.com/office/drawing/2014/main" val="1454987209"/>
+                    <a16:rowId xmlns:a16="http://schemas.microsoft.com/office/drawing/2014/main" xmlns="" val="1454987209"/>
                   </a:ext>
                 </a:extLst>
               </a:tr>
-              <a:tr h="202777">
-                <a:tc>
-                  <a:txBody>
-                    <a:bodyPr/>
-                    <a:lstStyle/>
-                    <a:p>
-                      <a:r>
-                        <a:rPr lang="lt-LT" sz="2000" dirty="0"/>
-                        <a:t>U_05</a:t>
-                      </a:r>
-                      <a:endParaRPr lang="en-GB" sz="2000" dirty="0"/>
-                    </a:p>
-                  </a:txBody>
-                  <a:tcPr/>
-                </a:tc>
-                <a:tc>
-                  <a:txBody>
-                    <a:bodyPr/>
-                    <a:lstStyle/>
-                    <a:p>
-                      <a:r>
-                        <a:rPr lang="lt-LT" dirty="0"/>
-                        <a:t>Testo įvertinimai</a:t>
-                      </a:r>
-                      <a:endParaRPr lang="en-GB" dirty="0"/>
-                    </a:p>
-                  </a:txBody>
-                  <a:tcPr/>
+              <a:tr h="393783">
+                <a:tc>
+                  <a:txBody>
+                    <a:bodyPr/>
+                    <a:lstStyle/>
+                    <a:p>
+                      <a:pPr algn="l"/>
+                      <a:r>
+                        <a:rPr lang="lt-LT" sz="1600" dirty="0" smtClean="0"/>
+                        <a:t>TC_05</a:t>
+                      </a:r>
+                      <a:endParaRPr lang="en-GB" sz="1600" dirty="0"/>
+                    </a:p>
+                  </a:txBody>
+                  <a:tcPr anchor="ctr"/>
                 </a:tc>
                 <a:extLst>
                   <a:ext uri="{0D108BD9-81ED-4DB2-BD59-A6C34878D82A}">
-                    <a16:rowId xmlns:a16="http://schemas.microsoft.com/office/drawing/2014/main" val="3285020014"/>
+                    <a16:rowId xmlns:a16="http://schemas.microsoft.com/office/drawing/2014/main" xmlns="" val="3285020014"/>
                   </a:ext>
                 </a:extLst>
               </a:tr>
-              <a:tr h="202777">
-                <a:tc>
-                  <a:txBody>
-                    <a:bodyPr/>
-                    <a:lstStyle/>
-                    <a:p>
-                      <a:pPr indent="180340" algn="just">
+              <a:tr h="317777">
+                <a:tc>
+                  <a:txBody>
+                    <a:bodyPr/>
+                    <a:lstStyle/>
+                    <a:p>
+                      <a:pPr indent="180340" algn="l">
                         <a:spcAft>
                           <a:spcPts val="0"/>
                         </a:spcAft>
@@ -7811,7 +7675,7 @@
                       </a:endParaRPr>
                     </a:p>
                   </a:txBody>
-                  <a:tcPr marL="68580" marR="68580" marT="0" marB="0">
+                  <a:tcPr marL="68580" marR="68580" marT="0" marB="0" anchor="ctr">
                     <a:solidFill>
                       <a:schemeClr val="tx1">
                         <a:lumMod val="65000"/>
@@ -7819,29 +7683,19 @@
                     </a:solidFill>
                   </a:tcPr>
                 </a:tc>
-                <a:tc>
-                  <a:txBody>
-                    <a:bodyPr/>
-                    <a:lstStyle/>
-                    <a:p>
-                      <a:endParaRPr lang="en-GB"/>
-                    </a:p>
-                  </a:txBody>
-                  <a:tcPr/>
-                </a:tc>
                 <a:extLst>
                   <a:ext uri="{0D108BD9-81ED-4DB2-BD59-A6C34878D82A}">
-                    <a16:rowId xmlns:a16="http://schemas.microsoft.com/office/drawing/2014/main" val="565434023"/>
+                    <a16:rowId xmlns:a16="http://schemas.microsoft.com/office/drawing/2014/main" xmlns="" val="565434023"/>
                   </a:ext>
                 </a:extLst>
               </a:tr>
-              <a:tr h="202777">
-                <a:tc>
-                  <a:txBody>
-                    <a:bodyPr/>
-                    <a:lstStyle/>
-                    <a:p>
-                      <a:pPr indent="180340" algn="just">
+              <a:tr h="317777">
+                <a:tc>
+                  <a:txBody>
+                    <a:bodyPr/>
+                    <a:lstStyle/>
+                    <a:p>
+                      <a:pPr indent="180340" algn="l">
                         <a:spcAft>
                           <a:spcPts val="0"/>
                         </a:spcAft>
@@ -7859,31 +7713,21 @@
                       </a:endParaRPr>
                     </a:p>
                   </a:txBody>
-                  <a:tcPr marL="68580" marR="68580" marT="0" marB="0"/>
-                </a:tc>
-                <a:tc>
-                  <a:txBody>
-                    <a:bodyPr/>
-                    <a:lstStyle/>
-                    <a:p>
-                      <a:endParaRPr lang="en-GB"/>
-                    </a:p>
-                  </a:txBody>
-                  <a:tcPr/>
+                  <a:tcPr marL="68580" marR="68580" marT="0" marB="0" anchor="ctr"/>
                 </a:tc>
                 <a:extLst>
                   <a:ext uri="{0D108BD9-81ED-4DB2-BD59-A6C34878D82A}">
-                    <a16:rowId xmlns:a16="http://schemas.microsoft.com/office/drawing/2014/main" val="1614685832"/>
+                    <a16:rowId xmlns:a16="http://schemas.microsoft.com/office/drawing/2014/main" xmlns="" val="1614685832"/>
                   </a:ext>
                 </a:extLst>
               </a:tr>
-              <a:tr h="202777">
-                <a:tc>
-                  <a:txBody>
-                    <a:bodyPr/>
-                    <a:lstStyle/>
-                    <a:p>
-                      <a:pPr indent="180340" algn="just">
+              <a:tr h="317777">
+                <a:tc>
+                  <a:txBody>
+                    <a:bodyPr/>
+                    <a:lstStyle/>
+                    <a:p>
+                      <a:pPr indent="180340" algn="l">
                         <a:spcAft>
                           <a:spcPts val="0"/>
                         </a:spcAft>
@@ -7901,31 +7745,21 @@
                       </a:endParaRPr>
                     </a:p>
                   </a:txBody>
-                  <a:tcPr marL="68580" marR="68580" marT="0" marB="0"/>
-                </a:tc>
-                <a:tc>
-                  <a:txBody>
-                    <a:bodyPr/>
-                    <a:lstStyle/>
-                    <a:p>
-                      <a:endParaRPr lang="en-GB"/>
-                    </a:p>
-                  </a:txBody>
-                  <a:tcPr/>
+                  <a:tcPr marL="68580" marR="68580" marT="0" marB="0" anchor="ctr"/>
                 </a:tc>
                 <a:extLst>
                   <a:ext uri="{0D108BD9-81ED-4DB2-BD59-A6C34878D82A}">
-                    <a16:rowId xmlns:a16="http://schemas.microsoft.com/office/drawing/2014/main" val="114772030"/>
+                    <a16:rowId xmlns:a16="http://schemas.microsoft.com/office/drawing/2014/main" xmlns="" val="114772030"/>
                   </a:ext>
                 </a:extLst>
               </a:tr>
-              <a:tr h="202777">
-                <a:tc>
-                  <a:txBody>
-                    <a:bodyPr/>
-                    <a:lstStyle/>
-                    <a:p>
-                      <a:pPr indent="180340" algn="just">
+              <a:tr h="317777">
+                <a:tc>
+                  <a:txBody>
+                    <a:bodyPr/>
+                    <a:lstStyle/>
+                    <a:p>
+                      <a:pPr indent="180340" algn="l">
                         <a:spcAft>
                           <a:spcPts val="0"/>
                         </a:spcAft>
@@ -7943,7 +7777,7 @@
                       </a:endParaRPr>
                     </a:p>
                   </a:txBody>
-                  <a:tcPr marL="68580" marR="68580" marT="0" marB="0">
+                  <a:tcPr marL="68580" marR="68580" marT="0" marB="0" anchor="ctr">
                     <a:solidFill>
                       <a:schemeClr val="accent4">
                         <a:lumMod val="60000"/>
@@ -7952,29 +7786,19 @@
                     </a:solidFill>
                   </a:tcPr>
                 </a:tc>
-                <a:tc>
-                  <a:txBody>
-                    <a:bodyPr/>
-                    <a:lstStyle/>
-                    <a:p>
-                      <a:endParaRPr lang="en-GB"/>
-                    </a:p>
-                  </a:txBody>
-                  <a:tcPr/>
-                </a:tc>
                 <a:extLst>
                   <a:ext uri="{0D108BD9-81ED-4DB2-BD59-A6C34878D82A}">
-                    <a16:rowId xmlns:a16="http://schemas.microsoft.com/office/drawing/2014/main" val="437744233"/>
+                    <a16:rowId xmlns:a16="http://schemas.microsoft.com/office/drawing/2014/main" xmlns="" val="437744233"/>
                   </a:ext>
                 </a:extLst>
               </a:tr>
-              <a:tr h="202777">
-                <a:tc>
-                  <a:txBody>
-                    <a:bodyPr/>
-                    <a:lstStyle/>
-                    <a:p>
-                      <a:pPr indent="180340" algn="just">
+              <a:tr h="317777">
+                <a:tc>
+                  <a:txBody>
+                    <a:bodyPr/>
+                    <a:lstStyle/>
+                    <a:p>
+                      <a:pPr indent="180340" algn="l">
                         <a:spcAft>
                           <a:spcPts val="0"/>
                         </a:spcAft>
@@ -7992,7 +7816,7 @@
                       </a:endParaRPr>
                     </a:p>
                   </a:txBody>
-                  <a:tcPr marL="68580" marR="68580" marT="0" marB="0">
+                  <a:tcPr marL="68580" marR="68580" marT="0" marB="0" anchor="ctr">
                     <a:solidFill>
                       <a:schemeClr val="tx1">
                         <a:lumMod val="65000"/>
@@ -8000,29 +7824,19 @@
                     </a:solidFill>
                   </a:tcPr>
                 </a:tc>
-                <a:tc>
-                  <a:txBody>
-                    <a:bodyPr/>
-                    <a:lstStyle/>
-                    <a:p>
-                      <a:endParaRPr lang="en-GB"/>
-                    </a:p>
-                  </a:txBody>
-                  <a:tcPr/>
-                </a:tc>
                 <a:extLst>
                   <a:ext uri="{0D108BD9-81ED-4DB2-BD59-A6C34878D82A}">
-                    <a16:rowId xmlns:a16="http://schemas.microsoft.com/office/drawing/2014/main" val="2781738745"/>
+                    <a16:rowId xmlns:a16="http://schemas.microsoft.com/office/drawing/2014/main" xmlns="" val="2781738745"/>
                   </a:ext>
                 </a:extLst>
               </a:tr>
-              <a:tr h="202777">
-                <a:tc>
-                  <a:txBody>
-                    <a:bodyPr/>
-                    <a:lstStyle/>
-                    <a:p>
-                      <a:pPr indent="180340" algn="just">
+              <a:tr h="317777">
+                <a:tc>
+                  <a:txBody>
+                    <a:bodyPr/>
+                    <a:lstStyle/>
+                    <a:p>
+                      <a:pPr indent="180340" algn="l">
                         <a:spcAft>
                           <a:spcPts val="0"/>
                         </a:spcAft>
@@ -8040,31 +7854,21 @@
                       </a:endParaRPr>
                     </a:p>
                   </a:txBody>
-                  <a:tcPr marL="68580" marR="68580" marT="0" marB="0"/>
-                </a:tc>
-                <a:tc>
-                  <a:txBody>
-                    <a:bodyPr/>
-                    <a:lstStyle/>
-                    <a:p>
-                      <a:endParaRPr lang="en-GB"/>
-                    </a:p>
-                  </a:txBody>
-                  <a:tcPr/>
+                  <a:tcPr marL="68580" marR="68580" marT="0" marB="0" anchor="ctr"/>
                 </a:tc>
                 <a:extLst>
                   <a:ext uri="{0D108BD9-81ED-4DB2-BD59-A6C34878D82A}">
-                    <a16:rowId xmlns:a16="http://schemas.microsoft.com/office/drawing/2014/main" val="2398078174"/>
+                    <a16:rowId xmlns:a16="http://schemas.microsoft.com/office/drawing/2014/main" xmlns="" val="2398078174"/>
                   </a:ext>
                 </a:extLst>
               </a:tr>
-              <a:tr h="202777">
-                <a:tc>
-                  <a:txBody>
-                    <a:bodyPr/>
-                    <a:lstStyle/>
-                    <a:p>
-                      <a:pPr indent="180340" algn="just">
+              <a:tr h="317777">
+                <a:tc>
+                  <a:txBody>
+                    <a:bodyPr/>
+                    <a:lstStyle/>
+                    <a:p>
+                      <a:pPr indent="180340" algn="l">
                         <a:spcAft>
                           <a:spcPts val="0"/>
                         </a:spcAft>
@@ -8082,31 +7886,21 @@
                       </a:endParaRPr>
                     </a:p>
                   </a:txBody>
-                  <a:tcPr marL="68580" marR="68580" marT="0" marB="0"/>
-                </a:tc>
-                <a:tc>
-                  <a:txBody>
-                    <a:bodyPr/>
-                    <a:lstStyle/>
-                    <a:p>
-                      <a:endParaRPr lang="en-GB"/>
-                    </a:p>
-                  </a:txBody>
-                  <a:tcPr/>
+                  <a:tcPr marL="68580" marR="68580" marT="0" marB="0" anchor="ctr"/>
                 </a:tc>
                 <a:extLst>
                   <a:ext uri="{0D108BD9-81ED-4DB2-BD59-A6C34878D82A}">
-                    <a16:rowId xmlns:a16="http://schemas.microsoft.com/office/drawing/2014/main" val="4216742931"/>
+                    <a16:rowId xmlns:a16="http://schemas.microsoft.com/office/drawing/2014/main" xmlns="" val="4216742931"/>
                   </a:ext>
                 </a:extLst>
               </a:tr>
-              <a:tr h="358154">
-                <a:tc>
-                  <a:txBody>
-                    <a:bodyPr/>
-                    <a:lstStyle/>
-                    <a:p>
-                      <a:pPr indent="180340" algn="just">
+              <a:tr h="317777">
+                <a:tc>
+                  <a:txBody>
+                    <a:bodyPr/>
+                    <a:lstStyle/>
+                    <a:p>
+                      <a:pPr indent="180340" algn="l">
                         <a:spcAft>
                           <a:spcPts val="0"/>
                         </a:spcAft>
@@ -8124,7 +7918,7 @@
                       </a:endParaRPr>
                     </a:p>
                   </a:txBody>
-                  <a:tcPr marL="68580" marR="68580" marT="0" marB="0">
+                  <a:tcPr marL="68580" marR="68580" marT="0" marB="0" anchor="ctr">
                     <a:solidFill>
                       <a:schemeClr val="accent4">
                         <a:lumMod val="60000"/>
@@ -8133,29 +7927,19 @@
                     </a:solidFill>
                   </a:tcPr>
                 </a:tc>
-                <a:tc>
-                  <a:txBody>
-                    <a:bodyPr/>
-                    <a:lstStyle/>
-                    <a:p>
-                      <a:endParaRPr lang="en-GB"/>
-                    </a:p>
-                  </a:txBody>
-                  <a:tcPr/>
-                </a:tc>
                 <a:extLst>
                   <a:ext uri="{0D108BD9-81ED-4DB2-BD59-A6C34878D82A}">
-                    <a16:rowId xmlns:a16="http://schemas.microsoft.com/office/drawing/2014/main" val="493859795"/>
+                    <a16:rowId xmlns:a16="http://schemas.microsoft.com/office/drawing/2014/main" xmlns="" val="493859795"/>
                   </a:ext>
                 </a:extLst>
               </a:tr>
-              <a:tr h="202777">
-                <a:tc>
-                  <a:txBody>
-                    <a:bodyPr/>
-                    <a:lstStyle/>
-                    <a:p>
-                      <a:pPr indent="180340" algn="just">
+              <a:tr h="317777">
+                <a:tc>
+                  <a:txBody>
+                    <a:bodyPr/>
+                    <a:lstStyle/>
+                    <a:p>
+                      <a:pPr indent="180340" algn="l">
                         <a:spcAft>
                           <a:spcPts val="0"/>
                         </a:spcAft>
@@ -8173,7 +7957,7 @@
                       </a:endParaRPr>
                     </a:p>
                   </a:txBody>
-                  <a:tcPr marL="68580" marR="68580" marT="0" marB="0">
+                  <a:tcPr marL="68580" marR="68580" marT="0" marB="0" anchor="ctr">
                     <a:solidFill>
                       <a:schemeClr val="tx1">
                         <a:lumMod val="65000"/>
@@ -8181,29 +7965,19 @@
                     </a:solidFill>
                   </a:tcPr>
                 </a:tc>
-                <a:tc>
-                  <a:txBody>
-                    <a:bodyPr/>
-                    <a:lstStyle/>
-                    <a:p>
-                      <a:endParaRPr lang="en-GB"/>
-                    </a:p>
-                  </a:txBody>
-                  <a:tcPr/>
-                </a:tc>
                 <a:extLst>
                   <a:ext uri="{0D108BD9-81ED-4DB2-BD59-A6C34878D82A}">
-                    <a16:rowId xmlns:a16="http://schemas.microsoft.com/office/drawing/2014/main" val="181568047"/>
+                    <a16:rowId xmlns:a16="http://schemas.microsoft.com/office/drawing/2014/main" xmlns="" val="181568047"/>
                   </a:ext>
                 </a:extLst>
               </a:tr>
-              <a:tr h="202777">
-                <a:tc>
-                  <a:txBody>
-                    <a:bodyPr/>
-                    <a:lstStyle/>
-                    <a:p>
-                      <a:pPr indent="180340" algn="just">
+              <a:tr h="317777">
+                <a:tc>
+                  <a:txBody>
+                    <a:bodyPr/>
+                    <a:lstStyle/>
+                    <a:p>
+                      <a:pPr indent="180340" algn="l">
                         <a:spcAft>
                           <a:spcPts val="0"/>
                         </a:spcAft>
@@ -8221,31 +7995,21 @@
                       </a:endParaRPr>
                     </a:p>
                   </a:txBody>
-                  <a:tcPr marL="68580" marR="68580" marT="0" marB="0"/>
-                </a:tc>
-                <a:tc>
-                  <a:txBody>
-                    <a:bodyPr/>
-                    <a:lstStyle/>
-                    <a:p>
-                      <a:endParaRPr lang="en-GB"/>
-                    </a:p>
-                  </a:txBody>
-                  <a:tcPr/>
+                  <a:tcPr marL="68580" marR="68580" marT="0" marB="0" anchor="ctr"/>
                 </a:tc>
                 <a:extLst>
                   <a:ext uri="{0D108BD9-81ED-4DB2-BD59-A6C34878D82A}">
-                    <a16:rowId xmlns:a16="http://schemas.microsoft.com/office/drawing/2014/main" val="2660613907"/>
+                    <a16:rowId xmlns:a16="http://schemas.microsoft.com/office/drawing/2014/main" xmlns="" val="2660613907"/>
                   </a:ext>
                 </a:extLst>
               </a:tr>
-              <a:tr h="202777">
-                <a:tc>
-                  <a:txBody>
-                    <a:bodyPr/>
-                    <a:lstStyle/>
-                    <a:p>
-                      <a:pPr indent="180340" algn="just">
+              <a:tr h="317777">
+                <a:tc>
+                  <a:txBody>
+                    <a:bodyPr/>
+                    <a:lstStyle/>
+                    <a:p>
+                      <a:pPr indent="180340" algn="l">
                         <a:spcAft>
                           <a:spcPts val="0"/>
                         </a:spcAft>
@@ -8263,31 +8027,21 @@
                       </a:endParaRPr>
                     </a:p>
                   </a:txBody>
-                  <a:tcPr marL="68580" marR="68580" marT="0" marB="0"/>
-                </a:tc>
-                <a:tc>
-                  <a:txBody>
-                    <a:bodyPr/>
-                    <a:lstStyle/>
-                    <a:p>
-                      <a:endParaRPr lang="en-GB"/>
-                    </a:p>
-                  </a:txBody>
-                  <a:tcPr/>
+                  <a:tcPr marL="68580" marR="68580" marT="0" marB="0" anchor="ctr"/>
                 </a:tc>
                 <a:extLst>
                   <a:ext uri="{0D108BD9-81ED-4DB2-BD59-A6C34878D82A}">
-                    <a16:rowId xmlns:a16="http://schemas.microsoft.com/office/drawing/2014/main" val="2338251320"/>
+                    <a16:rowId xmlns:a16="http://schemas.microsoft.com/office/drawing/2014/main" xmlns="" val="2338251320"/>
                   </a:ext>
                 </a:extLst>
               </a:tr>
-              <a:tr h="202777">
-                <a:tc>
-                  <a:txBody>
-                    <a:bodyPr/>
-                    <a:lstStyle/>
-                    <a:p>
-                      <a:pPr indent="180340" algn="just">
+              <a:tr h="317777">
+                <a:tc>
+                  <a:txBody>
+                    <a:bodyPr/>
+                    <a:lstStyle/>
+                    <a:p>
+                      <a:pPr indent="180340" algn="l">
                         <a:spcAft>
                           <a:spcPts val="0"/>
                         </a:spcAft>
@@ -8305,7 +8059,7 @@
                       </a:endParaRPr>
                     </a:p>
                   </a:txBody>
-                  <a:tcPr marL="68580" marR="68580" marT="0" marB="0">
+                  <a:tcPr marL="68580" marR="68580" marT="0" marB="0" anchor="ctr">
                     <a:solidFill>
                       <a:schemeClr val="accent4">
                         <a:lumMod val="60000"/>
@@ -8314,29 +8068,19 @@
                     </a:solidFill>
                   </a:tcPr>
                 </a:tc>
-                <a:tc>
-                  <a:txBody>
-                    <a:bodyPr/>
-                    <a:lstStyle/>
-                    <a:p>
-                      <a:endParaRPr lang="en-GB"/>
-                    </a:p>
-                  </a:txBody>
-                  <a:tcPr/>
-                </a:tc>
                 <a:extLst>
                   <a:ext uri="{0D108BD9-81ED-4DB2-BD59-A6C34878D82A}">
-                    <a16:rowId xmlns:a16="http://schemas.microsoft.com/office/drawing/2014/main" val="1181748508"/>
+                    <a16:rowId xmlns:a16="http://schemas.microsoft.com/office/drawing/2014/main" xmlns="" val="1181748508"/>
                   </a:ext>
                 </a:extLst>
               </a:tr>
-              <a:tr h="202777">
-                <a:tc>
-                  <a:txBody>
-                    <a:bodyPr/>
-                    <a:lstStyle/>
-                    <a:p>
-                      <a:pPr indent="180340" algn="just">
+              <a:tr h="317777">
+                <a:tc>
+                  <a:txBody>
+                    <a:bodyPr/>
+                    <a:lstStyle/>
+                    <a:p>
+                      <a:pPr indent="180340" algn="l">
                         <a:spcAft>
                           <a:spcPts val="0"/>
                         </a:spcAft>
@@ -8354,7 +8098,7 @@
                       </a:endParaRPr>
                     </a:p>
                   </a:txBody>
-                  <a:tcPr marL="68580" marR="68580" marT="0" marB="0">
+                  <a:tcPr marL="68580" marR="68580" marT="0" marB="0" anchor="ctr">
                     <a:solidFill>
                       <a:schemeClr val="tx1">
                         <a:lumMod val="65000"/>
@@ -8362,29 +8106,19 @@
                     </a:solidFill>
                   </a:tcPr>
                 </a:tc>
-                <a:tc>
-                  <a:txBody>
-                    <a:bodyPr/>
-                    <a:lstStyle/>
-                    <a:p>
-                      <a:endParaRPr lang="en-GB"/>
-                    </a:p>
-                  </a:txBody>
-                  <a:tcPr/>
-                </a:tc>
                 <a:extLst>
                   <a:ext uri="{0D108BD9-81ED-4DB2-BD59-A6C34878D82A}">
-                    <a16:rowId xmlns:a16="http://schemas.microsoft.com/office/drawing/2014/main" val="1348005952"/>
+                    <a16:rowId xmlns:a16="http://schemas.microsoft.com/office/drawing/2014/main" xmlns="" val="1348005952"/>
                   </a:ext>
                 </a:extLst>
               </a:tr>
-              <a:tr h="202777">
-                <a:tc>
-                  <a:txBody>
-                    <a:bodyPr/>
-                    <a:lstStyle/>
-                    <a:p>
-                      <a:pPr indent="180340" algn="just">
+              <a:tr h="317777">
+                <a:tc>
+                  <a:txBody>
+                    <a:bodyPr/>
+                    <a:lstStyle/>
+                    <a:p>
+                      <a:pPr indent="180340" algn="l">
                         <a:spcAft>
                           <a:spcPts val="0"/>
                         </a:spcAft>
@@ -8402,31 +8136,21 @@
                       </a:endParaRPr>
                     </a:p>
                   </a:txBody>
-                  <a:tcPr marL="68580" marR="68580" marT="0" marB="0"/>
-                </a:tc>
-                <a:tc>
-                  <a:txBody>
-                    <a:bodyPr/>
-                    <a:lstStyle/>
-                    <a:p>
-                      <a:endParaRPr lang="en-GB"/>
-                    </a:p>
-                  </a:txBody>
-                  <a:tcPr/>
+                  <a:tcPr marL="68580" marR="68580" marT="0" marB="0" anchor="ctr"/>
                 </a:tc>
                 <a:extLst>
                   <a:ext uri="{0D108BD9-81ED-4DB2-BD59-A6C34878D82A}">
-                    <a16:rowId xmlns:a16="http://schemas.microsoft.com/office/drawing/2014/main" val="2375122426"/>
+                    <a16:rowId xmlns:a16="http://schemas.microsoft.com/office/drawing/2014/main" xmlns="" val="2375122426"/>
                   </a:ext>
                 </a:extLst>
               </a:tr>
-              <a:tr h="202777">
-                <a:tc>
-                  <a:txBody>
-                    <a:bodyPr/>
-                    <a:lstStyle/>
-                    <a:p>
-                      <a:pPr indent="180340" algn="just">
+              <a:tr h="317777">
+                <a:tc>
+                  <a:txBody>
+                    <a:bodyPr/>
+                    <a:lstStyle/>
+                    <a:p>
+                      <a:pPr indent="180340" algn="l">
                         <a:spcAft>
                           <a:spcPts val="0"/>
                         </a:spcAft>
@@ -8444,31 +8168,21 @@
                       </a:endParaRPr>
                     </a:p>
                   </a:txBody>
-                  <a:tcPr marL="68580" marR="68580" marT="0" marB="0"/>
-                </a:tc>
-                <a:tc>
-                  <a:txBody>
-                    <a:bodyPr/>
-                    <a:lstStyle/>
-                    <a:p>
-                      <a:endParaRPr lang="en-GB"/>
-                    </a:p>
-                  </a:txBody>
-                  <a:tcPr/>
+                  <a:tcPr marL="68580" marR="68580" marT="0" marB="0" anchor="ctr"/>
                 </a:tc>
                 <a:extLst>
                   <a:ext uri="{0D108BD9-81ED-4DB2-BD59-A6C34878D82A}">
-                    <a16:rowId xmlns:a16="http://schemas.microsoft.com/office/drawing/2014/main" val="673415637"/>
+                    <a16:rowId xmlns:a16="http://schemas.microsoft.com/office/drawing/2014/main" xmlns="" val="673415637"/>
                   </a:ext>
                 </a:extLst>
               </a:tr>
-              <a:tr h="202777">
-                <a:tc>
-                  <a:txBody>
-                    <a:bodyPr/>
-                    <a:lstStyle/>
-                    <a:p>
-                      <a:pPr indent="180340" algn="just">
+              <a:tr h="317777">
+                <a:tc>
+                  <a:txBody>
+                    <a:bodyPr/>
+                    <a:lstStyle/>
+                    <a:p>
+                      <a:pPr indent="180340" algn="l">
                         <a:spcAft>
                           <a:spcPts val="0"/>
                         </a:spcAft>
@@ -8486,7 +8200,7 @@
                       </a:endParaRPr>
                     </a:p>
                   </a:txBody>
-                  <a:tcPr marL="68580" marR="68580" marT="0" marB="0">
+                  <a:tcPr marL="68580" marR="68580" marT="0" marB="0" anchor="ctr">
                     <a:solidFill>
                       <a:schemeClr val="accent4">
                         <a:lumMod val="60000"/>
@@ -8495,19 +8209,9 @@
                     </a:solidFill>
                   </a:tcPr>
                 </a:tc>
-                <a:tc>
-                  <a:txBody>
-                    <a:bodyPr/>
-                    <a:lstStyle/>
-                    <a:p>
-                      <a:endParaRPr lang="en-GB" dirty="0"/>
-                    </a:p>
-                  </a:txBody>
-                  <a:tcPr/>
-                </a:tc>
                 <a:extLst>
                   <a:ext uri="{0D108BD9-81ED-4DB2-BD59-A6C34878D82A}">
-                    <a16:rowId xmlns:a16="http://schemas.microsoft.com/office/drawing/2014/main" val="3065364809"/>
+                    <a16:rowId xmlns:a16="http://schemas.microsoft.com/office/drawing/2014/main" xmlns="" val="3065364809"/>
                   </a:ext>
                 </a:extLst>
               </a:tr>
@@ -8662,6 +8366,10 @@
               <a:rPr lang="lt-LT" dirty="0"/>
               <a:t>planas ir scenarijai</a:t>
             </a:r>
+            <a:r>
+              <a:rPr lang="en-GB" b="1" dirty="0"/>
+              <a:t/>
+            </a:r>
             <a:br>
               <a:rPr lang="en-GB" b="1" dirty="0"/>
             </a:br>
@@ -8679,14 +8387,14 @@
             <p:ph idx="1"/>
             <p:extLst>
               <p:ext uri="{D42A27DB-BD31-4B8C-83A1-F6EECF244321}">
-                <p14:modId xmlns:p14="http://schemas.microsoft.com/office/powerpoint/2010/main" val="1296939362"/>
+                <p14:modId xmlns:p14="http://schemas.microsoft.com/office/powerpoint/2010/main" val="3446223322"/>
               </p:ext>
             </p:extLst>
           </p:nvPr>
         </p:nvGraphicFramePr>
         <p:xfrm>
           <a:off x="1275080" y="1491298"/>
-          <a:ext cx="10131426" cy="4988560"/>
+          <a:ext cx="9627382" cy="5075997"/>
         </p:xfrm>
         <a:graphic>
           <a:graphicData uri="http://schemas.openxmlformats.org/drawingml/2006/table">
@@ -8695,28 +8403,21 @@
                 <a:tableStyleId>{21E4AEA4-8DFA-4A89-87EB-49C32662AFE0}</a:tableStyleId>
               </a:tblPr>
               <a:tblGrid>
-                <a:gridCol w="8031480">
+                <a:gridCol w="9627382">
                   <a:extLst>
                     <a:ext uri="{9D8B030D-6E8A-4147-A177-3AD203B41FA5}">
-                      <a16:colId xmlns:a16="http://schemas.microsoft.com/office/drawing/2014/main" val="4183375560"/>
-                    </a:ext>
-                  </a:extLst>
-                </a:gridCol>
-                <a:gridCol w="2099946">
-                  <a:extLst>
-                    <a:ext uri="{9D8B030D-6E8A-4147-A177-3AD203B41FA5}">
-                      <a16:colId xmlns:a16="http://schemas.microsoft.com/office/drawing/2014/main" val="3746143482"/>
+                      <a16:colId xmlns:a16="http://schemas.microsoft.com/office/drawing/2014/main" xmlns="" val="4183375560"/>
                     </a:ext>
                   </a:extLst>
                 </a:gridCol>
               </a:tblGrid>
-              <a:tr h="370840">
-                <a:tc gridSpan="2">
-                  <a:txBody>
-                    <a:bodyPr/>
-                    <a:lstStyle/>
-                    <a:p>
-                      <a:pPr marL="0" marR="0" indent="0" algn="ctr" defTabSz="457200" rtl="0" eaLnBrk="1" fontAlgn="auto" latinLnBrk="0" hangingPunct="1">
+              <a:tr h="644064">
+                <a:tc>
+                  <a:txBody>
+                    <a:bodyPr/>
+                    <a:lstStyle/>
+                    <a:p>
+                      <a:pPr marL="0" marR="0" indent="0" algn="l" defTabSz="457200" rtl="0" eaLnBrk="1" fontAlgn="auto" latinLnBrk="0" hangingPunct="1">
                         <a:lnSpc>
                           <a:spcPct val="100000"/>
                         </a:lnSpc>
@@ -8746,109 +8447,68 @@
                       </a:endParaRPr>
                     </a:p>
                     <a:p>
-                      <a:pPr algn="ctr"/>
+                      <a:pPr algn="l"/>
                       <a:endParaRPr lang="en-GB" dirty="0"/>
                     </a:p>
                   </a:txBody>
-                  <a:tcPr/>
-                </a:tc>
-                <a:tc hMerge="1">
-                  <a:txBody>
-                    <a:bodyPr/>
-                    <a:lstStyle/>
-                    <a:p>
-                      <a:endParaRPr lang="en-GB" dirty="0"/>
-                    </a:p>
-                  </a:txBody>
-                  <a:tcPr/>
+                  <a:tcPr anchor="ctr"/>
                 </a:tc>
                 <a:extLst>
                   <a:ext uri="{0D108BD9-81ED-4DB2-BD59-A6C34878D82A}">
-                    <a16:rowId xmlns:a16="http://schemas.microsoft.com/office/drawing/2014/main" val="293321469"/>
+                    <a16:rowId xmlns:a16="http://schemas.microsoft.com/office/drawing/2014/main" xmlns="" val="293321469"/>
                   </a:ext>
                 </a:extLst>
               </a:tr>
-              <a:tr h="439102">
-                <a:tc>
-                  <a:txBody>
-                    <a:bodyPr/>
-                    <a:lstStyle/>
-                    <a:p>
-                      <a:pPr indent="180340" algn="just">
-                        <a:spcAft>
-                          <a:spcPts val="0"/>
-                        </a:spcAft>
-                      </a:pPr>
-                      <a:r>
-                        <a:rPr lang="lt-LT" sz="1800" dirty="0">
+              <a:tr h="402903">
+                <a:tc>
+                  <a:txBody>
+                    <a:bodyPr/>
+                    <a:lstStyle/>
+                    <a:p>
+                      <a:pPr indent="180340" algn="l">
+                        <a:spcAft>
+                          <a:spcPts val="0"/>
+                        </a:spcAft>
+                      </a:pPr>
+                      <a:r>
+                        <a:rPr lang="lt-LT" sz="1800" b="1" dirty="0">
                           <a:effectLst/>
                           <a:latin typeface="+mj-lt"/>
                           <a:ea typeface="Times New Roman" panose="02020603050405020304" pitchFamily="18" charset="0"/>
                         </a:rPr>
                         <a:t>U_08</a:t>
                       </a:r>
-                      <a:endParaRPr lang="en-GB" sz="1200" dirty="0">
+                      <a:endParaRPr lang="en-GB" sz="1200" b="1" dirty="0">
                         <a:effectLst/>
                         <a:latin typeface="+mj-lt"/>
                         <a:ea typeface="Times New Roman" panose="02020603050405020304" pitchFamily="18" charset="0"/>
                       </a:endParaRPr>
                     </a:p>
                   </a:txBody>
-                  <a:tcPr marL="68580" marR="68580" marT="0" marB="0"/>
-                </a:tc>
-                <a:tc>
-                  <a:txBody>
-                    <a:bodyPr/>
-                    <a:lstStyle/>
-                    <a:p>
-                      <a:pPr marL="0" marR="0" indent="0" algn="l" defTabSz="457200" rtl="0" eaLnBrk="1" fontAlgn="auto" latinLnBrk="0" hangingPunct="1">
-                        <a:lnSpc>
-                          <a:spcPct val="100000"/>
-                        </a:lnSpc>
-                        <a:spcBef>
-                          <a:spcPts val="0"/>
-                        </a:spcBef>
-                        <a:spcAft>
-                          <a:spcPts val="0"/>
-                        </a:spcAft>
-                        <a:buClrTx/>
-                        <a:buSzTx/>
-                        <a:buFontTx/>
-                        <a:buNone/>
-                        <a:tabLst/>
-                        <a:defRPr/>
-                      </a:pPr>
-                      <a:r>
-                        <a:rPr lang="lt-LT" dirty="0"/>
-                        <a:t>Testo įvertinimai</a:t>
-                      </a:r>
-                      <a:endParaRPr lang="en-GB" dirty="0"/>
-                    </a:p>
-                    <a:p>
-                      <a:endParaRPr lang="en-GB" dirty="0"/>
-                    </a:p>
-                  </a:txBody>
-                  <a:tcPr/>
+                  <a:tcPr marL="68580" marR="68580" marT="0" marB="0" anchor="ctr"/>
                 </a:tc>
                 <a:extLst>
                   <a:ext uri="{0D108BD9-81ED-4DB2-BD59-A6C34878D82A}">
-                    <a16:rowId xmlns:a16="http://schemas.microsoft.com/office/drawing/2014/main" val="2316650483"/>
+                    <a16:rowId xmlns:a16="http://schemas.microsoft.com/office/drawing/2014/main" xmlns="" val="2316650483"/>
                   </a:ext>
                 </a:extLst>
               </a:tr>
-              <a:tr h="370840">
-                <a:tc>
-                  <a:txBody>
-                    <a:bodyPr/>
-                    <a:lstStyle/>
-                    <a:p>
-                      <a:pPr indent="180340" algn="just">
+              <a:tr h="402903">
+                <a:tc>
+                  <a:txBody>
+                    <a:bodyPr/>
+                    <a:lstStyle/>
+                    <a:p>
+                      <a:pPr indent="180340" algn="l">
                         <a:spcAft>
                           <a:spcPts val="0"/>
                         </a:spcAft>
                       </a:pPr>
                       <a:r>
                         <a:rPr lang="lt-LT" sz="1800" b="1" dirty="0">
+                          <a:solidFill>
+                            <a:schemeClr val="bg1"/>
+                          </a:solidFill>
                           <a:effectLst/>
                           <a:latin typeface="+mj-lt"/>
                           <a:ea typeface="Times New Roman" panose="02020603050405020304" pitchFamily="18" charset="0"/>
@@ -8856,13 +8516,16 @@
                         <a:t>Tikrinama ar įmanoma peržiūrėti statistiką</a:t>
                       </a:r>
                       <a:endParaRPr lang="en-GB" sz="1200" dirty="0">
+                        <a:solidFill>
+                          <a:schemeClr val="bg1"/>
+                        </a:solidFill>
                         <a:effectLst/>
                         <a:latin typeface="+mj-lt"/>
                         <a:ea typeface="Times New Roman" panose="02020603050405020304" pitchFamily="18" charset="0"/>
                       </a:endParaRPr>
                     </a:p>
                   </a:txBody>
-                  <a:tcPr marL="68580" marR="68580" marT="0" marB="0">
+                  <a:tcPr marL="68580" marR="68580" marT="0" marB="0" anchor="ctr">
                     <a:solidFill>
                       <a:schemeClr val="tx1">
                         <a:lumMod val="65000"/>
@@ -8870,29 +8533,19 @@
                     </a:solidFill>
                   </a:tcPr>
                 </a:tc>
-                <a:tc>
-                  <a:txBody>
-                    <a:bodyPr/>
-                    <a:lstStyle/>
-                    <a:p>
-                      <a:endParaRPr lang="en-GB"/>
-                    </a:p>
-                  </a:txBody>
-                  <a:tcPr/>
-                </a:tc>
                 <a:extLst>
                   <a:ext uri="{0D108BD9-81ED-4DB2-BD59-A6C34878D82A}">
-                    <a16:rowId xmlns:a16="http://schemas.microsoft.com/office/drawing/2014/main" val="2431723980"/>
+                    <a16:rowId xmlns:a16="http://schemas.microsoft.com/office/drawing/2014/main" xmlns="" val="2431723980"/>
                   </a:ext>
                 </a:extLst>
               </a:tr>
-              <a:tr h="370840">
-                <a:tc>
-                  <a:txBody>
-                    <a:bodyPr/>
-                    <a:lstStyle/>
-                    <a:p>
-                      <a:pPr indent="180340" algn="just">
+              <a:tr h="402903">
+                <a:tc>
+                  <a:txBody>
+                    <a:bodyPr/>
+                    <a:lstStyle/>
+                    <a:p>
+                      <a:pPr indent="180340" algn="l">
                         <a:spcAft>
                           <a:spcPts val="0"/>
                         </a:spcAft>
@@ -8900,7 +8553,7 @@
                       <a:r>
                         <a:rPr lang="lt-LT" sz="1800" dirty="0">
                           <a:solidFill>
-                            <a:srgbClr val="5B9BD5"/>
+                            <a:schemeClr val="bg1"/>
                           </a:solidFill>
                           <a:effectLst/>
                           <a:latin typeface="+mj-lt"/>
@@ -8909,37 +8562,30 @@
                         <a:t>Testuotojas atidaro "Išlaidos/Pajamos" langą</a:t>
                       </a:r>
                       <a:endParaRPr lang="en-GB" sz="1200" dirty="0">
+                        <a:solidFill>
+                          <a:schemeClr val="bg1"/>
+                        </a:solidFill>
                         <a:effectLst/>
                         <a:latin typeface="+mj-lt"/>
                         <a:ea typeface="Times New Roman" panose="02020603050405020304" pitchFamily="18" charset="0"/>
                       </a:endParaRPr>
                     </a:p>
                   </a:txBody>
-                  <a:tcPr marL="68580" marR="68580" marT="0" marB="0"/>
-                </a:tc>
-                <a:tc>
-                  <a:txBody>
-                    <a:bodyPr/>
-                    <a:lstStyle/>
-                    <a:p>
-                      <a:endParaRPr lang="en-GB"/>
-                    </a:p>
-                  </a:txBody>
-                  <a:tcPr/>
+                  <a:tcPr marL="68580" marR="68580" marT="0" marB="0" anchor="ctr"/>
                 </a:tc>
                 <a:extLst>
                   <a:ext uri="{0D108BD9-81ED-4DB2-BD59-A6C34878D82A}">
-                    <a16:rowId xmlns:a16="http://schemas.microsoft.com/office/drawing/2014/main" val="3686293224"/>
+                    <a16:rowId xmlns:a16="http://schemas.microsoft.com/office/drawing/2014/main" xmlns="" val="3686293224"/>
                   </a:ext>
                 </a:extLst>
               </a:tr>
-              <a:tr h="370840">
-                <a:tc>
-                  <a:txBody>
-                    <a:bodyPr/>
-                    <a:lstStyle/>
-                    <a:p>
-                      <a:pPr indent="180340" algn="just">
+              <a:tr h="402903">
+                <a:tc>
+                  <a:txBody>
+                    <a:bodyPr/>
+                    <a:lstStyle/>
+                    <a:p>
+                      <a:pPr indent="180340" algn="l">
                         <a:spcAft>
                           <a:spcPts val="0"/>
                         </a:spcAft>
@@ -8947,7 +8593,7 @@
                       <a:r>
                         <a:rPr lang="lt-LT" sz="1800" dirty="0">
                           <a:solidFill>
-                            <a:srgbClr val="5B9BD5"/>
+                            <a:schemeClr val="bg1"/>
                           </a:solidFill>
                           <a:effectLst/>
                           <a:latin typeface="+mj-lt"/>
@@ -8956,37 +8602,30 @@
                         <a:t>Paspaudžia mygtuką "Statistika"</a:t>
                       </a:r>
                       <a:endParaRPr lang="en-GB" sz="1200" dirty="0">
+                        <a:solidFill>
+                          <a:schemeClr val="bg1"/>
+                        </a:solidFill>
                         <a:effectLst/>
                         <a:latin typeface="+mj-lt"/>
                         <a:ea typeface="Times New Roman" panose="02020603050405020304" pitchFamily="18" charset="0"/>
                       </a:endParaRPr>
                     </a:p>
                   </a:txBody>
-                  <a:tcPr marL="68580" marR="68580" marT="0" marB="0"/>
-                </a:tc>
-                <a:tc>
-                  <a:txBody>
-                    <a:bodyPr/>
-                    <a:lstStyle/>
-                    <a:p>
-                      <a:endParaRPr lang="en-GB"/>
-                    </a:p>
-                  </a:txBody>
-                  <a:tcPr/>
+                  <a:tcPr marL="68580" marR="68580" marT="0" marB="0" anchor="ctr"/>
                 </a:tc>
                 <a:extLst>
                   <a:ext uri="{0D108BD9-81ED-4DB2-BD59-A6C34878D82A}">
-                    <a16:rowId xmlns:a16="http://schemas.microsoft.com/office/drawing/2014/main" val="2898798807"/>
+                    <a16:rowId xmlns:a16="http://schemas.microsoft.com/office/drawing/2014/main" xmlns="" val="2898798807"/>
                   </a:ext>
                 </a:extLst>
               </a:tr>
-              <a:tr h="370840">
-                <a:tc>
-                  <a:txBody>
-                    <a:bodyPr/>
-                    <a:lstStyle/>
-                    <a:p>
-                      <a:pPr indent="180340" algn="just">
+              <a:tr h="402903">
+                <a:tc>
+                  <a:txBody>
+                    <a:bodyPr/>
+                    <a:lstStyle/>
+                    <a:p>
+                      <a:pPr indent="180340" algn="l">
                         <a:spcAft>
                           <a:spcPts val="0"/>
                         </a:spcAft>
@@ -8994,7 +8633,7 @@
                       <a:r>
                         <a:rPr lang="lt-LT" sz="1800" dirty="0">
                           <a:solidFill>
-                            <a:srgbClr val="5B9BD5"/>
+                            <a:schemeClr val="bg1"/>
                           </a:solidFill>
                           <a:effectLst/>
                           <a:latin typeface="+mj-lt"/>
@@ -9003,43 +8642,39 @@
                         <a:t>Testuotojas pasirenka laikotarpį</a:t>
                       </a:r>
                       <a:endParaRPr lang="en-GB" sz="1200" dirty="0">
+                        <a:solidFill>
+                          <a:schemeClr val="bg1"/>
+                        </a:solidFill>
                         <a:effectLst/>
                         <a:latin typeface="+mj-lt"/>
                         <a:ea typeface="Times New Roman" panose="02020603050405020304" pitchFamily="18" charset="0"/>
                       </a:endParaRPr>
                     </a:p>
                   </a:txBody>
-                  <a:tcPr marL="68580" marR="68580" marT="0" marB="0"/>
-                </a:tc>
-                <a:tc>
-                  <a:txBody>
-                    <a:bodyPr/>
-                    <a:lstStyle/>
-                    <a:p>
-                      <a:endParaRPr lang="en-GB"/>
-                    </a:p>
-                  </a:txBody>
-                  <a:tcPr/>
+                  <a:tcPr marL="68580" marR="68580" marT="0" marB="0" anchor="ctr"/>
                 </a:tc>
                 <a:extLst>
                   <a:ext uri="{0D108BD9-81ED-4DB2-BD59-A6C34878D82A}">
-                    <a16:rowId xmlns:a16="http://schemas.microsoft.com/office/drawing/2014/main" val="3872836124"/>
+                    <a16:rowId xmlns:a16="http://schemas.microsoft.com/office/drawing/2014/main" xmlns="" val="3872836124"/>
                   </a:ext>
                 </a:extLst>
               </a:tr>
-              <a:tr h="370840">
-                <a:tc>
-                  <a:txBody>
-                    <a:bodyPr/>
-                    <a:lstStyle/>
-                    <a:p>
-                      <a:pPr indent="180340" algn="just">
+              <a:tr h="402903">
+                <a:tc>
+                  <a:txBody>
+                    <a:bodyPr/>
+                    <a:lstStyle/>
+                    <a:p>
+                      <a:pPr indent="180340" algn="l">
                         <a:spcAft>
                           <a:spcPts val="0"/>
                         </a:spcAft>
                       </a:pPr>
                       <a:r>
                         <a:rPr lang="lt-LT" sz="1800" dirty="0">
+                          <a:solidFill>
+                            <a:schemeClr val="bg1"/>
+                          </a:solidFill>
                           <a:effectLst/>
                           <a:latin typeface="+mj-lt"/>
                           <a:ea typeface="Times New Roman" panose="02020603050405020304" pitchFamily="18" charset="0"/>
@@ -9047,13 +8682,16 @@
                         <a:t>Parodoma statistika</a:t>
                       </a:r>
                       <a:endParaRPr lang="en-GB" sz="1200" dirty="0">
+                        <a:solidFill>
+                          <a:schemeClr val="bg1"/>
+                        </a:solidFill>
                         <a:effectLst/>
                         <a:latin typeface="+mj-lt"/>
                         <a:ea typeface="Times New Roman" panose="02020603050405020304" pitchFamily="18" charset="0"/>
                       </a:endParaRPr>
                     </a:p>
                   </a:txBody>
-                  <a:tcPr marL="68580" marR="68580" marT="0" marB="0">
+                  <a:tcPr marL="68580" marR="68580" marT="0" marB="0" anchor="ctr">
                     <a:solidFill>
                       <a:schemeClr val="accent4">
                         <a:lumMod val="60000"/>
@@ -9062,35 +8700,28 @@
                     </a:solidFill>
                   </a:tcPr>
                 </a:tc>
-                <a:tc>
-                  <a:txBody>
-                    <a:bodyPr/>
-                    <a:lstStyle/>
-                    <a:p>
-                      <a:endParaRPr lang="en-GB"/>
-                    </a:p>
-                  </a:txBody>
-                  <a:tcPr/>
-                </a:tc>
                 <a:extLst>
                   <a:ext uri="{0D108BD9-81ED-4DB2-BD59-A6C34878D82A}">
-                    <a16:rowId xmlns:a16="http://schemas.microsoft.com/office/drawing/2014/main" val="1985346143"/>
+                    <a16:rowId xmlns:a16="http://schemas.microsoft.com/office/drawing/2014/main" xmlns="" val="1985346143"/>
                   </a:ext>
                 </a:extLst>
               </a:tr>
-              <a:tr h="370840">
-                <a:tc>
-                  <a:txBody>
-                    <a:bodyPr/>
-                    <a:lstStyle/>
-                    <a:p>
-                      <a:pPr indent="180340" algn="just">
+              <a:tr h="402903">
+                <a:tc>
+                  <a:txBody>
+                    <a:bodyPr/>
+                    <a:lstStyle/>
+                    <a:p>
+                      <a:pPr indent="180340" algn="l">
                         <a:spcAft>
                           <a:spcPts val="0"/>
                         </a:spcAft>
                       </a:pPr>
                       <a:r>
                         <a:rPr lang="lt-LT" sz="1800" b="1" dirty="0">
+                          <a:solidFill>
+                            <a:schemeClr val="bg1"/>
+                          </a:solidFill>
                           <a:effectLst/>
                           <a:latin typeface="+mj-lt"/>
                           <a:ea typeface="Times New Roman" panose="02020603050405020304" pitchFamily="18" charset="0"/>
@@ -9098,13 +8729,16 @@
                         <a:t>Tikrinama ar nesant išlaidos įrašui parodoma: "išlaidų nėra"</a:t>
                       </a:r>
                       <a:endParaRPr lang="en-GB" sz="1200" dirty="0">
+                        <a:solidFill>
+                          <a:schemeClr val="bg1"/>
+                        </a:solidFill>
                         <a:effectLst/>
                         <a:latin typeface="+mj-lt"/>
                         <a:ea typeface="Times New Roman" panose="02020603050405020304" pitchFamily="18" charset="0"/>
                       </a:endParaRPr>
                     </a:p>
                   </a:txBody>
-                  <a:tcPr marL="68580" marR="68580" marT="0" marB="0">
+                  <a:tcPr marL="68580" marR="68580" marT="0" marB="0" anchor="ctr">
                     <a:solidFill>
                       <a:schemeClr val="tx1">
                         <a:lumMod val="65000"/>
@@ -9112,29 +8746,19 @@
                     </a:solidFill>
                   </a:tcPr>
                 </a:tc>
-                <a:tc>
-                  <a:txBody>
-                    <a:bodyPr/>
-                    <a:lstStyle/>
-                    <a:p>
-                      <a:endParaRPr lang="en-GB"/>
-                    </a:p>
-                  </a:txBody>
-                  <a:tcPr/>
-                </a:tc>
                 <a:extLst>
                   <a:ext uri="{0D108BD9-81ED-4DB2-BD59-A6C34878D82A}">
-                    <a16:rowId xmlns:a16="http://schemas.microsoft.com/office/drawing/2014/main" val="3022605297"/>
+                    <a16:rowId xmlns:a16="http://schemas.microsoft.com/office/drawing/2014/main" xmlns="" val="3022605297"/>
                   </a:ext>
                 </a:extLst>
               </a:tr>
-              <a:tr h="370840">
-                <a:tc>
-                  <a:txBody>
-                    <a:bodyPr/>
-                    <a:lstStyle/>
-                    <a:p>
-                      <a:pPr indent="180340" algn="just">
+              <a:tr h="402903">
+                <a:tc>
+                  <a:txBody>
+                    <a:bodyPr/>
+                    <a:lstStyle/>
+                    <a:p>
+                      <a:pPr indent="180340" algn="l">
                         <a:spcAft>
                           <a:spcPts val="0"/>
                         </a:spcAft>
@@ -9142,7 +8766,7 @@
                       <a:r>
                         <a:rPr lang="lt-LT" sz="1800" dirty="0">
                           <a:solidFill>
-                            <a:srgbClr val="5B9BD5"/>
+                            <a:schemeClr val="bg1"/>
                           </a:solidFill>
                           <a:effectLst/>
                           <a:latin typeface="+mj-lt"/>
@@ -9151,37 +8775,30 @@
                         <a:t>Testuotojas atidaro "Išlaidos/Pajamos" langą</a:t>
                       </a:r>
                       <a:endParaRPr lang="en-GB" sz="1200" dirty="0">
+                        <a:solidFill>
+                          <a:schemeClr val="bg1"/>
+                        </a:solidFill>
                         <a:effectLst/>
                         <a:latin typeface="+mj-lt"/>
                         <a:ea typeface="Times New Roman" panose="02020603050405020304" pitchFamily="18" charset="0"/>
                       </a:endParaRPr>
                     </a:p>
                   </a:txBody>
-                  <a:tcPr marL="68580" marR="68580" marT="0" marB="0"/>
-                </a:tc>
-                <a:tc>
-                  <a:txBody>
-                    <a:bodyPr/>
-                    <a:lstStyle/>
-                    <a:p>
-                      <a:endParaRPr lang="en-GB"/>
-                    </a:p>
-                  </a:txBody>
-                  <a:tcPr/>
+                  <a:tcPr marL="68580" marR="68580" marT="0" marB="0" anchor="ctr"/>
                 </a:tc>
                 <a:extLst>
                   <a:ext uri="{0D108BD9-81ED-4DB2-BD59-A6C34878D82A}">
-                    <a16:rowId xmlns:a16="http://schemas.microsoft.com/office/drawing/2014/main" val="2704192048"/>
+                    <a16:rowId xmlns:a16="http://schemas.microsoft.com/office/drawing/2014/main" xmlns="" val="2704192048"/>
                   </a:ext>
                 </a:extLst>
               </a:tr>
-              <a:tr h="370840">
-                <a:tc>
-                  <a:txBody>
-                    <a:bodyPr/>
-                    <a:lstStyle/>
-                    <a:p>
-                      <a:pPr indent="180340" algn="just">
+              <a:tr h="402903">
+                <a:tc>
+                  <a:txBody>
+                    <a:bodyPr/>
+                    <a:lstStyle/>
+                    <a:p>
+                      <a:pPr indent="180340" algn="l">
                         <a:spcAft>
                           <a:spcPts val="0"/>
                         </a:spcAft>
@@ -9189,7 +8806,7 @@
                       <a:r>
                         <a:rPr lang="lt-LT" sz="1800" dirty="0">
                           <a:solidFill>
-                            <a:srgbClr val="5B9BD5"/>
+                            <a:schemeClr val="bg1"/>
                           </a:solidFill>
                           <a:effectLst/>
                           <a:latin typeface="+mj-lt"/>
@@ -9198,37 +8815,30 @@
                         <a:t>Paspaudžia mygtuką "Statistika"</a:t>
                       </a:r>
                       <a:endParaRPr lang="en-GB" sz="1200" dirty="0">
+                        <a:solidFill>
+                          <a:schemeClr val="bg1"/>
+                        </a:solidFill>
                         <a:effectLst/>
                         <a:latin typeface="+mj-lt"/>
                         <a:ea typeface="Times New Roman" panose="02020603050405020304" pitchFamily="18" charset="0"/>
                       </a:endParaRPr>
                     </a:p>
                   </a:txBody>
-                  <a:tcPr marL="68580" marR="68580" marT="0" marB="0"/>
-                </a:tc>
-                <a:tc>
-                  <a:txBody>
-                    <a:bodyPr/>
-                    <a:lstStyle/>
-                    <a:p>
-                      <a:endParaRPr lang="en-GB"/>
-                    </a:p>
-                  </a:txBody>
-                  <a:tcPr/>
+                  <a:tcPr marL="68580" marR="68580" marT="0" marB="0" anchor="ctr"/>
                 </a:tc>
                 <a:extLst>
                   <a:ext uri="{0D108BD9-81ED-4DB2-BD59-A6C34878D82A}">
-                    <a16:rowId xmlns:a16="http://schemas.microsoft.com/office/drawing/2014/main" val="3413712382"/>
+                    <a16:rowId xmlns:a16="http://schemas.microsoft.com/office/drawing/2014/main" xmlns="" val="3413712382"/>
                   </a:ext>
                 </a:extLst>
               </a:tr>
-              <a:tr h="370840">
-                <a:tc>
-                  <a:txBody>
-                    <a:bodyPr/>
-                    <a:lstStyle/>
-                    <a:p>
-                      <a:pPr indent="180340" algn="just">
+              <a:tr h="402903">
+                <a:tc>
+                  <a:txBody>
+                    <a:bodyPr/>
+                    <a:lstStyle/>
+                    <a:p>
+                      <a:pPr indent="180340" algn="l">
                         <a:spcAft>
                           <a:spcPts val="0"/>
                         </a:spcAft>
@@ -9236,7 +8846,7 @@
                       <a:r>
                         <a:rPr lang="lt-LT" sz="1800" dirty="0">
                           <a:solidFill>
-                            <a:srgbClr val="5B9BD5"/>
+                            <a:schemeClr val="bg1"/>
                           </a:solidFill>
                           <a:effectLst/>
                           <a:latin typeface="+mj-lt"/>
@@ -9245,43 +8855,39 @@
                         <a:t>Testuotojas pasirenka laikotarpį kuomet nėra išlaidų</a:t>
                       </a:r>
                       <a:endParaRPr lang="en-GB" sz="1200" dirty="0">
+                        <a:solidFill>
+                          <a:schemeClr val="bg1"/>
+                        </a:solidFill>
                         <a:effectLst/>
                         <a:latin typeface="+mj-lt"/>
                         <a:ea typeface="Times New Roman" panose="02020603050405020304" pitchFamily="18" charset="0"/>
                       </a:endParaRPr>
                     </a:p>
                   </a:txBody>
-                  <a:tcPr marL="68580" marR="68580" marT="0" marB="0"/>
-                </a:tc>
-                <a:tc>
-                  <a:txBody>
-                    <a:bodyPr/>
-                    <a:lstStyle/>
-                    <a:p>
-                      <a:endParaRPr lang="en-GB"/>
-                    </a:p>
-                  </a:txBody>
-                  <a:tcPr/>
+                  <a:tcPr marL="68580" marR="68580" marT="0" marB="0" anchor="ctr"/>
                 </a:tc>
                 <a:extLst>
                   <a:ext uri="{0D108BD9-81ED-4DB2-BD59-A6C34878D82A}">
-                    <a16:rowId xmlns:a16="http://schemas.microsoft.com/office/drawing/2014/main" val="2989302117"/>
+                    <a16:rowId xmlns:a16="http://schemas.microsoft.com/office/drawing/2014/main" xmlns="" val="2989302117"/>
                   </a:ext>
                 </a:extLst>
               </a:tr>
-              <a:tr h="370840">
-                <a:tc>
-                  <a:txBody>
-                    <a:bodyPr/>
-                    <a:lstStyle/>
-                    <a:p>
-                      <a:pPr indent="180340" algn="just">
+              <a:tr h="402903">
+                <a:tc>
+                  <a:txBody>
+                    <a:bodyPr/>
+                    <a:lstStyle/>
+                    <a:p>
+                      <a:pPr indent="180340" algn="l">
                         <a:spcAft>
                           <a:spcPts val="0"/>
                         </a:spcAft>
                       </a:pPr>
                       <a:r>
                         <a:rPr lang="lt-LT" sz="1800" dirty="0">
+                          <a:solidFill>
+                            <a:schemeClr val="bg1"/>
+                          </a:solidFill>
                           <a:effectLst/>
                           <a:latin typeface="+mj-lt"/>
                           <a:ea typeface="Times New Roman" panose="02020603050405020304" pitchFamily="18" charset="0"/>
@@ -9289,13 +8895,16 @@
                         <a:t>Pranešama, kad įrašų nėra ir atidaromas "Išlaidos/Pajamos" langas</a:t>
                       </a:r>
                       <a:endParaRPr lang="en-GB" sz="1200" dirty="0">
+                        <a:solidFill>
+                          <a:schemeClr val="bg1"/>
+                        </a:solidFill>
                         <a:effectLst/>
                         <a:latin typeface="+mj-lt"/>
                         <a:ea typeface="Times New Roman" panose="02020603050405020304" pitchFamily="18" charset="0"/>
                       </a:endParaRPr>
                     </a:p>
                   </a:txBody>
-                  <a:tcPr marL="68580" marR="68580" marT="0" marB="0">
+                  <a:tcPr marL="68580" marR="68580" marT="0" marB="0" anchor="ctr">
                     <a:solidFill>
                       <a:schemeClr val="accent4">
                         <a:lumMod val="60000"/>
@@ -9304,19 +8913,9 @@
                     </a:solidFill>
                   </a:tcPr>
                 </a:tc>
-                <a:tc>
-                  <a:txBody>
-                    <a:bodyPr/>
-                    <a:lstStyle/>
-                    <a:p>
-                      <a:endParaRPr lang="en-GB" dirty="0"/>
-                    </a:p>
-                  </a:txBody>
-                  <a:tcPr/>
-                </a:tc>
                 <a:extLst>
                   <a:ext uri="{0D108BD9-81ED-4DB2-BD59-A6C34878D82A}">
-                    <a16:rowId xmlns:a16="http://schemas.microsoft.com/office/drawing/2014/main" val="990745132"/>
+                    <a16:rowId xmlns:a16="http://schemas.microsoft.com/office/drawing/2014/main" xmlns="" val="990745132"/>
                   </a:ext>
                 </a:extLst>
               </a:tr>
@@ -9626,12 +9225,14 @@
           </a:bodyPr>
           <a:lstStyle/>
           <a:p>
-            <a:pPr algn="ctr"/>
+            <a:pPr marL="0" indent="0" algn="ctr">
+              <a:buNone/>
+            </a:pPr>
             <a:r>
-              <a:rPr lang="lt-LT" sz="2800" dirty="0"/>
-              <a:t>Klausimai</a:t>
+              <a:rPr lang="lt-LT" sz="3600" dirty="0" smtClean="0"/>
+              <a:t>Klausimai?</a:t>
             </a:r>
-            <a:endParaRPr lang="en-GB" sz="2800" dirty="0"/>
+            <a:endParaRPr lang="en-GB" sz="3600" dirty="0"/>
           </a:p>
         </p:txBody>
       </p:sp>
@@ -9701,16 +9302,18 @@
           </a:bodyPr>
           <a:lstStyle/>
           <a:p>
-            <a:pPr algn="ctr"/>
+            <a:pPr marL="0" indent="0" algn="ctr">
+              <a:buNone/>
+            </a:pPr>
             <a:r>
-              <a:rPr lang="en-GB" sz="2400" dirty="0"/>
+              <a:rPr lang="en-GB" sz="3600" dirty="0"/>
               <a:t>A</a:t>
             </a:r>
             <a:r>
-              <a:rPr lang="lt-LT" sz="2400" dirty="0"/>
+              <a:rPr lang="lt-LT" sz="3600" dirty="0"/>
               <a:t>čiū už dėmesį</a:t>
             </a:r>
-            <a:endParaRPr lang="en-GB" sz="2400" dirty="0"/>
+            <a:endParaRPr lang="en-GB" sz="3600" dirty="0"/>
           </a:p>
         </p:txBody>
       </p:sp>
@@ -10108,21 +9711,21 @@
                 <a:gridCol w="727990">
                   <a:extLst>
                     <a:ext uri="{9D8B030D-6E8A-4147-A177-3AD203B41FA5}">
-                      <a16:colId xmlns:a16="http://schemas.microsoft.com/office/drawing/2014/main" val="2776286440"/>
+                      <a16:colId xmlns:a16="http://schemas.microsoft.com/office/drawing/2014/main" xmlns="" val="2776286440"/>
                     </a:ext>
                   </a:extLst>
                 </a:gridCol>
                 <a:gridCol w="610100">
                   <a:extLst>
                     <a:ext uri="{9D8B030D-6E8A-4147-A177-3AD203B41FA5}">
-                      <a16:colId xmlns:a16="http://schemas.microsoft.com/office/drawing/2014/main" val="2033607799"/>
+                      <a16:colId xmlns:a16="http://schemas.microsoft.com/office/drawing/2014/main" xmlns="" val="2033607799"/>
                     </a:ext>
                   </a:extLst>
                 </a:gridCol>
                 <a:gridCol w="6464141">
                   <a:extLst>
                     <a:ext uri="{9D8B030D-6E8A-4147-A177-3AD203B41FA5}">
-                      <a16:colId xmlns:a16="http://schemas.microsoft.com/office/drawing/2014/main" val="2667670849"/>
+                      <a16:colId xmlns:a16="http://schemas.microsoft.com/office/drawing/2014/main" xmlns="" val="2667670849"/>
                     </a:ext>
                   </a:extLst>
                 </a:gridCol>
@@ -10193,7 +9796,7 @@
                 </a:tc>
                 <a:extLst>
                   <a:ext uri="{0D108BD9-81ED-4DB2-BD59-A6C34878D82A}">
-                    <a16:rowId xmlns:a16="http://schemas.microsoft.com/office/drawing/2014/main" val="1277259983"/>
+                    <a16:rowId xmlns:a16="http://schemas.microsoft.com/office/drawing/2014/main" xmlns="" val="1277259983"/>
                   </a:ext>
                 </a:extLst>
               </a:tr>
@@ -10260,7 +9863,7 @@
                 </a:tc>
                 <a:extLst>
                   <a:ext uri="{0D108BD9-81ED-4DB2-BD59-A6C34878D82A}">
-                    <a16:rowId xmlns:a16="http://schemas.microsoft.com/office/drawing/2014/main" val="2055024466"/>
+                    <a16:rowId xmlns:a16="http://schemas.microsoft.com/office/drawing/2014/main" xmlns="" val="2055024466"/>
                   </a:ext>
                 </a:extLst>
               </a:tr>
@@ -10342,7 +9945,7 @@
                 </a:tc>
                 <a:extLst>
                   <a:ext uri="{0D108BD9-81ED-4DB2-BD59-A6C34878D82A}">
-                    <a16:rowId xmlns:a16="http://schemas.microsoft.com/office/drawing/2014/main" val="3071320803"/>
+                    <a16:rowId xmlns:a16="http://schemas.microsoft.com/office/drawing/2014/main" xmlns="" val="3071320803"/>
                   </a:ext>
                 </a:extLst>
               </a:tr>
@@ -10424,7 +10027,7 @@
                 </a:tc>
                 <a:extLst>
                   <a:ext uri="{0D108BD9-81ED-4DB2-BD59-A6C34878D82A}">
-                    <a16:rowId xmlns:a16="http://schemas.microsoft.com/office/drawing/2014/main" val="1230855380"/>
+                    <a16:rowId xmlns:a16="http://schemas.microsoft.com/office/drawing/2014/main" xmlns="" val="1230855380"/>
                   </a:ext>
                 </a:extLst>
               </a:tr>
@@ -10506,7 +10109,7 @@
                 </a:tc>
                 <a:extLst>
                   <a:ext uri="{0D108BD9-81ED-4DB2-BD59-A6C34878D82A}">
-                    <a16:rowId xmlns:a16="http://schemas.microsoft.com/office/drawing/2014/main" val="3360151942"/>
+                    <a16:rowId xmlns:a16="http://schemas.microsoft.com/office/drawing/2014/main" xmlns="" val="3360151942"/>
                   </a:ext>
                 </a:extLst>
               </a:tr>
@@ -10573,7 +10176,7 @@
                 </a:tc>
                 <a:extLst>
                   <a:ext uri="{0D108BD9-81ED-4DB2-BD59-A6C34878D82A}">
-                    <a16:rowId xmlns:a16="http://schemas.microsoft.com/office/drawing/2014/main" val="120114359"/>
+                    <a16:rowId xmlns:a16="http://schemas.microsoft.com/office/drawing/2014/main" xmlns="" val="120114359"/>
                   </a:ext>
                 </a:extLst>
               </a:tr>
@@ -10640,7 +10243,7 @@
                 </a:tc>
                 <a:extLst>
                   <a:ext uri="{0D108BD9-81ED-4DB2-BD59-A6C34878D82A}">
-                    <a16:rowId xmlns:a16="http://schemas.microsoft.com/office/drawing/2014/main" val="1936322762"/>
+                    <a16:rowId xmlns:a16="http://schemas.microsoft.com/office/drawing/2014/main" xmlns="" val="1936322762"/>
                   </a:ext>
                 </a:extLst>
               </a:tr>
@@ -10710,7 +10313,7 @@
                 </a:tc>
                 <a:extLst>
                   <a:ext uri="{0D108BD9-81ED-4DB2-BD59-A6C34878D82A}">
-                    <a16:rowId xmlns:a16="http://schemas.microsoft.com/office/drawing/2014/main" val="1894107852"/>
+                    <a16:rowId xmlns:a16="http://schemas.microsoft.com/office/drawing/2014/main" xmlns="" val="1894107852"/>
                   </a:ext>
                 </a:extLst>
               </a:tr>
@@ -10798,7 +10401,7 @@
                 </a:tc>
                 <a:extLst>
                   <a:ext uri="{0D108BD9-81ED-4DB2-BD59-A6C34878D82A}">
-                    <a16:rowId xmlns:a16="http://schemas.microsoft.com/office/drawing/2014/main" val="2221336748"/>
+                    <a16:rowId xmlns:a16="http://schemas.microsoft.com/office/drawing/2014/main" xmlns="" val="2221336748"/>
                   </a:ext>
                 </a:extLst>
               </a:tr>
@@ -10886,7 +10489,7 @@
                 </a:tc>
                 <a:extLst>
                   <a:ext uri="{0D108BD9-81ED-4DB2-BD59-A6C34878D82A}">
-                    <a16:rowId xmlns:a16="http://schemas.microsoft.com/office/drawing/2014/main" val="4087489466"/>
+                    <a16:rowId xmlns:a16="http://schemas.microsoft.com/office/drawing/2014/main" xmlns="" val="4087489466"/>
                   </a:ext>
                 </a:extLst>
               </a:tr>
@@ -10956,7 +10559,7 @@
                 </a:tc>
                 <a:extLst>
                   <a:ext uri="{0D108BD9-81ED-4DB2-BD59-A6C34878D82A}">
-                    <a16:rowId xmlns:a16="http://schemas.microsoft.com/office/drawing/2014/main" val="337626297"/>
+                    <a16:rowId xmlns:a16="http://schemas.microsoft.com/office/drawing/2014/main" xmlns="" val="337626297"/>
                   </a:ext>
                 </a:extLst>
               </a:tr>
@@ -11026,7 +10629,7 @@
                 </a:tc>
                 <a:extLst>
                   <a:ext uri="{0D108BD9-81ED-4DB2-BD59-A6C34878D82A}">
-                    <a16:rowId xmlns:a16="http://schemas.microsoft.com/office/drawing/2014/main" val="1610403096"/>
+                    <a16:rowId xmlns:a16="http://schemas.microsoft.com/office/drawing/2014/main" xmlns="" val="1610403096"/>
                   </a:ext>
                 </a:extLst>
               </a:tr>
@@ -11096,7 +10699,7 @@
                 </a:tc>
                 <a:extLst>
                   <a:ext uri="{0D108BD9-81ED-4DB2-BD59-A6C34878D82A}">
-                    <a16:rowId xmlns:a16="http://schemas.microsoft.com/office/drawing/2014/main" val="1183999689"/>
+                    <a16:rowId xmlns:a16="http://schemas.microsoft.com/office/drawing/2014/main" xmlns="" val="1183999689"/>
                   </a:ext>
                 </a:extLst>
               </a:tr>
@@ -11187,7 +10790,7 @@
                 </a:tc>
                 <a:extLst>
                   <a:ext uri="{0D108BD9-81ED-4DB2-BD59-A6C34878D82A}">
-                    <a16:rowId xmlns:a16="http://schemas.microsoft.com/office/drawing/2014/main" val="1332552901"/>
+                    <a16:rowId xmlns:a16="http://schemas.microsoft.com/office/drawing/2014/main" xmlns="" val="1332552901"/>
                   </a:ext>
                 </a:extLst>
               </a:tr>
@@ -11278,7 +10881,7 @@
                 </a:tc>
                 <a:extLst>
                   <a:ext uri="{0D108BD9-81ED-4DB2-BD59-A6C34878D82A}">
-                    <a16:rowId xmlns:a16="http://schemas.microsoft.com/office/drawing/2014/main" val="359462879"/>
+                    <a16:rowId xmlns:a16="http://schemas.microsoft.com/office/drawing/2014/main" xmlns="" val="359462879"/>
                   </a:ext>
                 </a:extLst>
               </a:tr>
@@ -11369,7 +10972,7 @@
                 </a:tc>
                 <a:extLst>
                   <a:ext uri="{0D108BD9-81ED-4DB2-BD59-A6C34878D82A}">
-                    <a16:rowId xmlns:a16="http://schemas.microsoft.com/office/drawing/2014/main" val="2813874092"/>
+                    <a16:rowId xmlns:a16="http://schemas.microsoft.com/office/drawing/2014/main" xmlns="" val="2813874092"/>
                   </a:ext>
                 </a:extLst>
               </a:tr>
@@ -11442,7 +11045,7 @@
                 </a:tc>
                 <a:extLst>
                   <a:ext uri="{0D108BD9-81ED-4DB2-BD59-A6C34878D82A}">
-                    <a16:rowId xmlns:a16="http://schemas.microsoft.com/office/drawing/2014/main" val="2520059334"/>
+                    <a16:rowId xmlns:a16="http://schemas.microsoft.com/office/drawing/2014/main" xmlns="" val="2520059334"/>
                   </a:ext>
                 </a:extLst>
               </a:tr>
@@ -11821,210 +11424,210 @@
                 <a:gridCol w="1179969">
                   <a:extLst>
                     <a:ext uri="{9D8B030D-6E8A-4147-A177-3AD203B41FA5}">
-                      <a16:colId xmlns:a16="http://schemas.microsoft.com/office/drawing/2014/main" val="2965499274"/>
+                      <a16:colId xmlns:a16="http://schemas.microsoft.com/office/drawing/2014/main" xmlns="" val="2965499274"/>
                     </a:ext>
                   </a:extLst>
                 </a:gridCol>
                 <a:gridCol w="240665">
                   <a:extLst>
                     <a:ext uri="{9D8B030D-6E8A-4147-A177-3AD203B41FA5}">
-                      <a16:colId xmlns:a16="http://schemas.microsoft.com/office/drawing/2014/main" val="2179834190"/>
+                      <a16:colId xmlns:a16="http://schemas.microsoft.com/office/drawing/2014/main" xmlns="" val="2179834190"/>
                     </a:ext>
                   </a:extLst>
                 </a:gridCol>
                 <a:gridCol w="240665">
                   <a:extLst>
                     <a:ext uri="{9D8B030D-6E8A-4147-A177-3AD203B41FA5}">
-                      <a16:colId xmlns:a16="http://schemas.microsoft.com/office/drawing/2014/main" val="1986070311"/>
+                      <a16:colId xmlns:a16="http://schemas.microsoft.com/office/drawing/2014/main" xmlns="" val="1986070311"/>
                     </a:ext>
                   </a:extLst>
                 </a:gridCol>
                 <a:gridCol w="240665">
                   <a:extLst>
                     <a:ext uri="{9D8B030D-6E8A-4147-A177-3AD203B41FA5}">
-                      <a16:colId xmlns:a16="http://schemas.microsoft.com/office/drawing/2014/main" val="1109150949"/>
+                      <a16:colId xmlns:a16="http://schemas.microsoft.com/office/drawing/2014/main" xmlns="" val="1109150949"/>
                     </a:ext>
                   </a:extLst>
                 </a:gridCol>
                 <a:gridCol w="240665">
                   <a:extLst>
                     <a:ext uri="{9D8B030D-6E8A-4147-A177-3AD203B41FA5}">
-                      <a16:colId xmlns:a16="http://schemas.microsoft.com/office/drawing/2014/main" val="951764221"/>
+                      <a16:colId xmlns:a16="http://schemas.microsoft.com/office/drawing/2014/main" xmlns="" val="951764221"/>
                     </a:ext>
                   </a:extLst>
                 </a:gridCol>
                 <a:gridCol w="240665">
                   <a:extLst>
                     <a:ext uri="{9D8B030D-6E8A-4147-A177-3AD203B41FA5}">
-                      <a16:colId xmlns:a16="http://schemas.microsoft.com/office/drawing/2014/main" val="1317322103"/>
+                      <a16:colId xmlns:a16="http://schemas.microsoft.com/office/drawing/2014/main" xmlns="" val="1317322103"/>
                     </a:ext>
                   </a:extLst>
                 </a:gridCol>
                 <a:gridCol w="240665">
                   <a:extLst>
                     <a:ext uri="{9D8B030D-6E8A-4147-A177-3AD203B41FA5}">
-                      <a16:colId xmlns:a16="http://schemas.microsoft.com/office/drawing/2014/main" val="3658604392"/>
+                      <a16:colId xmlns:a16="http://schemas.microsoft.com/office/drawing/2014/main" xmlns="" val="3658604392"/>
                     </a:ext>
                   </a:extLst>
                 </a:gridCol>
                 <a:gridCol w="240665">
                   <a:extLst>
                     <a:ext uri="{9D8B030D-6E8A-4147-A177-3AD203B41FA5}">
-                      <a16:colId xmlns:a16="http://schemas.microsoft.com/office/drawing/2014/main" val="4202125711"/>
+                      <a16:colId xmlns:a16="http://schemas.microsoft.com/office/drawing/2014/main" xmlns="" val="4202125711"/>
                     </a:ext>
                   </a:extLst>
                 </a:gridCol>
                 <a:gridCol w="240665">
                   <a:extLst>
                     <a:ext uri="{9D8B030D-6E8A-4147-A177-3AD203B41FA5}">
-                      <a16:colId xmlns:a16="http://schemas.microsoft.com/office/drawing/2014/main" val="440540803"/>
+                      <a16:colId xmlns:a16="http://schemas.microsoft.com/office/drawing/2014/main" xmlns="" val="440540803"/>
                     </a:ext>
                   </a:extLst>
                 </a:gridCol>
                 <a:gridCol w="240665">
                   <a:extLst>
                     <a:ext uri="{9D8B030D-6E8A-4147-A177-3AD203B41FA5}">
-                      <a16:colId xmlns:a16="http://schemas.microsoft.com/office/drawing/2014/main" val="1758816179"/>
+                      <a16:colId xmlns:a16="http://schemas.microsoft.com/office/drawing/2014/main" xmlns="" val="1758816179"/>
                     </a:ext>
                   </a:extLst>
                 </a:gridCol>
                 <a:gridCol w="240665">
                   <a:extLst>
                     <a:ext uri="{9D8B030D-6E8A-4147-A177-3AD203B41FA5}">
-                      <a16:colId xmlns:a16="http://schemas.microsoft.com/office/drawing/2014/main" val="45540268"/>
+                      <a16:colId xmlns:a16="http://schemas.microsoft.com/office/drawing/2014/main" xmlns="" val="45540268"/>
                     </a:ext>
                   </a:extLst>
                 </a:gridCol>
                 <a:gridCol w="240665">
                   <a:extLst>
                     <a:ext uri="{9D8B030D-6E8A-4147-A177-3AD203B41FA5}">
-                      <a16:colId xmlns:a16="http://schemas.microsoft.com/office/drawing/2014/main" val="2006971880"/>
+                      <a16:colId xmlns:a16="http://schemas.microsoft.com/office/drawing/2014/main" xmlns="" val="2006971880"/>
                     </a:ext>
                   </a:extLst>
                 </a:gridCol>
                 <a:gridCol w="240665">
                   <a:extLst>
                     <a:ext uri="{9D8B030D-6E8A-4147-A177-3AD203B41FA5}">
-                      <a16:colId xmlns:a16="http://schemas.microsoft.com/office/drawing/2014/main" val="281314405"/>
+                      <a16:colId xmlns:a16="http://schemas.microsoft.com/office/drawing/2014/main" xmlns="" val="281314405"/>
                     </a:ext>
                   </a:extLst>
                 </a:gridCol>
                 <a:gridCol w="240665">
                   <a:extLst>
                     <a:ext uri="{9D8B030D-6E8A-4147-A177-3AD203B41FA5}">
-                      <a16:colId xmlns:a16="http://schemas.microsoft.com/office/drawing/2014/main" val="3096414635"/>
+                      <a16:colId xmlns:a16="http://schemas.microsoft.com/office/drawing/2014/main" xmlns="" val="3096414635"/>
                     </a:ext>
                   </a:extLst>
                 </a:gridCol>
                 <a:gridCol w="240665">
                   <a:extLst>
                     <a:ext uri="{9D8B030D-6E8A-4147-A177-3AD203B41FA5}">
-                      <a16:colId xmlns:a16="http://schemas.microsoft.com/office/drawing/2014/main" val="1334457778"/>
+                      <a16:colId xmlns:a16="http://schemas.microsoft.com/office/drawing/2014/main" xmlns="" val="1334457778"/>
                     </a:ext>
                   </a:extLst>
                 </a:gridCol>
                 <a:gridCol w="240665">
                   <a:extLst>
                     <a:ext uri="{9D8B030D-6E8A-4147-A177-3AD203B41FA5}">
-                      <a16:colId xmlns:a16="http://schemas.microsoft.com/office/drawing/2014/main" val="961121353"/>
+                      <a16:colId xmlns:a16="http://schemas.microsoft.com/office/drawing/2014/main" xmlns="" val="961121353"/>
                     </a:ext>
                   </a:extLst>
                 </a:gridCol>
                 <a:gridCol w="240665">
                   <a:extLst>
                     <a:ext uri="{9D8B030D-6E8A-4147-A177-3AD203B41FA5}">
-                      <a16:colId xmlns:a16="http://schemas.microsoft.com/office/drawing/2014/main" val="4121960143"/>
+                      <a16:colId xmlns:a16="http://schemas.microsoft.com/office/drawing/2014/main" xmlns="" val="4121960143"/>
                     </a:ext>
                   </a:extLst>
                 </a:gridCol>
                 <a:gridCol w="240665">
                   <a:extLst>
                     <a:ext uri="{9D8B030D-6E8A-4147-A177-3AD203B41FA5}">
-                      <a16:colId xmlns:a16="http://schemas.microsoft.com/office/drawing/2014/main" val="3349035276"/>
+                      <a16:colId xmlns:a16="http://schemas.microsoft.com/office/drawing/2014/main" xmlns="" val="3349035276"/>
                     </a:ext>
                   </a:extLst>
                 </a:gridCol>
                 <a:gridCol w="240665">
                   <a:extLst>
                     <a:ext uri="{9D8B030D-6E8A-4147-A177-3AD203B41FA5}">
-                      <a16:colId xmlns:a16="http://schemas.microsoft.com/office/drawing/2014/main" val="220624349"/>
+                      <a16:colId xmlns:a16="http://schemas.microsoft.com/office/drawing/2014/main" xmlns="" val="220624349"/>
                     </a:ext>
                   </a:extLst>
                 </a:gridCol>
                 <a:gridCol w="240665">
                   <a:extLst>
                     <a:ext uri="{9D8B030D-6E8A-4147-A177-3AD203B41FA5}">
-                      <a16:colId xmlns:a16="http://schemas.microsoft.com/office/drawing/2014/main" val="470766128"/>
+                      <a16:colId xmlns:a16="http://schemas.microsoft.com/office/drawing/2014/main" xmlns="" val="470766128"/>
                     </a:ext>
                   </a:extLst>
                 </a:gridCol>
                 <a:gridCol w="240665">
                   <a:extLst>
                     <a:ext uri="{9D8B030D-6E8A-4147-A177-3AD203B41FA5}">
-                      <a16:colId xmlns:a16="http://schemas.microsoft.com/office/drawing/2014/main" val="117241121"/>
+                      <a16:colId xmlns:a16="http://schemas.microsoft.com/office/drawing/2014/main" xmlns="" val="117241121"/>
                     </a:ext>
                   </a:extLst>
                 </a:gridCol>
                 <a:gridCol w="240665">
                   <a:extLst>
                     <a:ext uri="{9D8B030D-6E8A-4147-A177-3AD203B41FA5}">
-                      <a16:colId xmlns:a16="http://schemas.microsoft.com/office/drawing/2014/main" val="2478073096"/>
+                      <a16:colId xmlns:a16="http://schemas.microsoft.com/office/drawing/2014/main" xmlns="" val="2478073096"/>
                     </a:ext>
                   </a:extLst>
                 </a:gridCol>
                 <a:gridCol w="240665">
                   <a:extLst>
                     <a:ext uri="{9D8B030D-6E8A-4147-A177-3AD203B41FA5}">
-                      <a16:colId xmlns:a16="http://schemas.microsoft.com/office/drawing/2014/main" val="3070555678"/>
+                      <a16:colId xmlns:a16="http://schemas.microsoft.com/office/drawing/2014/main" xmlns="" val="3070555678"/>
                     </a:ext>
                   </a:extLst>
                 </a:gridCol>
                 <a:gridCol w="240665">
                   <a:extLst>
                     <a:ext uri="{9D8B030D-6E8A-4147-A177-3AD203B41FA5}">
-                      <a16:colId xmlns:a16="http://schemas.microsoft.com/office/drawing/2014/main" val="273656859"/>
+                      <a16:colId xmlns:a16="http://schemas.microsoft.com/office/drawing/2014/main" xmlns="" val="273656859"/>
                     </a:ext>
                   </a:extLst>
                 </a:gridCol>
                 <a:gridCol w="240665">
                   <a:extLst>
                     <a:ext uri="{9D8B030D-6E8A-4147-A177-3AD203B41FA5}">
-                      <a16:colId xmlns:a16="http://schemas.microsoft.com/office/drawing/2014/main" val="2013909080"/>
+                      <a16:colId xmlns:a16="http://schemas.microsoft.com/office/drawing/2014/main" xmlns="" val="2013909080"/>
                     </a:ext>
                   </a:extLst>
                 </a:gridCol>
                 <a:gridCol w="240665">
                   <a:extLst>
                     <a:ext uri="{9D8B030D-6E8A-4147-A177-3AD203B41FA5}">
-                      <a16:colId xmlns:a16="http://schemas.microsoft.com/office/drawing/2014/main" val="4126413358"/>
+                      <a16:colId xmlns:a16="http://schemas.microsoft.com/office/drawing/2014/main" xmlns="" val="4126413358"/>
                     </a:ext>
                   </a:extLst>
                 </a:gridCol>
                 <a:gridCol w="240665">
                   <a:extLst>
                     <a:ext uri="{9D8B030D-6E8A-4147-A177-3AD203B41FA5}">
-                      <a16:colId xmlns:a16="http://schemas.microsoft.com/office/drawing/2014/main" val="331812427"/>
+                      <a16:colId xmlns:a16="http://schemas.microsoft.com/office/drawing/2014/main" xmlns="" val="331812427"/>
                     </a:ext>
                   </a:extLst>
                 </a:gridCol>
                 <a:gridCol w="240665">
                   <a:extLst>
                     <a:ext uri="{9D8B030D-6E8A-4147-A177-3AD203B41FA5}">
-                      <a16:colId xmlns:a16="http://schemas.microsoft.com/office/drawing/2014/main" val="537665528"/>
+                      <a16:colId xmlns:a16="http://schemas.microsoft.com/office/drawing/2014/main" xmlns="" val="537665528"/>
                     </a:ext>
                   </a:extLst>
                 </a:gridCol>
                 <a:gridCol w="240665">
                   <a:extLst>
                     <a:ext uri="{9D8B030D-6E8A-4147-A177-3AD203B41FA5}">
-                      <a16:colId xmlns:a16="http://schemas.microsoft.com/office/drawing/2014/main" val="1752525779"/>
+                      <a16:colId xmlns:a16="http://schemas.microsoft.com/office/drawing/2014/main" xmlns="" val="1752525779"/>
                     </a:ext>
                   </a:extLst>
                 </a:gridCol>
                 <a:gridCol w="240665">
                   <a:extLst>
                     <a:ext uri="{9D8B030D-6E8A-4147-A177-3AD203B41FA5}">
-                      <a16:colId xmlns:a16="http://schemas.microsoft.com/office/drawing/2014/main" val="1692350377"/>
+                      <a16:colId xmlns:a16="http://schemas.microsoft.com/office/drawing/2014/main" xmlns="" val="1692350377"/>
                     </a:ext>
                   </a:extLst>
                 </a:gridCol>
@@ -12926,7 +12529,7 @@
                 </a:tc>
                 <a:extLst>
                   <a:ext uri="{0D108BD9-81ED-4DB2-BD59-A6C34878D82A}">
-                    <a16:rowId xmlns:a16="http://schemas.microsoft.com/office/drawing/2014/main" val="4162335905"/>
+                    <a16:rowId xmlns:a16="http://schemas.microsoft.com/office/drawing/2014/main" xmlns="" val="4162335905"/>
                   </a:ext>
                 </a:extLst>
               </a:tr>
@@ -13683,7 +13286,7 @@
                 </a:tc>
                 <a:extLst>
                   <a:ext uri="{0D108BD9-81ED-4DB2-BD59-A6C34878D82A}">
-                    <a16:rowId xmlns:a16="http://schemas.microsoft.com/office/drawing/2014/main" val="881162597"/>
+                    <a16:rowId xmlns:a16="http://schemas.microsoft.com/office/drawing/2014/main" xmlns="" val="881162597"/>
                   </a:ext>
                 </a:extLst>
               </a:tr>
@@ -14440,7 +14043,7 @@
                 </a:tc>
                 <a:extLst>
                   <a:ext uri="{0D108BD9-81ED-4DB2-BD59-A6C34878D82A}">
-                    <a16:rowId xmlns:a16="http://schemas.microsoft.com/office/drawing/2014/main" val="2905570897"/>
+                    <a16:rowId xmlns:a16="http://schemas.microsoft.com/office/drawing/2014/main" xmlns="" val="2905570897"/>
                   </a:ext>
                 </a:extLst>
               </a:tr>
@@ -15197,7 +14800,7 @@
                 </a:tc>
                 <a:extLst>
                   <a:ext uri="{0D108BD9-81ED-4DB2-BD59-A6C34878D82A}">
-                    <a16:rowId xmlns:a16="http://schemas.microsoft.com/office/drawing/2014/main" val="2831043834"/>
+                    <a16:rowId xmlns:a16="http://schemas.microsoft.com/office/drawing/2014/main" xmlns="" val="2831043834"/>
                   </a:ext>
                 </a:extLst>
               </a:tr>
@@ -15954,7 +15557,7 @@
                 </a:tc>
                 <a:extLst>
                   <a:ext uri="{0D108BD9-81ED-4DB2-BD59-A6C34878D82A}">
-                    <a16:rowId xmlns:a16="http://schemas.microsoft.com/office/drawing/2014/main" val="3587403997"/>
+                    <a16:rowId xmlns:a16="http://schemas.microsoft.com/office/drawing/2014/main" xmlns="" val="3587403997"/>
                   </a:ext>
                 </a:extLst>
               </a:tr>
@@ -16711,7 +16314,7 @@
                 </a:tc>
                 <a:extLst>
                   <a:ext uri="{0D108BD9-81ED-4DB2-BD59-A6C34878D82A}">
-                    <a16:rowId xmlns:a16="http://schemas.microsoft.com/office/drawing/2014/main" val="1137311543"/>
+                    <a16:rowId xmlns:a16="http://schemas.microsoft.com/office/drawing/2014/main" xmlns="" val="1137311543"/>
                   </a:ext>
                 </a:extLst>
               </a:tr>
@@ -17468,7 +17071,7 @@
                 </a:tc>
                 <a:extLst>
                   <a:ext uri="{0D108BD9-81ED-4DB2-BD59-A6C34878D82A}">
-                    <a16:rowId xmlns:a16="http://schemas.microsoft.com/office/drawing/2014/main" val="871435931"/>
+                    <a16:rowId xmlns:a16="http://schemas.microsoft.com/office/drawing/2014/main" xmlns="" val="871435931"/>
                   </a:ext>
                 </a:extLst>
               </a:tr>
@@ -18225,7 +17828,7 @@
                 </a:tc>
                 <a:extLst>
                   <a:ext uri="{0D108BD9-81ED-4DB2-BD59-A6C34878D82A}">
-                    <a16:rowId xmlns:a16="http://schemas.microsoft.com/office/drawing/2014/main" val="3791816906"/>
+                    <a16:rowId xmlns:a16="http://schemas.microsoft.com/office/drawing/2014/main" xmlns="" val="3791816906"/>
                   </a:ext>
                 </a:extLst>
               </a:tr>
@@ -18982,7 +18585,7 @@
                 </a:tc>
                 <a:extLst>
                   <a:ext uri="{0D108BD9-81ED-4DB2-BD59-A6C34878D82A}">
-                    <a16:rowId xmlns:a16="http://schemas.microsoft.com/office/drawing/2014/main" val="1022446101"/>
+                    <a16:rowId xmlns:a16="http://schemas.microsoft.com/office/drawing/2014/main" xmlns="" val="1022446101"/>
                   </a:ext>
                 </a:extLst>
               </a:tr>
@@ -19739,7 +19342,7 @@
                 </a:tc>
                 <a:extLst>
                   <a:ext uri="{0D108BD9-81ED-4DB2-BD59-A6C34878D82A}">
-                    <a16:rowId xmlns:a16="http://schemas.microsoft.com/office/drawing/2014/main" val="1798460173"/>
+                    <a16:rowId xmlns:a16="http://schemas.microsoft.com/office/drawing/2014/main" xmlns="" val="1798460173"/>
                   </a:ext>
                 </a:extLst>
               </a:tr>
@@ -20496,7 +20099,7 @@
                 </a:tc>
                 <a:extLst>
                   <a:ext uri="{0D108BD9-81ED-4DB2-BD59-A6C34878D82A}">
-                    <a16:rowId xmlns:a16="http://schemas.microsoft.com/office/drawing/2014/main" val="1431885110"/>
+                    <a16:rowId xmlns:a16="http://schemas.microsoft.com/office/drawing/2014/main" xmlns="" val="1431885110"/>
                   </a:ext>
                 </a:extLst>
               </a:tr>
@@ -21253,7 +20856,7 @@
                 </a:tc>
                 <a:extLst>
                   <a:ext uri="{0D108BD9-81ED-4DB2-BD59-A6C34878D82A}">
-                    <a16:rowId xmlns:a16="http://schemas.microsoft.com/office/drawing/2014/main" val="1333399532"/>
+                    <a16:rowId xmlns:a16="http://schemas.microsoft.com/office/drawing/2014/main" xmlns="" val="1333399532"/>
                   </a:ext>
                 </a:extLst>
               </a:tr>
@@ -22010,7 +21613,7 @@
                 </a:tc>
                 <a:extLst>
                   <a:ext uri="{0D108BD9-81ED-4DB2-BD59-A6C34878D82A}">
-                    <a16:rowId xmlns:a16="http://schemas.microsoft.com/office/drawing/2014/main" val="2565822579"/>
+                    <a16:rowId xmlns:a16="http://schemas.microsoft.com/office/drawing/2014/main" xmlns="" val="2565822579"/>
                   </a:ext>
                 </a:extLst>
               </a:tr>
@@ -22767,7 +22370,7 @@
                 </a:tc>
                 <a:extLst>
                   <a:ext uri="{0D108BD9-81ED-4DB2-BD59-A6C34878D82A}">
-                    <a16:rowId xmlns:a16="http://schemas.microsoft.com/office/drawing/2014/main" val="2842804090"/>
+                    <a16:rowId xmlns:a16="http://schemas.microsoft.com/office/drawing/2014/main" xmlns="" val="2842804090"/>
                   </a:ext>
                 </a:extLst>
               </a:tr>
@@ -23524,7 +23127,7 @@
                 </a:tc>
                 <a:extLst>
                   <a:ext uri="{0D108BD9-81ED-4DB2-BD59-A6C34878D82A}">
-                    <a16:rowId xmlns:a16="http://schemas.microsoft.com/office/drawing/2014/main" val="1749761847"/>
+                    <a16:rowId xmlns:a16="http://schemas.microsoft.com/office/drawing/2014/main" xmlns="" val="1749761847"/>
                   </a:ext>
                 </a:extLst>
               </a:tr>
@@ -24281,7 +23884,7 @@
                 </a:tc>
                 <a:extLst>
                   <a:ext uri="{0D108BD9-81ED-4DB2-BD59-A6C34878D82A}">
-                    <a16:rowId xmlns:a16="http://schemas.microsoft.com/office/drawing/2014/main" val="2951601145"/>
+                    <a16:rowId xmlns:a16="http://schemas.microsoft.com/office/drawing/2014/main" xmlns="" val="2951601145"/>
                   </a:ext>
                 </a:extLst>
               </a:tr>
@@ -25038,7 +24641,7 @@
                 </a:tc>
                 <a:extLst>
                   <a:ext uri="{0D108BD9-81ED-4DB2-BD59-A6C34878D82A}">
-                    <a16:rowId xmlns:a16="http://schemas.microsoft.com/office/drawing/2014/main" val="2717518411"/>
+                    <a16:rowId xmlns:a16="http://schemas.microsoft.com/office/drawing/2014/main" xmlns="" val="2717518411"/>
                   </a:ext>
                 </a:extLst>
               </a:tr>
@@ -25795,7 +25398,7 @@
                 </a:tc>
                 <a:extLst>
                   <a:ext uri="{0D108BD9-81ED-4DB2-BD59-A6C34878D82A}">
-                    <a16:rowId xmlns:a16="http://schemas.microsoft.com/office/drawing/2014/main" val="1563189369"/>
+                    <a16:rowId xmlns:a16="http://schemas.microsoft.com/office/drawing/2014/main" xmlns="" val="1563189369"/>
                   </a:ext>
                 </a:extLst>
               </a:tr>
@@ -25860,6 +25463,12 @@
                 <a:spcPct val="0"/>
               </a:spcBef>
             </a:pPr>
+            <a:r>
+              <a:rPr lang="en-GB" sz="3200" dirty="0">
+                <a:latin typeface="+mj-lt"/>
+              </a:rPr>
+              <a:t/>
+            </a:r>
             <a:br>
               <a:rPr lang="en-GB" sz="3200" dirty="0">
                 <a:latin typeface="+mj-lt"/>
@@ -25871,11 +25480,23 @@
               </a:rPr>
               <a:t>Reikalavimų - užduočių atsekamumo matrica</a:t>
             </a:r>
+            <a:r>
+              <a:rPr lang="en-GB" dirty="0">
+                <a:latin typeface="+mj-lt"/>
+              </a:rPr>
+              <a:t/>
+            </a:r>
             <a:br>
               <a:rPr lang="en-GB" dirty="0">
                 <a:latin typeface="+mj-lt"/>
               </a:rPr>
             </a:br>
+            <a:r>
+              <a:rPr lang="en-GB" b="1" dirty="0">
+                <a:latin typeface="+mj-lt"/>
+              </a:rPr>
+              <a:t/>
+            </a:r>
             <a:br>
               <a:rPr lang="en-GB" b="1" dirty="0">
                 <a:latin typeface="+mj-lt"/>
@@ -25897,13 +25518,13 @@
             <p:ph idx="1"/>
             <p:extLst>
               <p:ext uri="{D42A27DB-BD31-4B8C-83A1-F6EECF244321}">
-                <p14:modId xmlns:p14="http://schemas.microsoft.com/office/powerpoint/2010/main" val="3562883745"/>
+                <p14:modId xmlns:p14="http://schemas.microsoft.com/office/powerpoint/2010/main" val="1479657109"/>
               </p:ext>
             </p:extLst>
           </p:nvPr>
         </p:nvGraphicFramePr>
         <p:xfrm>
-          <a:off x="1126761" y="1292470"/>
+          <a:off x="1893038" y="1204547"/>
           <a:ext cx="8598873" cy="5468812"/>
         </p:xfrm>
         <a:graphic>
@@ -25916,77 +25537,77 @@
                 <a:gridCol w="2121719">
                   <a:extLst>
                     <a:ext uri="{9D8B030D-6E8A-4147-A177-3AD203B41FA5}">
-                      <a16:colId xmlns:a16="http://schemas.microsoft.com/office/drawing/2014/main" val="1994991158"/>
+                      <a16:colId xmlns:a16="http://schemas.microsoft.com/office/drawing/2014/main" xmlns="" val="1994991158"/>
                     </a:ext>
                   </a:extLst>
                 </a:gridCol>
                 <a:gridCol w="718648">
                   <a:extLst>
                     <a:ext uri="{9D8B030D-6E8A-4147-A177-3AD203B41FA5}">
-                      <a16:colId xmlns:a16="http://schemas.microsoft.com/office/drawing/2014/main" val="3983982617"/>
+                      <a16:colId xmlns:a16="http://schemas.microsoft.com/office/drawing/2014/main" xmlns="" val="3983982617"/>
                     </a:ext>
                   </a:extLst>
                 </a:gridCol>
                 <a:gridCol w="581762">
                   <a:extLst>
                     <a:ext uri="{9D8B030D-6E8A-4147-A177-3AD203B41FA5}">
-                      <a16:colId xmlns:a16="http://schemas.microsoft.com/office/drawing/2014/main" val="1121441232"/>
+                      <a16:colId xmlns:a16="http://schemas.microsoft.com/office/drawing/2014/main" xmlns="" val="1121441232"/>
                     </a:ext>
                   </a:extLst>
                 </a:gridCol>
                 <a:gridCol w="647093">
                   <a:extLst>
                     <a:ext uri="{9D8B030D-6E8A-4147-A177-3AD203B41FA5}">
-                      <a16:colId xmlns:a16="http://schemas.microsoft.com/office/drawing/2014/main" val="3303708064"/>
+                      <a16:colId xmlns:a16="http://schemas.microsoft.com/office/drawing/2014/main" xmlns="" val="3303708064"/>
                     </a:ext>
                   </a:extLst>
                 </a:gridCol>
                 <a:gridCol w="647093">
                   <a:extLst>
                     <a:ext uri="{9D8B030D-6E8A-4147-A177-3AD203B41FA5}">
-                      <a16:colId xmlns:a16="http://schemas.microsoft.com/office/drawing/2014/main" val="2860886485"/>
+                      <a16:colId xmlns:a16="http://schemas.microsoft.com/office/drawing/2014/main" xmlns="" val="2860886485"/>
                     </a:ext>
                   </a:extLst>
                 </a:gridCol>
                 <a:gridCol w="647093">
                   <a:extLst>
                     <a:ext uri="{9D8B030D-6E8A-4147-A177-3AD203B41FA5}">
-                      <a16:colId xmlns:a16="http://schemas.microsoft.com/office/drawing/2014/main" val="1890991536"/>
+                      <a16:colId xmlns:a16="http://schemas.microsoft.com/office/drawing/2014/main" xmlns="" val="1890991536"/>
                     </a:ext>
                   </a:extLst>
                 </a:gridCol>
                 <a:gridCol w="647093">
                   <a:extLst>
                     <a:ext uri="{9D8B030D-6E8A-4147-A177-3AD203B41FA5}">
-                      <a16:colId xmlns:a16="http://schemas.microsoft.com/office/drawing/2014/main" val="1264792757"/>
+                      <a16:colId xmlns:a16="http://schemas.microsoft.com/office/drawing/2014/main" xmlns="" val="1264792757"/>
                     </a:ext>
                   </a:extLst>
                 </a:gridCol>
                 <a:gridCol w="647093">
                   <a:extLst>
                     <a:ext uri="{9D8B030D-6E8A-4147-A177-3AD203B41FA5}">
-                      <a16:colId xmlns:a16="http://schemas.microsoft.com/office/drawing/2014/main" val="2577497445"/>
+                      <a16:colId xmlns:a16="http://schemas.microsoft.com/office/drawing/2014/main" xmlns="" val="2577497445"/>
                     </a:ext>
                   </a:extLst>
                 </a:gridCol>
                 <a:gridCol w="647093">
                   <a:extLst>
                     <a:ext uri="{9D8B030D-6E8A-4147-A177-3AD203B41FA5}">
-                      <a16:colId xmlns:a16="http://schemas.microsoft.com/office/drawing/2014/main" val="291613360"/>
+                      <a16:colId xmlns:a16="http://schemas.microsoft.com/office/drawing/2014/main" xmlns="" val="291613360"/>
                     </a:ext>
                   </a:extLst>
                 </a:gridCol>
                 <a:gridCol w="647093">
                   <a:extLst>
                     <a:ext uri="{9D8B030D-6E8A-4147-A177-3AD203B41FA5}">
-                      <a16:colId xmlns:a16="http://schemas.microsoft.com/office/drawing/2014/main" val="3334409285"/>
+                      <a16:colId xmlns:a16="http://schemas.microsoft.com/office/drawing/2014/main" xmlns="" val="3334409285"/>
                     </a:ext>
                   </a:extLst>
                 </a:gridCol>
                 <a:gridCol w="647093">
                   <a:extLst>
                     <a:ext uri="{9D8B030D-6E8A-4147-A177-3AD203B41FA5}">
-                      <a16:colId xmlns:a16="http://schemas.microsoft.com/office/drawing/2014/main" val="1422124115"/>
+                      <a16:colId xmlns:a16="http://schemas.microsoft.com/office/drawing/2014/main" xmlns="" val="1422124115"/>
                     </a:ext>
                   </a:extLst>
                 </a:gridCol>
@@ -26003,12 +25624,12 @@
                         </a:spcAft>
                       </a:pPr>
                       <a:r>
-                        <a:rPr lang="lt-LT" sz="1000">
-                          <a:effectLst/>
-                        </a:rPr>
-                        <a:t> </a:t>
-                      </a:r>
-                      <a:endParaRPr lang="en-GB" sz="1000">
+                        <a:rPr lang="lt-LT" sz="1000" dirty="0">
+                          <a:effectLst/>
+                        </a:rPr>
+                        <a:t> </a:t>
+                      </a:r>
+                      <a:endParaRPr lang="en-GB" sz="1000" dirty="0">
                         <a:effectLst/>
                         <a:latin typeface="Times New Roman" panose="02020603050405020304" pitchFamily="18" charset="0"/>
                         <a:ea typeface="Times New Roman" panose="02020603050405020304" pitchFamily="18" charset="0"/>
@@ -26028,12 +25649,12 @@
                         </a:spcAft>
                       </a:pPr>
                       <a:r>
-                        <a:rPr lang="lt-LT" sz="1000">
+                        <a:rPr lang="lt-LT" sz="1000" dirty="0">
                           <a:effectLst/>
                         </a:rPr>
                         <a:t>FR1</a:t>
                       </a:r>
-                      <a:endParaRPr lang="en-GB" sz="1000">
+                      <a:endParaRPr lang="en-GB" sz="1000" dirty="0">
                         <a:effectLst/>
                         <a:latin typeface="Times New Roman" panose="02020603050405020304" pitchFamily="18" charset="0"/>
                         <a:ea typeface="Times New Roman" panose="02020603050405020304" pitchFamily="18" charset="0"/>
@@ -26269,7 +25890,7 @@
                 </a:tc>
                 <a:extLst>
                   <a:ext uri="{0D108BD9-81ED-4DB2-BD59-A6C34878D82A}">
-                    <a16:rowId xmlns:a16="http://schemas.microsoft.com/office/drawing/2014/main" val="1287490381"/>
+                    <a16:rowId xmlns:a16="http://schemas.microsoft.com/office/drawing/2014/main" xmlns="" val="1287490381"/>
                   </a:ext>
                 </a:extLst>
               </a:tr>
@@ -26551,7 +26172,7 @@
                 </a:tc>
                 <a:extLst>
                   <a:ext uri="{0D108BD9-81ED-4DB2-BD59-A6C34878D82A}">
-                    <a16:rowId xmlns:a16="http://schemas.microsoft.com/office/drawing/2014/main" val="2515310684"/>
+                    <a16:rowId xmlns:a16="http://schemas.microsoft.com/office/drawing/2014/main" xmlns="" val="2515310684"/>
                   </a:ext>
                 </a:extLst>
               </a:tr>
@@ -26833,7 +26454,7 @@
                 </a:tc>
                 <a:extLst>
                   <a:ext uri="{0D108BD9-81ED-4DB2-BD59-A6C34878D82A}">
-                    <a16:rowId xmlns:a16="http://schemas.microsoft.com/office/drawing/2014/main" val="2463164904"/>
+                    <a16:rowId xmlns:a16="http://schemas.microsoft.com/office/drawing/2014/main" xmlns="" val="2463164904"/>
                   </a:ext>
                 </a:extLst>
               </a:tr>
@@ -27115,7 +26736,7 @@
                 </a:tc>
                 <a:extLst>
                   <a:ext uri="{0D108BD9-81ED-4DB2-BD59-A6C34878D82A}">
-                    <a16:rowId xmlns:a16="http://schemas.microsoft.com/office/drawing/2014/main" val="2345751358"/>
+                    <a16:rowId xmlns:a16="http://schemas.microsoft.com/office/drawing/2014/main" xmlns="" val="2345751358"/>
                   </a:ext>
                 </a:extLst>
               </a:tr>
@@ -27397,7 +27018,7 @@
                 </a:tc>
                 <a:extLst>
                   <a:ext uri="{0D108BD9-81ED-4DB2-BD59-A6C34878D82A}">
-                    <a16:rowId xmlns:a16="http://schemas.microsoft.com/office/drawing/2014/main" val="1639536206"/>
+                    <a16:rowId xmlns:a16="http://schemas.microsoft.com/office/drawing/2014/main" xmlns="" val="1639536206"/>
                   </a:ext>
                 </a:extLst>
               </a:tr>
@@ -27679,7 +27300,7 @@
                 </a:tc>
                 <a:extLst>
                   <a:ext uri="{0D108BD9-81ED-4DB2-BD59-A6C34878D82A}">
-                    <a16:rowId xmlns:a16="http://schemas.microsoft.com/office/drawing/2014/main" val="717404175"/>
+                    <a16:rowId xmlns:a16="http://schemas.microsoft.com/office/drawing/2014/main" xmlns="" val="717404175"/>
                   </a:ext>
                 </a:extLst>
               </a:tr>
@@ -27961,7 +27582,7 @@
                 </a:tc>
                 <a:extLst>
                   <a:ext uri="{0D108BD9-81ED-4DB2-BD59-A6C34878D82A}">
-                    <a16:rowId xmlns:a16="http://schemas.microsoft.com/office/drawing/2014/main" val="3485606310"/>
+                    <a16:rowId xmlns:a16="http://schemas.microsoft.com/office/drawing/2014/main" xmlns="" val="3485606310"/>
                   </a:ext>
                 </a:extLst>
               </a:tr>
@@ -28243,7 +27864,7 @@
                 </a:tc>
                 <a:extLst>
                   <a:ext uri="{0D108BD9-81ED-4DB2-BD59-A6C34878D82A}">
-                    <a16:rowId xmlns:a16="http://schemas.microsoft.com/office/drawing/2014/main" val="1413387870"/>
+                    <a16:rowId xmlns:a16="http://schemas.microsoft.com/office/drawing/2014/main" xmlns="" val="1413387870"/>
                   </a:ext>
                 </a:extLst>
               </a:tr>
@@ -28525,7 +28146,7 @@
                 </a:tc>
                 <a:extLst>
                   <a:ext uri="{0D108BD9-81ED-4DB2-BD59-A6C34878D82A}">
-                    <a16:rowId xmlns:a16="http://schemas.microsoft.com/office/drawing/2014/main" val="3301636907"/>
+                    <a16:rowId xmlns:a16="http://schemas.microsoft.com/office/drawing/2014/main" xmlns="" val="3301636907"/>
                   </a:ext>
                 </a:extLst>
               </a:tr>
@@ -28807,7 +28428,7 @@
                 </a:tc>
                 <a:extLst>
                   <a:ext uri="{0D108BD9-81ED-4DB2-BD59-A6C34878D82A}">
-                    <a16:rowId xmlns:a16="http://schemas.microsoft.com/office/drawing/2014/main" val="4178448492"/>
+                    <a16:rowId xmlns:a16="http://schemas.microsoft.com/office/drawing/2014/main" xmlns="" val="4178448492"/>
                   </a:ext>
                 </a:extLst>
               </a:tr>
@@ -29089,7 +28710,7 @@
                 </a:tc>
                 <a:extLst>
                   <a:ext uri="{0D108BD9-81ED-4DB2-BD59-A6C34878D82A}">
-                    <a16:rowId xmlns:a16="http://schemas.microsoft.com/office/drawing/2014/main" val="3358628474"/>
+                    <a16:rowId xmlns:a16="http://schemas.microsoft.com/office/drawing/2014/main" xmlns="" val="3358628474"/>
                   </a:ext>
                 </a:extLst>
               </a:tr>
@@ -29371,7 +28992,7 @@
                 </a:tc>
                 <a:extLst>
                   <a:ext uri="{0D108BD9-81ED-4DB2-BD59-A6C34878D82A}">
-                    <a16:rowId xmlns:a16="http://schemas.microsoft.com/office/drawing/2014/main" val="1911107614"/>
+                    <a16:rowId xmlns:a16="http://schemas.microsoft.com/office/drawing/2014/main" xmlns="" val="1911107614"/>
                   </a:ext>
                 </a:extLst>
               </a:tr>
@@ -29653,7 +29274,7 @@
                 </a:tc>
                 <a:extLst>
                   <a:ext uri="{0D108BD9-81ED-4DB2-BD59-A6C34878D82A}">
-                    <a16:rowId xmlns:a16="http://schemas.microsoft.com/office/drawing/2014/main" val="3534155891"/>
+                    <a16:rowId xmlns:a16="http://schemas.microsoft.com/office/drawing/2014/main" xmlns="" val="3534155891"/>
                   </a:ext>
                 </a:extLst>
               </a:tr>
@@ -29935,7 +29556,7 @@
                 </a:tc>
                 <a:extLst>
                   <a:ext uri="{0D108BD9-81ED-4DB2-BD59-A6C34878D82A}">
-                    <a16:rowId xmlns:a16="http://schemas.microsoft.com/office/drawing/2014/main" val="3702396032"/>
+                    <a16:rowId xmlns:a16="http://schemas.microsoft.com/office/drawing/2014/main" xmlns="" val="3702396032"/>
                   </a:ext>
                 </a:extLst>
               </a:tr>
@@ -30217,7 +29838,7 @@
                 </a:tc>
                 <a:extLst>
                   <a:ext uri="{0D108BD9-81ED-4DB2-BD59-A6C34878D82A}">
-                    <a16:rowId xmlns:a16="http://schemas.microsoft.com/office/drawing/2014/main" val="1064680335"/>
+                    <a16:rowId xmlns:a16="http://schemas.microsoft.com/office/drawing/2014/main" xmlns="" val="1064680335"/>
                   </a:ext>
                 </a:extLst>
               </a:tr>

</xml_diff>